<commit_message>
Many edits, primarily ch 4 from dad
</commit_message>
<xml_diff>
--- a/support/thesis-drawings.pptx
+++ b/support/thesis-drawings.pptx
@@ -5,12 +5,11 @@
     <p:sldMasterId id="2147483648" r:id="rId1"/>
   </p:sldMasterIdLst>
   <p:notesMasterIdLst>
-    <p:notesMasterId r:id="rId5"/>
+    <p:notesMasterId r:id="rId4"/>
   </p:notesMasterIdLst>
   <p:sldIdLst>
-    <p:sldId id="259" r:id="rId2"/>
-    <p:sldId id="258" r:id="rId3"/>
-    <p:sldId id="257" r:id="rId4"/>
+    <p:sldId id="258" r:id="rId2"/>
+    <p:sldId id="257" r:id="rId3"/>
   </p:sldIdLst>
   <p:sldSz cx="9144000" cy="6858000" type="screen4x3"/>
   <p:notesSz cx="6858000" cy="9144000"/>
@@ -194,7 +193,7 @@
           <a:p>
             <a:fld id="{FE111C9F-A33E-4952-BC38-37E17DCB4FBF}" type="datetimeFigureOut">
               <a:rPr lang="en-US" smtClean="0"/>
-              <a:t>3/1/2014</a:t>
+              <a:t>3/3/2014</a:t>
             </a:fld>
             <a:endParaRPr lang="en-US"/>
           </a:p>
@@ -481,7 +480,7 @@
       </p:grpSpPr>
       <p:sp>
         <p:nvSpPr>
-          <p:cNvPr id="40962" name="Slide Image Placeholder 1"/>
+          <p:cNvPr id="36866" name="Slide Image Placeholder 1"/>
           <p:cNvSpPr>
             <a:spLocks noGrp="1" noRot="1" noChangeAspect="1" noTextEdit="1"/>
           </p:cNvSpPr>
@@ -495,7 +494,7 @@
       </p:sp>
       <p:sp>
         <p:nvSpPr>
-          <p:cNvPr id="40963" name="Notes Placeholder 2"/>
+          <p:cNvPr id="36867" name="Notes Placeholder 2"/>
           <p:cNvSpPr>
             <a:spLocks noGrp="1"/>
           </p:cNvSpPr>
@@ -511,7 +510,7 @@
           <a:bodyPr/>
           <a:lstStyle/>
           <a:p>
-            <a:endParaRPr lang="en-US" dirty="0" smtClean="0">
+            <a:endParaRPr lang="en-US" smtClean="0">
               <a:latin typeface="Times New Roman" pitchFamily="18" charset="0"/>
               <a:ea typeface="ＭＳ Ｐゴシック" pitchFamily="34" charset="-128"/>
             </a:endParaRPr>
@@ -520,7 +519,7 @@
       </p:sp>
       <p:sp>
         <p:nvSpPr>
-          <p:cNvPr id="40964" name="Slide Number Placeholder 3"/>
+          <p:cNvPr id="36868" name="Slide Number Placeholder 3"/>
           <p:cNvSpPr>
             <a:spLocks noGrp="1"/>
           </p:cNvSpPr>
@@ -535,7 +534,7 @@
           <a:bodyPr/>
           <a:lstStyle/>
           <a:p>
-            <a:fld id="{9012B27F-63FE-4E8D-9DCD-B8D93ED4AE8B}" type="slidenum">
+            <a:fld id="{A0D93007-07BD-4D00-8BBB-9465D4FD7473}" type="slidenum">
               <a:rPr lang="en-US" smtClean="0">
                 <a:latin typeface="Times New Roman" pitchFamily="18" charset="0"/>
                 <a:ea typeface="ＭＳ Ｐゴシック" pitchFamily="34" charset="-128"/>
@@ -559,102 +558,6 @@
 </file>
 
 <file path=ppt/notesSlides/notesSlide2.xml><?xml version="1.0" encoding="utf-8"?>
-<p:notes xmlns:a="http://schemas.openxmlformats.org/drawingml/2006/main" xmlns:r="http://schemas.openxmlformats.org/officeDocument/2006/relationships" xmlns:p="http://schemas.openxmlformats.org/presentationml/2006/main">
-  <p:cSld>
-    <p:spTree>
-      <p:nvGrpSpPr>
-        <p:cNvPr id="1" name=""/>
-        <p:cNvGrpSpPr/>
-        <p:nvPr/>
-      </p:nvGrpSpPr>
-      <p:grpSpPr>
-        <a:xfrm>
-          <a:off x="0" y="0"/>
-          <a:ext cx="0" cy="0"/>
-          <a:chOff x="0" y="0"/>
-          <a:chExt cx="0" cy="0"/>
-        </a:xfrm>
-      </p:grpSpPr>
-      <p:sp>
-        <p:nvSpPr>
-          <p:cNvPr id="36866" name="Slide Image Placeholder 1"/>
-          <p:cNvSpPr>
-            <a:spLocks noGrp="1" noRot="1" noChangeAspect="1" noTextEdit="1"/>
-          </p:cNvSpPr>
-          <p:nvPr>
-            <p:ph type="sldImg"/>
-          </p:nvPr>
-        </p:nvSpPr>
-        <p:spPr>
-          <a:ln/>
-        </p:spPr>
-      </p:sp>
-      <p:sp>
-        <p:nvSpPr>
-          <p:cNvPr id="36867" name="Notes Placeholder 2"/>
-          <p:cNvSpPr>
-            <a:spLocks noGrp="1"/>
-          </p:cNvSpPr>
-          <p:nvPr>
-            <p:ph type="body" idx="1"/>
-          </p:nvPr>
-        </p:nvSpPr>
-        <p:spPr>
-          <a:noFill/>
-          <a:ln/>
-        </p:spPr>
-        <p:txBody>
-          <a:bodyPr/>
-          <a:lstStyle/>
-          <a:p>
-            <a:endParaRPr lang="en-US" smtClean="0">
-              <a:latin typeface="Times New Roman" pitchFamily="18" charset="0"/>
-              <a:ea typeface="ＭＳ Ｐゴシック" pitchFamily="34" charset="-128"/>
-            </a:endParaRPr>
-          </a:p>
-        </p:txBody>
-      </p:sp>
-      <p:sp>
-        <p:nvSpPr>
-          <p:cNvPr id="36868" name="Slide Number Placeholder 3"/>
-          <p:cNvSpPr>
-            <a:spLocks noGrp="1"/>
-          </p:cNvSpPr>
-          <p:nvPr>
-            <p:ph type="sldNum" sz="quarter" idx="5"/>
-          </p:nvPr>
-        </p:nvSpPr>
-        <p:spPr>
-          <a:noFill/>
-        </p:spPr>
-        <p:txBody>
-          <a:bodyPr/>
-          <a:lstStyle/>
-          <a:p>
-            <a:fld id="{A0D93007-07BD-4D00-8BBB-9465D4FD7473}" type="slidenum">
-              <a:rPr lang="en-US" smtClean="0">
-                <a:latin typeface="Times New Roman" pitchFamily="18" charset="0"/>
-                <a:ea typeface="ＭＳ Ｐゴシック" pitchFamily="34" charset="-128"/>
-              </a:rPr>
-              <a:pPr/>
-              <a:t>2</a:t>
-            </a:fld>
-            <a:endParaRPr lang="en-US" smtClean="0">
-              <a:latin typeface="Times New Roman" pitchFamily="18" charset="0"/>
-              <a:ea typeface="ＭＳ Ｐゴシック" pitchFamily="34" charset="-128"/>
-            </a:endParaRPr>
-          </a:p>
-        </p:txBody>
-      </p:sp>
-    </p:spTree>
-  </p:cSld>
-  <p:clrMapOvr>
-    <a:masterClrMapping/>
-  </p:clrMapOvr>
-</p:notes>
-</file>
-
-<file path=ppt/notesSlides/notesSlide3.xml><?xml version="1.0" encoding="utf-8"?>
 <p:notes xmlns:a="http://schemas.openxmlformats.org/drawingml/2006/main" xmlns:r="http://schemas.openxmlformats.org/officeDocument/2006/relationships" xmlns:p="http://schemas.openxmlformats.org/presentationml/2006/main">
   <p:cSld>
     <p:spTree>
@@ -880,7 +783,7 @@
                 <a:latin typeface="Times New Roman" pitchFamily="18" charset="0"/>
               </a:rPr>
               <a:pPr/>
-              <a:t>3</a:t>
+              <a:t>2</a:t>
             </a:fld>
             <a:endParaRPr lang="en-US" altLang="en-US" b="0" smtClean="0">
               <a:solidFill>
@@ -1080,7 +983,7 @@
           <a:p>
             <a:fld id="{A6C27610-B903-4030-BF6B-58161B6517DA}" type="datetimeFigureOut">
               <a:rPr lang="en-US" smtClean="0"/>
-              <a:t>3/1/2014</a:t>
+              <a:t>3/3/2014</a:t>
             </a:fld>
             <a:endParaRPr lang="en-US"/>
           </a:p>
@@ -1250,7 +1153,7 @@
           <a:p>
             <a:fld id="{A6C27610-B903-4030-BF6B-58161B6517DA}" type="datetimeFigureOut">
               <a:rPr lang="en-US" smtClean="0"/>
-              <a:t>3/1/2014</a:t>
+              <a:t>3/3/2014</a:t>
             </a:fld>
             <a:endParaRPr lang="en-US"/>
           </a:p>
@@ -1430,7 +1333,7 @@
           <a:p>
             <a:fld id="{A6C27610-B903-4030-BF6B-58161B6517DA}" type="datetimeFigureOut">
               <a:rPr lang="en-US" smtClean="0"/>
-              <a:t>3/1/2014</a:t>
+              <a:t>3/3/2014</a:t>
             </a:fld>
             <a:endParaRPr lang="en-US"/>
           </a:p>
@@ -1600,7 +1503,7 @@
           <a:p>
             <a:fld id="{A6C27610-B903-4030-BF6B-58161B6517DA}" type="datetimeFigureOut">
               <a:rPr lang="en-US" smtClean="0"/>
-              <a:t>3/1/2014</a:t>
+              <a:t>3/3/2014</a:t>
             </a:fld>
             <a:endParaRPr lang="en-US"/>
           </a:p>
@@ -1846,7 +1749,7 @@
           <a:p>
             <a:fld id="{A6C27610-B903-4030-BF6B-58161B6517DA}" type="datetimeFigureOut">
               <a:rPr lang="en-US" smtClean="0"/>
-              <a:t>3/1/2014</a:t>
+              <a:t>3/3/2014</a:t>
             </a:fld>
             <a:endParaRPr lang="en-US"/>
           </a:p>
@@ -2134,7 +2037,7 @@
           <a:p>
             <a:fld id="{A6C27610-B903-4030-BF6B-58161B6517DA}" type="datetimeFigureOut">
               <a:rPr lang="en-US" smtClean="0"/>
-              <a:t>3/1/2014</a:t>
+              <a:t>3/3/2014</a:t>
             </a:fld>
             <a:endParaRPr lang="en-US"/>
           </a:p>
@@ -2556,7 +2459,7 @@
           <a:p>
             <a:fld id="{A6C27610-B903-4030-BF6B-58161B6517DA}" type="datetimeFigureOut">
               <a:rPr lang="en-US" smtClean="0"/>
-              <a:t>3/1/2014</a:t>
+              <a:t>3/3/2014</a:t>
             </a:fld>
             <a:endParaRPr lang="en-US"/>
           </a:p>
@@ -2674,7 +2577,7 @@
           <a:p>
             <a:fld id="{A6C27610-B903-4030-BF6B-58161B6517DA}" type="datetimeFigureOut">
               <a:rPr lang="en-US" smtClean="0"/>
-              <a:t>3/1/2014</a:t>
+              <a:t>3/3/2014</a:t>
             </a:fld>
             <a:endParaRPr lang="en-US"/>
           </a:p>
@@ -2769,7 +2672,7 @@
           <a:p>
             <a:fld id="{A6C27610-B903-4030-BF6B-58161B6517DA}" type="datetimeFigureOut">
               <a:rPr lang="en-US" smtClean="0"/>
-              <a:t>3/1/2014</a:t>
+              <a:t>3/3/2014</a:t>
             </a:fld>
             <a:endParaRPr lang="en-US"/>
           </a:p>
@@ -3046,7 +2949,7 @@
           <a:p>
             <a:fld id="{A6C27610-B903-4030-BF6B-58161B6517DA}" type="datetimeFigureOut">
               <a:rPr lang="en-US" smtClean="0"/>
-              <a:t>3/1/2014</a:t>
+              <a:t>3/3/2014</a:t>
             </a:fld>
             <a:endParaRPr lang="en-US"/>
           </a:p>
@@ -3299,7 +3202,7 @@
           <a:p>
             <a:fld id="{A6C27610-B903-4030-BF6B-58161B6517DA}" type="datetimeFigureOut">
               <a:rPr lang="en-US" smtClean="0"/>
-              <a:t>3/1/2014</a:t>
+              <a:t>3/3/2014</a:t>
             </a:fld>
             <a:endParaRPr lang="en-US"/>
           </a:p>
@@ -3512,7 +3415,7 @@
           <a:p>
             <a:fld id="{A6C27610-B903-4030-BF6B-58161B6517DA}" type="datetimeFigureOut">
               <a:rPr lang="en-US" smtClean="0"/>
-              <a:t>3/1/2014</a:t>
+              <a:t>3/3/2014</a:t>
             </a:fld>
             <a:endParaRPr lang="en-US"/>
           </a:p>
@@ -3887,307 +3790,18 @@
           <a:chExt cx="0" cy="0"/>
         </a:xfrm>
       </p:grpSpPr>
-      <p:sp>
-        <p:nvSpPr>
-          <p:cNvPr id="23" name="Text Box 9"/>
-          <p:cNvSpPr txBox="1">
-            <a:spLocks noChangeArrowheads="1"/>
-          </p:cNvSpPr>
-          <p:nvPr/>
-        </p:nvSpPr>
-        <p:spPr bwMode="auto">
-          <a:xfrm>
-            <a:off x="0" y="0"/>
-            <a:ext cx="9144000" cy="584775"/>
-          </a:xfrm>
-          <a:prstGeom prst="rect">
-            <a:avLst/>
-          </a:prstGeom>
-          <a:noFill/>
-          <a:ln w="9525">
-            <a:noFill/>
-            <a:miter lim="800000"/>
-            <a:headEnd/>
-            <a:tailEnd/>
-          </a:ln>
-        </p:spPr>
-        <p:txBody>
-          <a:bodyPr wrap="square">
-            <a:spAutoFit/>
-          </a:bodyPr>
-          <a:lstStyle/>
-          <a:p>
-            <a:pPr marL="228600" indent="-228600" algn="ctr" eaLnBrk="1" hangingPunct="1"/>
-            <a:r>
-              <a:rPr lang="en-US" sz="3200" b="0" dirty="0" smtClean="0">
-                <a:solidFill>
-                  <a:schemeClr val="bg1"/>
-                </a:solidFill>
-              </a:rPr>
-              <a:t>Focal Plane Layout</a:t>
-            </a:r>
-            <a:endParaRPr lang="en-US" sz="3200" b="0" dirty="0">
-              <a:solidFill>
-                <a:schemeClr val="bg1"/>
-              </a:solidFill>
-            </a:endParaRPr>
-          </a:p>
-        </p:txBody>
-      </p:sp>
       <p:grpSp>
         <p:nvGrpSpPr>
-          <p:cNvPr id="2" name="Group 1"/>
+          <p:cNvPr id="7" name="Group 6"/>
           <p:cNvGrpSpPr/>
           <p:nvPr/>
         </p:nvGrpSpPr>
         <p:grpSpPr>
           <a:xfrm>
-            <a:off x="1331322" y="576611"/>
-            <a:ext cx="6096000" cy="6156195"/>
-            <a:chOff x="1331322" y="576611"/>
-            <a:chExt cx="6096000" cy="6156195"/>
-          </a:xfrm>
-        </p:grpSpPr>
-        <p:pic>
-          <p:nvPicPr>
-            <p:cNvPr id="246788" name="Picture 4" descr="E:\beckerd\Documents\thz\SPIEDresden2013\thz_assembly\P1180093-001.JPG"/>
-            <p:cNvPicPr>
-              <a:picLocks noChangeAspect="1" noChangeArrowheads="1"/>
-            </p:cNvPicPr>
-            <p:nvPr/>
-          </p:nvPicPr>
-          <p:blipFill>
-            <a:blip r:embed="rId3" cstate="print">
-              <a:extLst>
-                <a:ext uri="{28A0092B-C50C-407E-A947-70E740481C1C}">
-                  <a14:useLocalDpi xmlns:a14="http://schemas.microsoft.com/office/drawing/2010/main" val="0"/>
-                </a:ext>
-              </a:extLst>
-            </a:blip>
-            <a:srcRect/>
-            <a:stretch>
-              <a:fillRect/>
-            </a:stretch>
-          </p:blipFill>
-          <p:spPr bwMode="auto">
-            <a:xfrm>
-              <a:off x="1331322" y="646331"/>
-              <a:ext cx="6096000" cy="6086475"/>
-            </a:xfrm>
-            <a:prstGeom prst="rect">
-              <a:avLst/>
-            </a:prstGeom>
-            <a:noFill/>
-            <a:extLst>
-              <a:ext uri="{909E8E84-426E-40DD-AFC4-6F175D3DCCD1}">
-                <a14:hiddenFill xmlns:a14="http://schemas.microsoft.com/office/drawing/2010/main">
-                  <a:solidFill>
-                    <a:srgbClr val="FFFFFF"/>
-                  </a:solidFill>
-                </a14:hiddenFill>
-              </a:ext>
-            </a:extLst>
-          </p:spPr>
-        </p:pic>
-        <p:cxnSp>
-          <p:nvCxnSpPr>
-            <p:cNvPr id="5" name="Straight Arrow Connector 4"/>
-            <p:cNvCxnSpPr/>
-            <p:nvPr/>
-          </p:nvCxnSpPr>
-          <p:spPr>
-            <a:xfrm flipV="1">
-              <a:off x="1970906" y="891874"/>
-              <a:ext cx="4928616" cy="2495"/>
-            </a:xfrm>
-            <a:prstGeom prst="straightConnector1">
-              <a:avLst/>
-            </a:prstGeom>
-            <a:ln>
-              <a:solidFill>
-                <a:schemeClr val="tx1"/>
-              </a:solidFill>
-              <a:headEnd type="none"/>
-              <a:tailEnd type="none"/>
-            </a:ln>
-          </p:spPr>
-          <p:style>
-            <a:lnRef idx="2">
-              <a:schemeClr val="accent1"/>
-            </a:lnRef>
-            <a:fillRef idx="0">
-              <a:schemeClr val="accent1"/>
-            </a:fillRef>
-            <a:effectRef idx="1">
-              <a:schemeClr val="accent1"/>
-            </a:effectRef>
-            <a:fontRef idx="minor">
-              <a:schemeClr val="tx1"/>
-            </a:fontRef>
-          </p:style>
-        </p:cxnSp>
-        <p:sp>
-          <p:nvSpPr>
-            <p:cNvPr id="6" name="TextBox 5"/>
-            <p:cNvSpPr txBox="1"/>
-            <p:nvPr/>
-          </p:nvSpPr>
-          <p:spPr>
-            <a:xfrm>
-              <a:off x="4017109" y="576611"/>
-              <a:ext cx="851877" cy="400110"/>
-            </a:xfrm>
-            <a:prstGeom prst="rect">
-              <a:avLst/>
-            </a:prstGeom>
-            <a:noFill/>
-          </p:spPr>
-          <p:txBody>
-            <a:bodyPr wrap="square" rtlCol="0">
-              <a:spAutoFit/>
-            </a:bodyPr>
-            <a:lstStyle/>
-            <a:p>
-              <a:pPr algn="ctr"/>
-              <a:r>
-                <a:rPr lang="en-US" sz="2000" dirty="0" smtClean="0">
-                  <a:solidFill>
-                    <a:schemeClr val="tx1"/>
-                  </a:solidFill>
-                  <a:latin typeface="Palatino Linotype" panose="02040502050505030304" pitchFamily="18" charset="0"/>
-                </a:rPr>
-                <a:t>20 cm</a:t>
-              </a:r>
-              <a:endParaRPr lang="en-US" sz="2000" dirty="0">
-                <a:solidFill>
-                  <a:schemeClr val="tx1"/>
-                </a:solidFill>
-                <a:latin typeface="Palatino Linotype" panose="02040502050505030304" pitchFamily="18" charset="0"/>
-              </a:endParaRPr>
-            </a:p>
-          </p:txBody>
-        </p:sp>
-        <p:cxnSp>
-          <p:nvCxnSpPr>
-            <p:cNvPr id="7" name="Straight Connector 6"/>
-            <p:cNvCxnSpPr/>
-            <p:nvPr/>
-          </p:nvCxnSpPr>
-          <p:spPr>
-            <a:xfrm>
-              <a:off x="6902450" y="784225"/>
-              <a:ext cx="0" cy="200025"/>
-            </a:xfrm>
-            <a:prstGeom prst="line">
-              <a:avLst/>
-            </a:prstGeom>
-            <a:ln>
-              <a:solidFill>
-                <a:schemeClr val="tx1"/>
-              </a:solidFill>
-            </a:ln>
-          </p:spPr>
-          <p:style>
-            <a:lnRef idx="2">
-              <a:schemeClr val="accent1"/>
-            </a:lnRef>
-            <a:fillRef idx="0">
-              <a:schemeClr val="accent1"/>
-            </a:fillRef>
-            <a:effectRef idx="1">
-              <a:schemeClr val="accent1"/>
-            </a:effectRef>
-            <a:fontRef idx="minor">
-              <a:schemeClr val="tx1"/>
-            </a:fontRef>
-          </p:style>
-        </p:cxnSp>
-        <p:cxnSp>
-          <p:nvCxnSpPr>
-            <p:cNvPr id="8" name="Straight Connector 7"/>
-            <p:cNvCxnSpPr/>
-            <p:nvPr/>
-          </p:nvCxnSpPr>
-          <p:spPr>
-            <a:xfrm>
-              <a:off x="1962415" y="793571"/>
-              <a:ext cx="0" cy="200025"/>
-            </a:xfrm>
-            <a:prstGeom prst="line">
-              <a:avLst/>
-            </a:prstGeom>
-            <a:ln>
-              <a:solidFill>
-                <a:schemeClr val="tx1"/>
-              </a:solidFill>
-            </a:ln>
-          </p:spPr>
-          <p:style>
-            <a:lnRef idx="2">
-              <a:schemeClr val="accent1"/>
-            </a:lnRef>
-            <a:fillRef idx="0">
-              <a:schemeClr val="accent1"/>
-            </a:fillRef>
-            <a:effectRef idx="1">
-              <a:schemeClr val="accent1"/>
-            </a:effectRef>
-            <a:fontRef idx="minor">
-              <a:schemeClr val="tx1"/>
-            </a:fontRef>
-          </p:style>
-        </p:cxnSp>
-      </p:grpSp>
-    </p:spTree>
-    <p:extLst>
-      <p:ext uri="{BB962C8B-B14F-4D97-AF65-F5344CB8AC3E}">
-        <p14:creationId xmlns:p14="http://schemas.microsoft.com/office/powerpoint/2010/main" val="1030098831"/>
-      </p:ext>
-    </p:extLst>
-  </p:cSld>
-  <p:clrMapOvr>
-    <a:masterClrMapping/>
-  </p:clrMapOvr>
-  <p:transition/>
-  <p:timing>
-    <p:tnLst>
-      <p:par>
-        <p:cTn id="1" dur="indefinite" restart="never" nodeType="tmRoot"/>
-      </p:par>
-    </p:tnLst>
-  </p:timing>
-</p:sld>
-</file>
-
-<file path=ppt/slides/slide2.xml><?xml version="1.0" encoding="utf-8"?>
-<p:sld xmlns:a="http://schemas.openxmlformats.org/drawingml/2006/main" xmlns:r="http://schemas.openxmlformats.org/officeDocument/2006/relationships" xmlns:p="http://schemas.openxmlformats.org/presentationml/2006/main">
-  <p:cSld>
-    <p:spTree>
-      <p:nvGrpSpPr>
-        <p:cNvPr id="1" name=""/>
-        <p:cNvGrpSpPr/>
-        <p:nvPr/>
-      </p:nvGrpSpPr>
-      <p:grpSpPr>
-        <a:xfrm>
-          <a:off x="0" y="0"/>
-          <a:ext cx="0" cy="0"/>
-          <a:chOff x="0" y="0"/>
-          <a:chExt cx="0" cy="0"/>
-        </a:xfrm>
-      </p:grpSpPr>
-      <p:grpSp>
-        <p:nvGrpSpPr>
-          <p:cNvPr id="4" name="Group 3"/>
-          <p:cNvGrpSpPr/>
-          <p:nvPr/>
-        </p:nvGrpSpPr>
-        <p:grpSpPr>
-          <a:xfrm>
-            <a:off x="850892" y="1824335"/>
-            <a:ext cx="7619919" cy="2141202"/>
-            <a:chOff x="850892" y="1824335"/>
-            <a:chExt cx="7619919" cy="2141202"/>
+            <a:off x="241991" y="1544672"/>
+            <a:ext cx="8706694" cy="5074885"/>
+            <a:chOff x="241991" y="1544672"/>
+            <a:chExt cx="8706694" cy="5074885"/>
           </a:xfrm>
         </p:grpSpPr>
         <p:sp>
@@ -4200,8 +3814,8 @@
           </p:nvSpPr>
           <p:spPr bwMode="auto">
             <a:xfrm>
-              <a:off x="2956899" y="2800034"/>
-              <a:ext cx="3394075" cy="47625"/>
+              <a:off x="3218368" y="4795520"/>
+              <a:ext cx="2743200" cy="47625"/>
             </a:xfrm>
             <a:prstGeom prst="rect">
               <a:avLst/>
@@ -4240,58 +3854,14 @@
         </p:sp>
         <p:sp>
           <p:nvSpPr>
-            <p:cNvPr id="38" name="Rectangle 37"/>
-            <p:cNvSpPr/>
-            <p:nvPr/>
-          </p:nvSpPr>
-          <p:spPr bwMode="auto">
-            <a:xfrm>
-              <a:off x="6350975" y="2800034"/>
-              <a:ext cx="2066924" cy="771525"/>
-            </a:xfrm>
-            <a:prstGeom prst="rect">
-              <a:avLst/>
-            </a:prstGeom>
-            <a:solidFill>
-              <a:schemeClr val="bg1">
-                <a:lumMod val="50000"/>
-              </a:schemeClr>
-            </a:solidFill>
-            <a:ln w="9525" cap="flat" cmpd="sng" algn="ctr">
-              <a:noFill/>
-              <a:prstDash val="solid"/>
-              <a:round/>
-              <a:headEnd type="none" w="med" len="med"/>
-              <a:tailEnd type="none" w="med" len="med"/>
-            </a:ln>
-            <a:effectLst/>
-          </p:spPr>
-          <p:txBody>
-            <a:bodyPr wrap="square">
-              <a:spAutoFit/>
-            </a:bodyPr>
-            <a:lstStyle/>
-            <a:p>
-              <a:pPr>
-                <a:defRPr/>
-              </a:pPr>
-              <a:endParaRPr lang="en-US">
-                <a:latin typeface="Arial" charset="0"/>
-                <a:ea typeface="+mn-ea"/>
-              </a:endParaRPr>
-            </a:p>
-          </p:txBody>
-        </p:sp>
-        <p:sp>
-          <p:nvSpPr>
             <p:cNvPr id="39" name="Rectangle 38"/>
             <p:cNvSpPr/>
             <p:nvPr/>
           </p:nvSpPr>
           <p:spPr bwMode="auto">
             <a:xfrm>
-              <a:off x="850893" y="2800034"/>
-              <a:ext cx="2108200" cy="771525"/>
+              <a:off x="245969" y="4791955"/>
+              <a:ext cx="2971800" cy="914400"/>
             </a:xfrm>
             <a:prstGeom prst="rect">
               <a:avLst/>
@@ -4336,8 +3906,8 @@
           </p:nvSpPr>
           <p:spPr bwMode="auto">
             <a:xfrm>
-              <a:off x="850893" y="2942464"/>
-              <a:ext cx="2106007" cy="461665"/>
+              <a:off x="241991" y="5017125"/>
+              <a:ext cx="2979231" cy="461665"/>
             </a:xfrm>
             <a:prstGeom prst="rect">
               <a:avLst/>
@@ -4379,7 +3949,7 @@
           </p:nvSpPr>
           <p:spPr bwMode="auto">
             <a:xfrm>
-              <a:off x="3998291" y="2957086"/>
+              <a:off x="3586894" y="5243492"/>
               <a:ext cx="2334395" cy="461665"/>
             </a:xfrm>
             <a:prstGeom prst="rect">
@@ -4429,9 +3999,9 @@
             <p:nvPr/>
           </p:nvSpPr>
           <p:spPr bwMode="auto">
-            <a:xfrm flipH="1" flipV="1">
-              <a:off x="3615709" y="2885758"/>
-              <a:ext cx="400869" cy="223202"/>
+            <a:xfrm flipV="1">
+              <a:off x="4270248" y="4781555"/>
+              <a:ext cx="278342" cy="235570"/>
             </a:xfrm>
             <a:prstGeom prst="line">
               <a:avLst/>
@@ -4464,8 +4034,8 @@
           </p:nvSpPr>
           <p:spPr>
             <a:xfrm>
-              <a:off x="3150574" y="2706986"/>
-              <a:ext cx="2971800" cy="97181"/>
+              <a:off x="3221222" y="4693562"/>
+              <a:ext cx="2743200" cy="97181"/>
             </a:xfrm>
             <a:prstGeom prst="rect">
               <a:avLst/>
@@ -4510,7 +4080,7 @@
           </p:nvSpPr>
           <p:spPr>
             <a:xfrm>
-              <a:off x="4418983" y="2779436"/>
+              <a:off x="4366229" y="4767693"/>
               <a:ext cx="447478" cy="18288"/>
             </a:xfrm>
             <a:prstGeom prst="rect">
@@ -4549,8 +4119,8 @@
           </p:nvSpPr>
           <p:spPr bwMode="auto">
             <a:xfrm>
-              <a:off x="850893" y="3502759"/>
-              <a:ext cx="7567005" cy="457200"/>
+              <a:off x="245969" y="5705157"/>
+              <a:ext cx="8695953" cy="914400"/>
             </a:xfrm>
             <a:prstGeom prst="rect">
               <a:avLst/>
@@ -4576,7 +4146,7 @@
               <a:pPr>
                 <a:defRPr/>
               </a:pPr>
-              <a:endParaRPr lang="en-US">
+              <a:endParaRPr lang="en-US" dirty="0">
                 <a:latin typeface="Arial" charset="0"/>
                 <a:ea typeface="+mn-ea"/>
               </a:endParaRPr>
@@ -4593,8 +4163,8 @@
           </p:nvSpPr>
           <p:spPr bwMode="auto">
             <a:xfrm>
-              <a:off x="850892" y="3503872"/>
-              <a:ext cx="7567005" cy="461665"/>
+              <a:off x="241991" y="5931525"/>
+              <a:ext cx="8695953" cy="461665"/>
             </a:xfrm>
             <a:prstGeom prst="rect">
               <a:avLst/>
@@ -4660,8 +4230,8 @@
           </p:nvSpPr>
           <p:spPr bwMode="auto">
             <a:xfrm>
-              <a:off x="4866461" y="1824335"/>
-              <a:ext cx="3604350" cy="461665"/>
+              <a:off x="3552197" y="3425108"/>
+              <a:ext cx="2359948" cy="830997"/>
             </a:xfrm>
             <a:prstGeom prst="rect">
               <a:avLst/>
@@ -4700,16 +4270,64 @@
         </p:sp>
         <p:sp>
           <p:nvSpPr>
-            <p:cNvPr id="24" name="Line 20"/>
+            <p:cNvPr id="25" name="TextBox 42"/>
+            <p:cNvSpPr txBox="1">
+              <a:spLocks noChangeArrowheads="1"/>
+            </p:cNvSpPr>
+            <p:nvPr/>
+          </p:nvSpPr>
+          <p:spPr bwMode="auto">
+            <a:xfrm>
+              <a:off x="3181193" y="4822868"/>
+              <a:ext cx="1279101" cy="461665"/>
+            </a:xfrm>
+            <a:prstGeom prst="rect">
+              <a:avLst/>
+            </a:prstGeom>
+            <a:noFill/>
+            <a:ln w="9525">
+              <a:noFill/>
+              <a:miter lim="800000"/>
+              <a:headEnd/>
+              <a:tailEnd/>
+            </a:ln>
+          </p:spPr>
+          <p:txBody>
+            <a:bodyPr wrap="square">
+              <a:spAutoFit/>
+            </a:bodyPr>
+            <a:lstStyle/>
+            <a:p>
+              <a:r>
+                <a:rPr lang="en-US" sz="2400" b="0" dirty="0" smtClean="0">
+                  <a:solidFill>
+                    <a:srgbClr val="000000"/>
+                  </a:solidFill>
+                  <a:latin typeface="Palatino Linotype" panose="02040502050505030304" pitchFamily="18" charset="0"/>
+                </a:rPr>
+                <a:t>Al TES</a:t>
+              </a:r>
+              <a:endParaRPr lang="en-US" sz="2400" b="0" dirty="0">
+                <a:solidFill>
+                  <a:srgbClr val="000000"/>
+                </a:solidFill>
+                <a:latin typeface="Palatino Linotype" panose="02040502050505030304" pitchFamily="18" charset="0"/>
+              </a:endParaRPr>
+            </a:p>
+          </p:txBody>
+        </p:sp>
+        <p:sp>
+          <p:nvSpPr>
+            <p:cNvPr id="26" name="Line 20"/>
             <p:cNvSpPr>
               <a:spLocks noChangeShapeType="1"/>
             </p:cNvSpPr>
             <p:nvPr/>
           </p:nvSpPr>
           <p:spPr bwMode="auto">
-            <a:xfrm flipH="1">
-              <a:off x="5906014" y="2286000"/>
-              <a:ext cx="444960" cy="420985"/>
+            <a:xfrm>
+              <a:off x="5212081" y="4256104"/>
+              <a:ext cx="0" cy="486047"/>
             </a:xfrm>
             <a:prstGeom prst="line">
               <a:avLst/>
@@ -4736,27 +4354,73 @@
         </p:sp>
         <p:sp>
           <p:nvSpPr>
-            <p:cNvPr id="25" name="TextBox 42"/>
-            <p:cNvSpPr txBox="1">
-              <a:spLocks noChangeArrowheads="1"/>
-            </p:cNvSpPr>
+            <p:cNvPr id="27" name="Rectangle 26"/>
+            <p:cNvSpPr/>
             <p:nvPr/>
           </p:nvSpPr>
           <p:spPr bwMode="auto">
             <a:xfrm>
-              <a:off x="2889504" y="1932723"/>
-              <a:ext cx="1279101" cy="461665"/>
+              <a:off x="5967948" y="4790758"/>
+              <a:ext cx="2971800" cy="914400"/>
             </a:xfrm>
             <a:prstGeom prst="rect">
               <a:avLst/>
             </a:prstGeom>
-            <a:noFill/>
-            <a:ln w="9525">
+            <a:solidFill>
+              <a:schemeClr val="bg1">
+                <a:lumMod val="50000"/>
+              </a:schemeClr>
+            </a:solidFill>
+            <a:ln w="9525" cap="flat" cmpd="sng" algn="ctr">
               <a:noFill/>
-              <a:miter lim="800000"/>
-              <a:headEnd/>
-              <a:tailEnd/>
+              <a:prstDash val="solid"/>
+              <a:round/>
+              <a:headEnd type="none" w="med" len="med"/>
+              <a:tailEnd type="none" w="med" len="med"/>
             </a:ln>
+            <a:effectLst/>
+          </p:spPr>
+          <p:txBody>
+            <a:bodyPr>
+              <a:spAutoFit/>
+            </a:bodyPr>
+            <a:lstStyle/>
+            <a:p>
+              <a:pPr>
+                <a:defRPr/>
+              </a:pPr>
+              <a:endParaRPr lang="en-US">
+                <a:latin typeface="Arial" charset="0"/>
+                <a:ea typeface="+mn-ea"/>
+              </a:endParaRPr>
+            </a:p>
+          </p:txBody>
+        </p:sp>
+        <p:sp>
+          <p:nvSpPr>
+            <p:cNvPr id="28" name="Rectangle 27"/>
+            <p:cNvSpPr/>
+            <p:nvPr/>
+          </p:nvSpPr>
+          <p:spPr bwMode="auto">
+            <a:xfrm>
+              <a:off x="245544" y="1586771"/>
+              <a:ext cx="3341350" cy="2743200"/>
+            </a:xfrm>
+            <a:prstGeom prst="rect">
+              <a:avLst/>
+            </a:prstGeom>
+            <a:solidFill>
+              <a:schemeClr val="accent6"/>
+            </a:solidFill>
+            <a:ln w="9525" cap="flat" cmpd="sng" algn="ctr">
+              <a:noFill/>
+              <a:prstDash val="solid"/>
+              <a:round/>
+              <a:headEnd type="none" w="med" len="med"/>
+              <a:tailEnd type="none" w="med" len="med"/>
+            </a:ln>
+            <a:effectLst/>
           </p:spPr>
           <p:txBody>
             <a:bodyPr wrap="square">
@@ -4764,36 +4428,70 @@
             </a:bodyPr>
             <a:lstStyle/>
             <a:p>
-              <a:r>
-                <a:rPr lang="en-US" sz="2400" b="0" dirty="0" smtClean="0">
-                  <a:solidFill>
-                    <a:srgbClr val="000000"/>
-                  </a:solidFill>
-                  <a:latin typeface="Palatino Linotype" panose="02040502050505030304" pitchFamily="18" charset="0"/>
-                </a:rPr>
-                <a:t>Al TES</a:t>
-              </a:r>
-              <a:endParaRPr lang="en-US" sz="2400" b="0" dirty="0">
-                <a:solidFill>
-                  <a:srgbClr val="000000"/>
-                </a:solidFill>
-                <a:latin typeface="Palatino Linotype" panose="02040502050505030304" pitchFamily="18" charset="0"/>
+              <a:pPr>
+                <a:defRPr/>
+              </a:pPr>
+              <a:endParaRPr lang="en-US" dirty="0">
+                <a:latin typeface="Arial" charset="0"/>
+                <a:ea typeface="+mn-ea"/>
               </a:endParaRPr>
             </a:p>
           </p:txBody>
         </p:sp>
         <p:sp>
           <p:nvSpPr>
-            <p:cNvPr id="26" name="Line 20"/>
+            <p:cNvPr id="31" name="Rectangle 30"/>
+            <p:cNvSpPr/>
+            <p:nvPr/>
+          </p:nvSpPr>
+          <p:spPr bwMode="auto">
+            <a:xfrm>
+              <a:off x="5580286" y="1586771"/>
+              <a:ext cx="3368399" cy="2743200"/>
+            </a:xfrm>
+            <a:prstGeom prst="rect">
+              <a:avLst/>
+            </a:prstGeom>
+            <a:solidFill>
+              <a:schemeClr val="accent6"/>
+            </a:solidFill>
+            <a:ln w="9525" cap="flat" cmpd="sng" algn="ctr">
+              <a:noFill/>
+              <a:prstDash val="solid"/>
+              <a:round/>
+              <a:headEnd type="none" w="med" len="med"/>
+              <a:tailEnd type="none" w="med" len="med"/>
+            </a:ln>
+            <a:effectLst/>
+          </p:spPr>
+          <p:txBody>
+            <a:bodyPr wrap="square">
+              <a:spAutoFit/>
+            </a:bodyPr>
+            <a:lstStyle/>
+            <a:p>
+              <a:pPr>
+                <a:defRPr/>
+              </a:pPr>
+              <a:endParaRPr lang="en-US" dirty="0">
+                <a:latin typeface="Arial" charset="0"/>
+                <a:ea typeface="+mn-ea"/>
+              </a:endParaRPr>
+            </a:p>
+          </p:txBody>
+        </p:sp>
+        <p:sp>
+          <p:nvSpPr>
+            <p:cNvPr id="24" name="Line 20"/>
             <p:cNvSpPr>
               <a:spLocks noChangeShapeType="1"/>
             </p:cNvSpPr>
             <p:nvPr/>
           </p:nvSpPr>
           <p:spPr bwMode="auto">
-            <a:xfrm>
-              <a:off x="4087368" y="2286000"/>
-              <a:ext cx="555354" cy="511724"/>
+            <a:xfrm flipV="1">
+              <a:off x="5678272" y="4843144"/>
+              <a:ext cx="164744" cy="524383"/>
             </a:xfrm>
             <a:prstGeom prst="line">
               <a:avLst/>
@@ -4818,6 +4516,405 @@
             </a:p>
           </p:txBody>
         </p:sp>
+        <p:sp>
+          <p:nvSpPr>
+            <p:cNvPr id="32" name="TextBox 42"/>
+            <p:cNvSpPr txBox="1">
+              <a:spLocks noChangeArrowheads="1"/>
+            </p:cNvSpPr>
+            <p:nvPr/>
+          </p:nvSpPr>
+          <p:spPr bwMode="auto">
+            <a:xfrm>
+              <a:off x="245969" y="4329971"/>
+              <a:ext cx="2972398" cy="461665"/>
+            </a:xfrm>
+            <a:prstGeom prst="rect">
+              <a:avLst/>
+            </a:prstGeom>
+            <a:noFill/>
+            <a:ln w="9525">
+              <a:noFill/>
+              <a:miter lim="800000"/>
+              <a:headEnd/>
+              <a:tailEnd/>
+            </a:ln>
+          </p:spPr>
+          <p:txBody>
+            <a:bodyPr wrap="square">
+              <a:spAutoFit/>
+            </a:bodyPr>
+            <a:lstStyle/>
+            <a:p>
+              <a:pPr algn="ctr"/>
+              <a:r>
+                <a:rPr lang="en-US" sz="2400" b="0" dirty="0" smtClean="0">
+                  <a:solidFill>
+                    <a:srgbClr val="000000"/>
+                  </a:solidFill>
+                  <a:latin typeface="Palatino Linotype" panose="02040502050505030304" pitchFamily="18" charset="0"/>
+                </a:rPr>
+                <a:t>Air gap</a:t>
+              </a:r>
+              <a:endParaRPr lang="en-US" sz="2400" b="0" dirty="0">
+                <a:solidFill>
+                  <a:srgbClr val="000000"/>
+                </a:solidFill>
+                <a:latin typeface="Palatino Linotype" panose="02040502050505030304" pitchFamily="18" charset="0"/>
+              </a:endParaRPr>
+            </a:p>
+          </p:txBody>
+        </p:sp>
+        <p:sp>
+          <p:nvSpPr>
+            <p:cNvPr id="33" name="TextBox 42"/>
+            <p:cNvSpPr txBox="1">
+              <a:spLocks noChangeArrowheads="1"/>
+            </p:cNvSpPr>
+            <p:nvPr/>
+          </p:nvSpPr>
+          <p:spPr bwMode="auto">
+            <a:xfrm>
+              <a:off x="300132" y="2573086"/>
+              <a:ext cx="3286761" cy="461665"/>
+            </a:xfrm>
+            <a:prstGeom prst="rect">
+              <a:avLst/>
+            </a:prstGeom>
+            <a:noFill/>
+            <a:ln w="9525">
+              <a:noFill/>
+              <a:miter lim="800000"/>
+              <a:headEnd/>
+              <a:tailEnd/>
+            </a:ln>
+          </p:spPr>
+          <p:txBody>
+            <a:bodyPr wrap="square">
+              <a:spAutoFit/>
+            </a:bodyPr>
+            <a:lstStyle/>
+            <a:p>
+              <a:pPr algn="ctr"/>
+              <a:r>
+                <a:rPr lang="en-US" sz="2400" b="0" dirty="0" err="1" smtClean="0">
+                  <a:solidFill>
+                    <a:srgbClr val="000000"/>
+                  </a:solidFill>
+                  <a:latin typeface="Palatino Linotype" panose="02040502050505030304" pitchFamily="18" charset="0"/>
+                </a:rPr>
+                <a:t>Feedhorn</a:t>
+              </a:r>
+              <a:r>
+                <a:rPr lang="en-US" sz="2400" b="0" dirty="0" smtClean="0">
+                  <a:solidFill>
+                    <a:srgbClr val="000000"/>
+                  </a:solidFill>
+                  <a:latin typeface="Palatino Linotype" panose="02040502050505030304" pitchFamily="18" charset="0"/>
+                </a:rPr>
+                <a:t> Array</a:t>
+              </a:r>
+              <a:endParaRPr lang="en-US" sz="2400" b="0" dirty="0">
+                <a:solidFill>
+                  <a:srgbClr val="000000"/>
+                </a:solidFill>
+                <a:latin typeface="Palatino Linotype" panose="02040502050505030304" pitchFamily="18" charset="0"/>
+              </a:endParaRPr>
+            </a:p>
+          </p:txBody>
+        </p:sp>
+        <p:sp>
+          <p:nvSpPr>
+            <p:cNvPr id="34" name="TextBox 42"/>
+            <p:cNvSpPr txBox="1">
+              <a:spLocks noChangeArrowheads="1"/>
+            </p:cNvSpPr>
+            <p:nvPr/>
+          </p:nvSpPr>
+          <p:spPr bwMode="auto">
+            <a:xfrm>
+              <a:off x="5580286" y="2573086"/>
+              <a:ext cx="3313401" cy="461665"/>
+            </a:xfrm>
+            <a:prstGeom prst="rect">
+              <a:avLst/>
+            </a:prstGeom>
+            <a:noFill/>
+            <a:ln w="9525">
+              <a:noFill/>
+              <a:miter lim="800000"/>
+              <a:headEnd/>
+              <a:tailEnd/>
+            </a:ln>
+          </p:spPr>
+          <p:txBody>
+            <a:bodyPr wrap="square">
+              <a:spAutoFit/>
+            </a:bodyPr>
+            <a:lstStyle/>
+            <a:p>
+              <a:pPr algn="ctr"/>
+              <a:r>
+                <a:rPr lang="en-US" sz="2400" b="0" dirty="0" err="1" smtClean="0">
+                  <a:solidFill>
+                    <a:srgbClr val="000000"/>
+                  </a:solidFill>
+                  <a:latin typeface="Palatino Linotype" panose="02040502050505030304" pitchFamily="18" charset="0"/>
+                </a:rPr>
+                <a:t>Feedhorn</a:t>
+              </a:r>
+              <a:r>
+                <a:rPr lang="en-US" sz="2400" b="0" dirty="0" smtClean="0">
+                  <a:solidFill>
+                    <a:srgbClr val="000000"/>
+                  </a:solidFill>
+                  <a:latin typeface="Palatino Linotype" panose="02040502050505030304" pitchFamily="18" charset="0"/>
+                </a:rPr>
+                <a:t> Array</a:t>
+              </a:r>
+              <a:endParaRPr lang="en-US" sz="2400" b="0" dirty="0">
+                <a:solidFill>
+                  <a:srgbClr val="000000"/>
+                </a:solidFill>
+                <a:latin typeface="Palatino Linotype" panose="02040502050505030304" pitchFamily="18" charset="0"/>
+              </a:endParaRPr>
+            </a:p>
+          </p:txBody>
+        </p:sp>
+        <p:sp>
+          <p:nvSpPr>
+            <p:cNvPr id="36" name="Line 20"/>
+            <p:cNvSpPr>
+              <a:spLocks noChangeShapeType="1"/>
+            </p:cNvSpPr>
+            <p:nvPr/>
+          </p:nvSpPr>
+          <p:spPr bwMode="auto">
+            <a:xfrm flipH="1">
+              <a:off x="3586893" y="1986759"/>
+              <a:ext cx="1993391" cy="0"/>
+            </a:xfrm>
+            <a:prstGeom prst="line">
+              <a:avLst/>
+            </a:prstGeom>
+            <a:noFill/>
+            <a:ln w="28575">
+              <a:solidFill>
+                <a:srgbClr val="000000"/>
+              </a:solidFill>
+              <a:round/>
+              <a:headEnd type="stealth" w="lg" len="lg"/>
+              <a:tailEnd type="stealth" w="lg" len="lg"/>
+            </a:ln>
+          </p:spPr>
+          <p:txBody>
+            <a:bodyPr wrap="square">
+              <a:spAutoFit/>
+            </a:bodyPr>
+            <a:lstStyle/>
+            <a:p>
+              <a:endParaRPr lang="en-US"/>
+            </a:p>
+          </p:txBody>
+        </p:sp>
+        <p:sp>
+          <p:nvSpPr>
+            <p:cNvPr id="37" name="Text Box 121"/>
+            <p:cNvSpPr txBox="1">
+              <a:spLocks noChangeAspect="1" noChangeArrowheads="1"/>
+            </p:cNvSpPr>
+            <p:nvPr/>
+          </p:nvSpPr>
+          <p:spPr bwMode="auto">
+            <a:xfrm>
+              <a:off x="3586894" y="1544672"/>
+              <a:ext cx="1993392" cy="460375"/>
+            </a:xfrm>
+            <a:prstGeom prst="rect">
+              <a:avLst/>
+            </a:prstGeom>
+            <a:noFill/>
+            <a:ln>
+              <a:noFill/>
+            </a:ln>
+            <a:extLst>
+              <a:ext uri="{909E8E84-426E-40DD-AFC4-6F175D3DCCD1}">
+                <a14:hiddenFill xmlns:a14="http://schemas.microsoft.com/office/drawing/2010/main">
+                  <a:solidFill>
+                    <a:srgbClr val="FFFFFF"/>
+                  </a:solidFill>
+                </a14:hiddenFill>
+              </a:ext>
+              <a:ext uri="{91240B29-F687-4F45-9708-019B960494DF}">
+                <a14:hiddenLine xmlns:a14="http://schemas.microsoft.com/office/drawing/2010/main" w="9525">
+                  <a:solidFill>
+                    <a:srgbClr val="000000"/>
+                  </a:solidFill>
+                  <a:miter lim="800000"/>
+                  <a:headEnd/>
+                  <a:tailEnd/>
+                </a14:hiddenLine>
+              </a:ext>
+            </a:extLst>
+          </p:spPr>
+          <p:txBody>
+            <a:bodyPr wrap="square">
+              <a:spAutoFit/>
+            </a:bodyPr>
+            <a:lstStyle>
+              <a:lvl1pPr defTabSz="4389438">
+                <a:defRPr b="1">
+                  <a:solidFill>
+                    <a:srgbClr val="CCCC00"/>
+                  </a:solidFill>
+                  <a:latin typeface="Arial" charset="0"/>
+                  <a:ea typeface="ＭＳ Ｐゴシック" pitchFamily="34" charset="-128"/>
+                </a:defRPr>
+              </a:lvl1pPr>
+              <a:lvl2pPr marL="742950" indent="-285750" defTabSz="4389438">
+                <a:defRPr b="1">
+                  <a:solidFill>
+                    <a:srgbClr val="CCCC00"/>
+                  </a:solidFill>
+                  <a:latin typeface="Arial" charset="0"/>
+                  <a:ea typeface="ＭＳ Ｐゴシック" pitchFamily="34" charset="-128"/>
+                </a:defRPr>
+              </a:lvl2pPr>
+              <a:lvl3pPr marL="1143000" indent="-228600" defTabSz="4389438">
+                <a:defRPr b="1">
+                  <a:solidFill>
+                    <a:srgbClr val="CCCC00"/>
+                  </a:solidFill>
+                  <a:latin typeface="Arial" charset="0"/>
+                  <a:ea typeface="ＭＳ Ｐゴシック" pitchFamily="34" charset="-128"/>
+                </a:defRPr>
+              </a:lvl3pPr>
+              <a:lvl4pPr marL="1600200" indent="-228600" defTabSz="4389438">
+                <a:defRPr b="1">
+                  <a:solidFill>
+                    <a:srgbClr val="CCCC00"/>
+                  </a:solidFill>
+                  <a:latin typeface="Arial" charset="0"/>
+                  <a:ea typeface="ＭＳ Ｐゴシック" pitchFamily="34" charset="-128"/>
+                </a:defRPr>
+              </a:lvl4pPr>
+              <a:lvl5pPr marL="2057400" indent="-228600" defTabSz="4389438">
+                <a:defRPr b="1">
+                  <a:solidFill>
+                    <a:srgbClr val="CCCC00"/>
+                  </a:solidFill>
+                  <a:latin typeface="Arial" charset="0"/>
+                  <a:ea typeface="ＭＳ Ｐゴシック" pitchFamily="34" charset="-128"/>
+                </a:defRPr>
+              </a:lvl5pPr>
+              <a:lvl6pPr marL="2514600" indent="-228600" defTabSz="4389438" eaLnBrk="0" fontAlgn="base" hangingPunct="0">
+                <a:spcBef>
+                  <a:spcPct val="50000"/>
+                </a:spcBef>
+                <a:spcAft>
+                  <a:spcPct val="0"/>
+                </a:spcAft>
+                <a:defRPr b="1">
+                  <a:solidFill>
+                    <a:srgbClr val="CCCC00"/>
+                  </a:solidFill>
+                  <a:latin typeface="Arial" charset="0"/>
+                  <a:ea typeface="ＭＳ Ｐゴシック" pitchFamily="34" charset="-128"/>
+                </a:defRPr>
+              </a:lvl6pPr>
+              <a:lvl7pPr marL="2971800" indent="-228600" defTabSz="4389438" eaLnBrk="0" fontAlgn="base" hangingPunct="0">
+                <a:spcBef>
+                  <a:spcPct val="50000"/>
+                </a:spcBef>
+                <a:spcAft>
+                  <a:spcPct val="0"/>
+                </a:spcAft>
+                <a:defRPr b="1">
+                  <a:solidFill>
+                    <a:srgbClr val="CCCC00"/>
+                  </a:solidFill>
+                  <a:latin typeface="Arial" charset="0"/>
+                  <a:ea typeface="ＭＳ Ｐゴシック" pitchFamily="34" charset="-128"/>
+                </a:defRPr>
+              </a:lvl7pPr>
+              <a:lvl8pPr marL="3429000" indent="-228600" defTabSz="4389438" eaLnBrk="0" fontAlgn="base" hangingPunct="0">
+                <a:spcBef>
+                  <a:spcPct val="50000"/>
+                </a:spcBef>
+                <a:spcAft>
+                  <a:spcPct val="0"/>
+                </a:spcAft>
+                <a:defRPr b="1">
+                  <a:solidFill>
+                    <a:srgbClr val="CCCC00"/>
+                  </a:solidFill>
+                  <a:latin typeface="Arial" charset="0"/>
+                  <a:ea typeface="ＭＳ Ｐゴシック" pitchFamily="34" charset="-128"/>
+                </a:defRPr>
+              </a:lvl8pPr>
+              <a:lvl9pPr marL="3886200" indent="-228600" defTabSz="4389438" eaLnBrk="0" fontAlgn="base" hangingPunct="0">
+                <a:spcBef>
+                  <a:spcPct val="50000"/>
+                </a:spcBef>
+                <a:spcAft>
+                  <a:spcPct val="0"/>
+                </a:spcAft>
+                <a:defRPr b="1">
+                  <a:solidFill>
+                    <a:srgbClr val="CCCC00"/>
+                  </a:solidFill>
+                  <a:latin typeface="Arial" charset="0"/>
+                  <a:ea typeface="ＭＳ Ｐゴシック" pitchFamily="34" charset="-128"/>
+                </a:defRPr>
+              </a:lvl9pPr>
+            </a:lstStyle>
+            <a:p>
+              <a:pPr algn="ctr" eaLnBrk="1" hangingPunct="1"/>
+              <a:r>
+                <a:rPr lang="en-US" altLang="en-US" sz="2400" b="0" dirty="0">
+                  <a:solidFill>
+                    <a:srgbClr val="000000"/>
+                  </a:solidFill>
+                  <a:latin typeface="Palatino Linotype" panose="02040502050505030304" pitchFamily="18" charset="0"/>
+                </a:rPr>
+                <a:t>6</a:t>
+              </a:r>
+              <a:r>
+                <a:rPr lang="en-US" altLang="en-US" sz="2400" b="0" dirty="0" smtClean="0">
+                  <a:solidFill>
+                    <a:srgbClr val="000000"/>
+                  </a:solidFill>
+                  <a:latin typeface="Palatino Linotype" panose="02040502050505030304" pitchFamily="18" charset="0"/>
+                </a:rPr>
+                <a:t>00 </a:t>
+              </a:r>
+              <a:r>
+                <a:rPr lang="el-GR" altLang="en-US" sz="2400" b="0" dirty="0" smtClean="0">
+                  <a:solidFill>
+                    <a:srgbClr val="000000"/>
+                  </a:solidFill>
+                  <a:latin typeface="Palatino Linotype" panose="02040502050505030304" pitchFamily="18" charset="0"/>
+                </a:rPr>
+                <a:t>μ</a:t>
+              </a:r>
+              <a:r>
+                <a:rPr lang="en-US" altLang="en-US" sz="2400" b="0" dirty="0" smtClean="0">
+                  <a:solidFill>
+                    <a:srgbClr val="000000"/>
+                  </a:solidFill>
+                  <a:latin typeface="Palatino Linotype" panose="02040502050505030304" pitchFamily="18" charset="0"/>
+                </a:rPr>
+                <a:t>m</a:t>
+              </a:r>
+              <a:endParaRPr lang="en-US" altLang="en-US" sz="2400" b="0" dirty="0">
+                <a:solidFill>
+                  <a:srgbClr val="000000"/>
+                </a:solidFill>
+                <a:latin typeface="Palatino Linotype" panose="02040502050505030304" pitchFamily="18" charset="0"/>
+              </a:endParaRPr>
+            </a:p>
+          </p:txBody>
+        </p:sp>
       </p:grpSp>
     </p:spTree>
     <p:extLst>
@@ -4839,7 +4936,7 @@
 </p:sld>
 </file>
 
-<file path=ppt/slides/slide3.xml><?xml version="1.0" encoding="utf-8"?>
+<file path=ppt/slides/slide2.xml><?xml version="1.0" encoding="utf-8"?>
 <p:sld xmlns:a="http://schemas.openxmlformats.org/drawingml/2006/main" xmlns:r="http://schemas.openxmlformats.org/officeDocument/2006/relationships" xmlns:p="http://schemas.openxmlformats.org/presentationml/2006/main">
   <p:cSld>
     <p:spTree>

</xml_diff>

<commit_message>
working on image contrast predictions
</commit_message>
<xml_diff>
--- a/support/thesis-drawings.pptx
+++ b/support/thesis-drawings.pptx
@@ -5,11 +5,12 @@
     <p:sldMasterId id="2147483648" r:id="rId1"/>
   </p:sldMasterIdLst>
   <p:notesMasterIdLst>
-    <p:notesMasterId r:id="rId4"/>
+    <p:notesMasterId r:id="rId5"/>
   </p:notesMasterIdLst>
   <p:sldIdLst>
     <p:sldId id="258" r:id="rId2"/>
     <p:sldId id="257" r:id="rId3"/>
+    <p:sldId id="259" r:id="rId4"/>
   </p:sldIdLst>
   <p:sldSz cx="9144000" cy="6858000" type="screen4x3"/>
   <p:notesSz cx="6858000" cy="9144000"/>
@@ -193,7 +194,7 @@
           <a:p>
             <a:fld id="{FE111C9F-A33E-4952-BC38-37E17DCB4FBF}" type="datetimeFigureOut">
               <a:rPr lang="en-US" smtClean="0"/>
-              <a:t>3/3/2014</a:t>
+              <a:t>3/11/2014</a:t>
             </a:fld>
             <a:endParaRPr lang="en-US"/>
           </a:p>
@@ -983,7 +984,7 @@
           <a:p>
             <a:fld id="{A6C27610-B903-4030-BF6B-58161B6517DA}" type="datetimeFigureOut">
               <a:rPr lang="en-US" smtClean="0"/>
-              <a:t>3/3/2014</a:t>
+              <a:t>3/11/2014</a:t>
             </a:fld>
             <a:endParaRPr lang="en-US"/>
           </a:p>
@@ -1153,7 +1154,7 @@
           <a:p>
             <a:fld id="{A6C27610-B903-4030-BF6B-58161B6517DA}" type="datetimeFigureOut">
               <a:rPr lang="en-US" smtClean="0"/>
-              <a:t>3/3/2014</a:t>
+              <a:t>3/11/2014</a:t>
             </a:fld>
             <a:endParaRPr lang="en-US"/>
           </a:p>
@@ -1333,7 +1334,7 @@
           <a:p>
             <a:fld id="{A6C27610-B903-4030-BF6B-58161B6517DA}" type="datetimeFigureOut">
               <a:rPr lang="en-US" smtClean="0"/>
-              <a:t>3/3/2014</a:t>
+              <a:t>3/11/2014</a:t>
             </a:fld>
             <a:endParaRPr lang="en-US"/>
           </a:p>
@@ -1503,7 +1504,7 @@
           <a:p>
             <a:fld id="{A6C27610-B903-4030-BF6B-58161B6517DA}" type="datetimeFigureOut">
               <a:rPr lang="en-US" smtClean="0"/>
-              <a:t>3/3/2014</a:t>
+              <a:t>3/11/2014</a:t>
             </a:fld>
             <a:endParaRPr lang="en-US"/>
           </a:p>
@@ -1749,7 +1750,7 @@
           <a:p>
             <a:fld id="{A6C27610-B903-4030-BF6B-58161B6517DA}" type="datetimeFigureOut">
               <a:rPr lang="en-US" smtClean="0"/>
-              <a:t>3/3/2014</a:t>
+              <a:t>3/11/2014</a:t>
             </a:fld>
             <a:endParaRPr lang="en-US"/>
           </a:p>
@@ -2037,7 +2038,7 @@
           <a:p>
             <a:fld id="{A6C27610-B903-4030-BF6B-58161B6517DA}" type="datetimeFigureOut">
               <a:rPr lang="en-US" smtClean="0"/>
-              <a:t>3/3/2014</a:t>
+              <a:t>3/11/2014</a:t>
             </a:fld>
             <a:endParaRPr lang="en-US"/>
           </a:p>
@@ -2459,7 +2460,7 @@
           <a:p>
             <a:fld id="{A6C27610-B903-4030-BF6B-58161B6517DA}" type="datetimeFigureOut">
               <a:rPr lang="en-US" smtClean="0"/>
-              <a:t>3/3/2014</a:t>
+              <a:t>3/11/2014</a:t>
             </a:fld>
             <a:endParaRPr lang="en-US"/>
           </a:p>
@@ -2577,7 +2578,7 @@
           <a:p>
             <a:fld id="{A6C27610-B903-4030-BF6B-58161B6517DA}" type="datetimeFigureOut">
               <a:rPr lang="en-US" smtClean="0"/>
-              <a:t>3/3/2014</a:t>
+              <a:t>3/11/2014</a:t>
             </a:fld>
             <a:endParaRPr lang="en-US"/>
           </a:p>
@@ -2672,7 +2673,7 @@
           <a:p>
             <a:fld id="{A6C27610-B903-4030-BF6B-58161B6517DA}" type="datetimeFigureOut">
               <a:rPr lang="en-US" smtClean="0"/>
-              <a:t>3/3/2014</a:t>
+              <a:t>3/11/2014</a:t>
             </a:fld>
             <a:endParaRPr lang="en-US"/>
           </a:p>
@@ -2949,7 +2950,7 @@
           <a:p>
             <a:fld id="{A6C27610-B903-4030-BF6B-58161B6517DA}" type="datetimeFigureOut">
               <a:rPr lang="en-US" smtClean="0"/>
-              <a:t>3/3/2014</a:t>
+              <a:t>3/11/2014</a:t>
             </a:fld>
             <a:endParaRPr lang="en-US"/>
           </a:p>
@@ -3202,7 +3203,7 @@
           <a:p>
             <a:fld id="{A6C27610-B903-4030-BF6B-58161B6517DA}" type="datetimeFigureOut">
               <a:rPr lang="en-US" smtClean="0"/>
-              <a:t>3/3/2014</a:t>
+              <a:t>3/11/2014</a:t>
             </a:fld>
             <a:endParaRPr lang="en-US"/>
           </a:p>
@@ -3415,7 +3416,7 @@
           <a:p>
             <a:fld id="{A6C27610-B903-4030-BF6B-58161B6517DA}" type="datetimeFigureOut">
               <a:rPr lang="en-US" smtClean="0"/>
-              <a:t>3/3/2014</a:t>
+              <a:t>3/11/2014</a:t>
             </a:fld>
             <a:endParaRPr lang="en-US"/>
           </a:p>
@@ -6339,6 +6340,1734 @@
       </p:par>
     </p:tnLst>
   </p:timing>
+</p:sld>
+</file>
+
+<file path=ppt/slides/slide3.xml><?xml version="1.0" encoding="utf-8"?>
+<p:sld xmlns:a="http://schemas.openxmlformats.org/drawingml/2006/main" xmlns:r="http://schemas.openxmlformats.org/officeDocument/2006/relationships" xmlns:p="http://schemas.openxmlformats.org/presentationml/2006/main">
+  <p:cSld>
+    <p:spTree>
+      <p:nvGrpSpPr>
+        <p:cNvPr id="1" name=""/>
+        <p:cNvGrpSpPr/>
+        <p:nvPr/>
+      </p:nvGrpSpPr>
+      <p:grpSpPr>
+        <a:xfrm>
+          <a:off x="0" y="0"/>
+          <a:ext cx="0" cy="0"/>
+          <a:chOff x="0" y="0"/>
+          <a:chExt cx="0" cy="0"/>
+        </a:xfrm>
+      </p:grpSpPr>
+      <p:grpSp>
+        <p:nvGrpSpPr>
+          <p:cNvPr id="68" name="Group 67"/>
+          <p:cNvGrpSpPr/>
+          <p:nvPr/>
+        </p:nvGrpSpPr>
+        <p:grpSpPr>
+          <a:xfrm>
+            <a:off x="784917" y="717973"/>
+            <a:ext cx="7465506" cy="5289243"/>
+            <a:chOff x="784917" y="717973"/>
+            <a:chExt cx="7465506" cy="5289243"/>
+          </a:xfrm>
+        </p:grpSpPr>
+        <p:sp>
+          <p:nvSpPr>
+            <p:cNvPr id="2" name="Rectangle 1"/>
+            <p:cNvSpPr/>
+            <p:nvPr/>
+          </p:nvSpPr>
+          <p:spPr>
+            <a:xfrm>
+              <a:off x="7750551" y="1383192"/>
+              <a:ext cx="499872" cy="3950208"/>
+            </a:xfrm>
+            <a:prstGeom prst="rect">
+              <a:avLst/>
+            </a:prstGeom>
+            <a:solidFill>
+              <a:schemeClr val="tx1">
+                <a:lumMod val="65000"/>
+                <a:lumOff val="35000"/>
+              </a:schemeClr>
+            </a:solidFill>
+            <a:ln>
+              <a:solidFill>
+                <a:schemeClr val="tx1">
+                  <a:lumMod val="65000"/>
+                  <a:lumOff val="35000"/>
+                </a:schemeClr>
+              </a:solidFill>
+            </a:ln>
+          </p:spPr>
+          <p:style>
+            <a:lnRef idx="2">
+              <a:schemeClr val="accent1">
+                <a:shade val="50000"/>
+              </a:schemeClr>
+            </a:lnRef>
+            <a:fillRef idx="1">
+              <a:schemeClr val="accent1"/>
+            </a:fillRef>
+            <a:effectRef idx="0">
+              <a:schemeClr val="accent1"/>
+            </a:effectRef>
+            <a:fontRef idx="minor">
+              <a:schemeClr val="lt1"/>
+            </a:fontRef>
+          </p:style>
+          <p:txBody>
+            <a:bodyPr rtlCol="0" anchor="ctr"/>
+            <a:lstStyle/>
+            <a:p>
+              <a:pPr algn="ctr"/>
+              <a:endParaRPr lang="en-US"/>
+            </a:p>
+          </p:txBody>
+        </p:sp>
+        <p:cxnSp>
+          <p:nvCxnSpPr>
+            <p:cNvPr id="4" name="Straight Connector 3"/>
+            <p:cNvCxnSpPr/>
+            <p:nvPr/>
+          </p:nvCxnSpPr>
+          <p:spPr>
+            <a:xfrm>
+              <a:off x="6009863" y="1364305"/>
+              <a:ext cx="24384" cy="3950208"/>
+            </a:xfrm>
+            <a:prstGeom prst="line">
+              <a:avLst/>
+            </a:prstGeom>
+            <a:ln w="12700">
+              <a:solidFill>
+                <a:schemeClr val="tx1"/>
+              </a:solidFill>
+            </a:ln>
+          </p:spPr>
+          <p:style>
+            <a:lnRef idx="1">
+              <a:schemeClr val="accent1"/>
+            </a:lnRef>
+            <a:fillRef idx="0">
+              <a:schemeClr val="accent1"/>
+            </a:fillRef>
+            <a:effectRef idx="0">
+              <a:schemeClr val="accent1"/>
+            </a:effectRef>
+            <a:fontRef idx="minor">
+              <a:schemeClr val="tx1"/>
+            </a:fontRef>
+          </p:style>
+        </p:cxnSp>
+        <p:cxnSp>
+          <p:nvCxnSpPr>
+            <p:cNvPr id="6" name="Straight Arrow Connector 5"/>
+            <p:cNvCxnSpPr/>
+            <p:nvPr/>
+          </p:nvCxnSpPr>
+          <p:spPr>
+            <a:xfrm>
+              <a:off x="4242816" y="1870872"/>
+              <a:ext cx="1694688" cy="0"/>
+            </a:xfrm>
+            <a:prstGeom prst="straightConnector1">
+              <a:avLst/>
+            </a:prstGeom>
+            <a:ln w="25400">
+              <a:solidFill>
+                <a:schemeClr val="tx1"/>
+              </a:solidFill>
+              <a:tailEnd type="arrow"/>
+            </a:ln>
+          </p:spPr>
+          <p:style>
+            <a:lnRef idx="1">
+              <a:schemeClr val="accent1"/>
+            </a:lnRef>
+            <a:fillRef idx="0">
+              <a:schemeClr val="accent1"/>
+            </a:fillRef>
+            <a:effectRef idx="0">
+              <a:schemeClr val="accent1"/>
+            </a:effectRef>
+            <a:fontRef idx="minor">
+              <a:schemeClr val="tx1"/>
+            </a:fontRef>
+          </p:style>
+        </p:cxnSp>
+        <p:sp>
+          <p:nvSpPr>
+            <p:cNvPr id="7" name="TextBox 6"/>
+            <p:cNvSpPr txBox="1"/>
+            <p:nvPr/>
+          </p:nvSpPr>
+          <p:spPr>
+            <a:xfrm>
+              <a:off x="4857093" y="1442366"/>
+              <a:ext cx="556178" cy="369332"/>
+            </a:xfrm>
+            <a:prstGeom prst="rect">
+              <a:avLst/>
+            </a:prstGeom>
+            <a:noFill/>
+          </p:spPr>
+          <p:txBody>
+            <a:bodyPr wrap="none" rtlCol="0">
+              <a:spAutoFit/>
+            </a:bodyPr>
+            <a:lstStyle/>
+            <a:p>
+              <a:r>
+                <a:rPr lang="en-US" dirty="0" err="1" smtClean="0"/>
+                <a:t>T</a:t>
+              </a:r>
+              <a:r>
+                <a:rPr lang="en-US" baseline="-25000" dirty="0" err="1" smtClean="0"/>
+                <a:t>amb</a:t>
+              </a:r>
+              <a:endParaRPr lang="en-US" baseline="-25000" dirty="0"/>
+            </a:p>
+          </p:txBody>
+        </p:sp>
+        <p:cxnSp>
+          <p:nvCxnSpPr>
+            <p:cNvPr id="11" name="Straight Arrow Connector 10"/>
+            <p:cNvCxnSpPr/>
+            <p:nvPr/>
+          </p:nvCxnSpPr>
+          <p:spPr>
+            <a:xfrm>
+              <a:off x="6089904" y="1864776"/>
+              <a:ext cx="1292352" cy="0"/>
+            </a:xfrm>
+            <a:prstGeom prst="straightConnector1">
+              <a:avLst/>
+            </a:prstGeom>
+            <a:ln w="25400">
+              <a:solidFill>
+                <a:schemeClr val="tx1"/>
+              </a:solidFill>
+              <a:tailEnd type="arrow"/>
+            </a:ln>
+          </p:spPr>
+          <p:style>
+            <a:lnRef idx="1">
+              <a:schemeClr val="accent1"/>
+            </a:lnRef>
+            <a:fillRef idx="0">
+              <a:schemeClr val="accent1"/>
+            </a:fillRef>
+            <a:effectRef idx="0">
+              <a:schemeClr val="accent1"/>
+            </a:effectRef>
+            <a:fontRef idx="minor">
+              <a:schemeClr val="tx1"/>
+            </a:fontRef>
+          </p:style>
+        </p:cxnSp>
+        <p:sp>
+          <p:nvSpPr>
+            <p:cNvPr id="14" name="TextBox 13"/>
+            <p:cNvSpPr txBox="1"/>
+            <p:nvPr/>
+          </p:nvSpPr>
+          <p:spPr>
+            <a:xfrm>
+              <a:off x="6303264" y="1442366"/>
+              <a:ext cx="913263" cy="369332"/>
+            </a:xfrm>
+            <a:prstGeom prst="rect">
+              <a:avLst/>
+            </a:prstGeom>
+            <a:noFill/>
+          </p:spPr>
+          <p:txBody>
+            <a:bodyPr wrap="none" rtlCol="0">
+              <a:spAutoFit/>
+            </a:bodyPr>
+            <a:lstStyle/>
+            <a:p>
+              <a:r>
+                <a:rPr lang="el-GR" dirty="0" smtClean="0"/>
+                <a:t>τ</a:t>
+              </a:r>
+              <a:r>
+                <a:rPr lang="en-US" baseline="-25000" dirty="0" err="1" smtClean="0"/>
+                <a:t>cov</a:t>
+              </a:r>
+              <a:r>
+                <a:rPr lang="en-US" dirty="0"/>
+                <a:t> </a:t>
+              </a:r>
+              <a:r>
+                <a:rPr lang="en-US" dirty="0" err="1"/>
+                <a:t>T</a:t>
+              </a:r>
+              <a:r>
+                <a:rPr lang="en-US" baseline="-25000" dirty="0" err="1"/>
+                <a:t>amb</a:t>
+              </a:r>
+              <a:endParaRPr lang="en-US" baseline="-25000" dirty="0"/>
+            </a:p>
+          </p:txBody>
+        </p:sp>
+        <p:cxnSp>
+          <p:nvCxnSpPr>
+            <p:cNvPr id="15" name="Straight Arrow Connector 14"/>
+            <p:cNvCxnSpPr/>
+            <p:nvPr/>
+          </p:nvCxnSpPr>
+          <p:spPr>
+            <a:xfrm flipH="1">
+              <a:off x="6089904" y="2382936"/>
+              <a:ext cx="1554566" cy="0"/>
+            </a:xfrm>
+            <a:prstGeom prst="straightConnector1">
+              <a:avLst/>
+            </a:prstGeom>
+            <a:ln w="25400">
+              <a:solidFill>
+                <a:schemeClr val="tx1"/>
+              </a:solidFill>
+              <a:tailEnd type="arrow"/>
+            </a:ln>
+          </p:spPr>
+          <p:style>
+            <a:lnRef idx="1">
+              <a:schemeClr val="accent1"/>
+            </a:lnRef>
+            <a:fillRef idx="0">
+              <a:schemeClr val="accent1"/>
+            </a:fillRef>
+            <a:effectRef idx="0">
+              <a:schemeClr val="accent1"/>
+            </a:effectRef>
+            <a:fontRef idx="minor">
+              <a:schemeClr val="tx1"/>
+            </a:fontRef>
+          </p:style>
+        </p:cxnSp>
+        <p:sp>
+          <p:nvSpPr>
+            <p:cNvPr id="18" name="TextBox 17"/>
+            <p:cNvSpPr txBox="1"/>
+            <p:nvPr/>
+          </p:nvSpPr>
+          <p:spPr>
+            <a:xfrm>
+              <a:off x="6089904" y="1923950"/>
+              <a:ext cx="1479123" cy="369332"/>
+            </a:xfrm>
+            <a:prstGeom prst="rect">
+              <a:avLst/>
+            </a:prstGeom>
+            <a:noFill/>
+          </p:spPr>
+          <p:txBody>
+            <a:bodyPr wrap="none" rtlCol="0">
+              <a:spAutoFit/>
+            </a:bodyPr>
+            <a:lstStyle/>
+            <a:p>
+              <a:r>
+                <a:rPr lang="en-US" dirty="0" smtClean="0"/>
+                <a:t>(1-</a:t>
+              </a:r>
+              <a:r>
+                <a:rPr lang="el-GR" dirty="0"/>
+                <a:t> </a:t>
+              </a:r>
+              <a:r>
+                <a:rPr lang="el-GR" dirty="0" smtClean="0"/>
+                <a:t>ε</a:t>
+              </a:r>
+              <a:r>
+                <a:rPr lang="en-US" baseline="-25000" dirty="0" smtClean="0"/>
+                <a:t>1</a:t>
+              </a:r>
+              <a:r>
+                <a:rPr lang="en-US" dirty="0"/>
+                <a:t>)</a:t>
+              </a:r>
+              <a:r>
+                <a:rPr lang="el-GR" dirty="0" smtClean="0"/>
+                <a:t>τ</a:t>
+              </a:r>
+              <a:r>
+                <a:rPr lang="en-US" baseline="-25000" dirty="0" err="1" smtClean="0"/>
+                <a:t>cov</a:t>
+              </a:r>
+              <a:r>
+                <a:rPr lang="en-US" dirty="0"/>
+                <a:t> </a:t>
+              </a:r>
+              <a:r>
+                <a:rPr lang="en-US" dirty="0" err="1"/>
+                <a:t>T</a:t>
+              </a:r>
+              <a:r>
+                <a:rPr lang="en-US" baseline="-25000" dirty="0" err="1"/>
+                <a:t>amb</a:t>
+              </a:r>
+              <a:endParaRPr lang="en-US" baseline="-25000" dirty="0"/>
+            </a:p>
+          </p:txBody>
+        </p:sp>
+        <p:cxnSp>
+          <p:nvCxnSpPr>
+            <p:cNvPr id="20" name="Straight Arrow Connector 19"/>
+            <p:cNvCxnSpPr/>
+            <p:nvPr/>
+          </p:nvCxnSpPr>
+          <p:spPr>
+            <a:xfrm flipH="1">
+              <a:off x="4364650" y="2370744"/>
+              <a:ext cx="1554566" cy="0"/>
+            </a:xfrm>
+            <a:prstGeom prst="straightConnector1">
+              <a:avLst/>
+            </a:prstGeom>
+            <a:ln w="25400">
+              <a:solidFill>
+                <a:schemeClr val="tx1"/>
+              </a:solidFill>
+              <a:tailEnd type="arrow"/>
+            </a:ln>
+          </p:spPr>
+          <p:style>
+            <a:lnRef idx="1">
+              <a:schemeClr val="accent1"/>
+            </a:lnRef>
+            <a:fillRef idx="0">
+              <a:schemeClr val="accent1"/>
+            </a:fillRef>
+            <a:effectRef idx="0">
+              <a:schemeClr val="accent1"/>
+            </a:effectRef>
+            <a:fontRef idx="minor">
+              <a:schemeClr val="tx1"/>
+            </a:fontRef>
+          </p:style>
+        </p:cxnSp>
+        <p:sp>
+          <p:nvSpPr>
+            <p:cNvPr id="21" name="TextBox 20"/>
+            <p:cNvSpPr txBox="1"/>
+            <p:nvPr/>
+          </p:nvSpPr>
+          <p:spPr>
+            <a:xfrm>
+              <a:off x="4382938" y="1923950"/>
+              <a:ext cx="1557671" cy="369332"/>
+            </a:xfrm>
+            <a:prstGeom prst="rect">
+              <a:avLst/>
+            </a:prstGeom>
+            <a:noFill/>
+          </p:spPr>
+          <p:txBody>
+            <a:bodyPr wrap="none" rtlCol="0">
+              <a:spAutoFit/>
+            </a:bodyPr>
+            <a:lstStyle/>
+            <a:p>
+              <a:r>
+                <a:rPr lang="en-US" dirty="0" smtClean="0"/>
+                <a:t>(1-</a:t>
+              </a:r>
+              <a:r>
+                <a:rPr lang="el-GR" dirty="0"/>
+                <a:t> </a:t>
+              </a:r>
+              <a:r>
+                <a:rPr lang="el-GR" dirty="0" smtClean="0"/>
+                <a:t>ε</a:t>
+              </a:r>
+              <a:r>
+                <a:rPr lang="en-US" baseline="-25000" dirty="0" smtClean="0"/>
+                <a:t>1</a:t>
+              </a:r>
+              <a:r>
+                <a:rPr lang="en-US" dirty="0" smtClean="0"/>
+                <a:t>)</a:t>
+              </a:r>
+              <a:r>
+                <a:rPr lang="el-GR" dirty="0" smtClean="0"/>
+                <a:t>τ</a:t>
+              </a:r>
+              <a:r>
+                <a:rPr lang="en-US" baseline="30000" dirty="0" smtClean="0"/>
+                <a:t>2</a:t>
+              </a:r>
+              <a:r>
+                <a:rPr lang="en-US" baseline="-25000" dirty="0" smtClean="0"/>
+                <a:t>cov</a:t>
+              </a:r>
+              <a:r>
+                <a:rPr lang="en-US" dirty="0" smtClean="0"/>
+                <a:t> </a:t>
+              </a:r>
+              <a:r>
+                <a:rPr lang="en-US" dirty="0" err="1"/>
+                <a:t>T</a:t>
+              </a:r>
+              <a:r>
+                <a:rPr lang="en-US" baseline="-25000" dirty="0" err="1"/>
+                <a:t>amb</a:t>
+              </a:r>
+              <a:endParaRPr lang="en-US" baseline="-25000" dirty="0"/>
+            </a:p>
+          </p:txBody>
+        </p:sp>
+        <p:cxnSp>
+          <p:nvCxnSpPr>
+            <p:cNvPr id="28" name="Straight Arrow Connector 27"/>
+            <p:cNvCxnSpPr/>
+            <p:nvPr/>
+          </p:nvCxnSpPr>
+          <p:spPr>
+            <a:xfrm>
+              <a:off x="6101294" y="3480216"/>
+              <a:ext cx="1292352" cy="0"/>
+            </a:xfrm>
+            <a:prstGeom prst="straightConnector1">
+              <a:avLst/>
+            </a:prstGeom>
+            <a:ln w="25400">
+              <a:solidFill>
+                <a:srgbClr val="FF0000"/>
+              </a:solidFill>
+              <a:tailEnd type="arrow"/>
+            </a:ln>
+          </p:spPr>
+          <p:style>
+            <a:lnRef idx="1">
+              <a:schemeClr val="accent1"/>
+            </a:lnRef>
+            <a:fillRef idx="0">
+              <a:schemeClr val="accent1"/>
+            </a:fillRef>
+            <a:effectRef idx="0">
+              <a:schemeClr val="accent1"/>
+            </a:effectRef>
+            <a:fontRef idx="minor">
+              <a:schemeClr val="tx1"/>
+            </a:fontRef>
+          </p:style>
+        </p:cxnSp>
+        <p:sp>
+          <p:nvSpPr>
+            <p:cNvPr id="29" name="TextBox 28"/>
+            <p:cNvSpPr txBox="1"/>
+            <p:nvPr/>
+          </p:nvSpPr>
+          <p:spPr>
+            <a:xfrm>
+              <a:off x="6101294" y="3000027"/>
+              <a:ext cx="1124154" cy="369332"/>
+            </a:xfrm>
+            <a:prstGeom prst="rect">
+              <a:avLst/>
+            </a:prstGeom>
+            <a:noFill/>
+          </p:spPr>
+          <p:txBody>
+            <a:bodyPr wrap="none" rtlCol="0">
+              <a:spAutoFit/>
+            </a:bodyPr>
+            <a:lstStyle/>
+            <a:p>
+              <a:r>
+                <a:rPr lang="en-US" dirty="0" smtClean="0">
+                  <a:solidFill>
+                    <a:srgbClr val="FF0000"/>
+                  </a:solidFill>
+                </a:rPr>
+                <a:t>(1-</a:t>
+              </a:r>
+              <a:r>
+                <a:rPr lang="el-GR" dirty="0" smtClean="0">
+                  <a:solidFill>
+                    <a:srgbClr val="FF0000"/>
+                  </a:solidFill>
+                </a:rPr>
+                <a:t>τ</a:t>
+              </a:r>
+              <a:r>
+                <a:rPr lang="en-US" baseline="-25000" dirty="0" err="1" smtClean="0">
+                  <a:solidFill>
+                    <a:srgbClr val="FF0000"/>
+                  </a:solidFill>
+                </a:rPr>
+                <a:t>cov</a:t>
+              </a:r>
+              <a:r>
+                <a:rPr lang="en-US" dirty="0" smtClean="0">
+                  <a:solidFill>
+                    <a:srgbClr val="FF0000"/>
+                  </a:solidFill>
+                </a:rPr>
+                <a:t>)</a:t>
+              </a:r>
+              <a:r>
+                <a:rPr lang="en-US" dirty="0" err="1" smtClean="0">
+                  <a:solidFill>
+                    <a:srgbClr val="FF0000"/>
+                  </a:solidFill>
+                </a:rPr>
+                <a:t>T</a:t>
+              </a:r>
+              <a:r>
+                <a:rPr lang="en-US" baseline="-25000" dirty="0" err="1" smtClean="0">
+                  <a:solidFill>
+                    <a:srgbClr val="FF0000"/>
+                  </a:solidFill>
+                </a:rPr>
+                <a:t>cov</a:t>
+              </a:r>
+              <a:endParaRPr lang="en-US" baseline="-25000" dirty="0">
+                <a:solidFill>
+                  <a:srgbClr val="FF0000"/>
+                </a:solidFill>
+              </a:endParaRPr>
+            </a:p>
+          </p:txBody>
+        </p:sp>
+        <p:cxnSp>
+          <p:nvCxnSpPr>
+            <p:cNvPr id="30" name="Straight Arrow Connector 29"/>
+            <p:cNvCxnSpPr/>
+            <p:nvPr/>
+          </p:nvCxnSpPr>
+          <p:spPr>
+            <a:xfrm flipH="1">
+              <a:off x="4518462" y="3480216"/>
+              <a:ext cx="1280160" cy="0"/>
+            </a:xfrm>
+            <a:prstGeom prst="straightConnector1">
+              <a:avLst/>
+            </a:prstGeom>
+            <a:ln w="25400">
+              <a:solidFill>
+                <a:srgbClr val="FF0000"/>
+              </a:solidFill>
+              <a:tailEnd type="arrow"/>
+            </a:ln>
+          </p:spPr>
+          <p:style>
+            <a:lnRef idx="1">
+              <a:schemeClr val="accent1"/>
+            </a:lnRef>
+            <a:fillRef idx="0">
+              <a:schemeClr val="accent1"/>
+            </a:fillRef>
+            <a:effectRef idx="0">
+              <a:schemeClr val="accent1"/>
+            </a:effectRef>
+            <a:fontRef idx="minor">
+              <a:schemeClr val="tx1"/>
+            </a:fontRef>
+          </p:style>
+        </p:cxnSp>
+        <p:sp>
+          <p:nvSpPr>
+            <p:cNvPr id="31" name="TextBox 30"/>
+            <p:cNvSpPr txBox="1"/>
+            <p:nvPr/>
+          </p:nvSpPr>
+          <p:spPr>
+            <a:xfrm>
+              <a:off x="4443984" y="2970077"/>
+              <a:ext cx="1124154" cy="369332"/>
+            </a:xfrm>
+            <a:prstGeom prst="rect">
+              <a:avLst/>
+            </a:prstGeom>
+            <a:noFill/>
+          </p:spPr>
+          <p:txBody>
+            <a:bodyPr wrap="none" rtlCol="0">
+              <a:spAutoFit/>
+            </a:bodyPr>
+            <a:lstStyle/>
+            <a:p>
+              <a:r>
+                <a:rPr lang="en-US" dirty="0" smtClean="0">
+                  <a:solidFill>
+                    <a:srgbClr val="FF0000"/>
+                  </a:solidFill>
+                </a:rPr>
+                <a:t>(1-</a:t>
+              </a:r>
+              <a:r>
+                <a:rPr lang="el-GR" dirty="0" smtClean="0">
+                  <a:solidFill>
+                    <a:srgbClr val="FF0000"/>
+                  </a:solidFill>
+                </a:rPr>
+                <a:t>τ</a:t>
+              </a:r>
+              <a:r>
+                <a:rPr lang="en-US" baseline="-25000" dirty="0" err="1" smtClean="0">
+                  <a:solidFill>
+                    <a:srgbClr val="FF0000"/>
+                  </a:solidFill>
+                </a:rPr>
+                <a:t>cov</a:t>
+              </a:r>
+              <a:r>
+                <a:rPr lang="en-US" dirty="0" smtClean="0">
+                  <a:solidFill>
+                    <a:srgbClr val="FF0000"/>
+                  </a:solidFill>
+                </a:rPr>
+                <a:t>)</a:t>
+              </a:r>
+              <a:r>
+                <a:rPr lang="en-US" dirty="0" err="1" smtClean="0">
+                  <a:solidFill>
+                    <a:srgbClr val="FF0000"/>
+                  </a:solidFill>
+                </a:rPr>
+                <a:t>T</a:t>
+              </a:r>
+              <a:r>
+                <a:rPr lang="en-US" baseline="-25000" dirty="0" err="1" smtClean="0">
+                  <a:solidFill>
+                    <a:srgbClr val="FF0000"/>
+                  </a:solidFill>
+                </a:rPr>
+                <a:t>cov</a:t>
+              </a:r>
+              <a:endParaRPr lang="en-US" baseline="-25000" dirty="0">
+                <a:solidFill>
+                  <a:srgbClr val="FF0000"/>
+                </a:solidFill>
+              </a:endParaRPr>
+            </a:p>
+          </p:txBody>
+        </p:sp>
+        <p:cxnSp>
+          <p:nvCxnSpPr>
+            <p:cNvPr id="39" name="Straight Arrow Connector 38"/>
+            <p:cNvCxnSpPr/>
+            <p:nvPr/>
+          </p:nvCxnSpPr>
+          <p:spPr>
+            <a:xfrm flipH="1">
+              <a:off x="6159005" y="4038132"/>
+              <a:ext cx="1454986" cy="0"/>
+            </a:xfrm>
+            <a:prstGeom prst="straightConnector1">
+              <a:avLst/>
+            </a:prstGeom>
+            <a:ln w="25400">
+              <a:solidFill>
+                <a:srgbClr val="FF0000"/>
+              </a:solidFill>
+              <a:tailEnd type="arrow"/>
+            </a:ln>
+          </p:spPr>
+          <p:style>
+            <a:lnRef idx="1">
+              <a:schemeClr val="accent1"/>
+            </a:lnRef>
+            <a:fillRef idx="0">
+              <a:schemeClr val="accent1"/>
+            </a:fillRef>
+            <a:effectRef idx="0">
+              <a:schemeClr val="accent1"/>
+            </a:effectRef>
+            <a:fontRef idx="minor">
+              <a:schemeClr val="tx1"/>
+            </a:fontRef>
+          </p:style>
+        </p:cxnSp>
+        <p:sp>
+          <p:nvSpPr>
+            <p:cNvPr id="40" name="TextBox 39"/>
+            <p:cNvSpPr txBox="1"/>
+            <p:nvPr/>
+          </p:nvSpPr>
+          <p:spPr>
+            <a:xfrm>
+              <a:off x="6034247" y="3596444"/>
+              <a:ext cx="1690014" cy="369332"/>
+            </a:xfrm>
+            <a:prstGeom prst="rect">
+              <a:avLst/>
+            </a:prstGeom>
+            <a:noFill/>
+          </p:spPr>
+          <p:txBody>
+            <a:bodyPr wrap="none" rtlCol="0">
+              <a:spAutoFit/>
+            </a:bodyPr>
+            <a:lstStyle/>
+            <a:p>
+              <a:r>
+                <a:rPr lang="en-US" dirty="0">
+                  <a:solidFill>
+                    <a:srgbClr val="FF0000"/>
+                  </a:solidFill>
+                </a:rPr>
+                <a:t>(1-</a:t>
+              </a:r>
+              <a:r>
+                <a:rPr lang="el-GR" dirty="0">
+                  <a:solidFill>
+                    <a:srgbClr val="FF0000"/>
+                  </a:solidFill>
+                </a:rPr>
+                <a:t> </a:t>
+              </a:r>
+              <a:r>
+                <a:rPr lang="el-GR" dirty="0" smtClean="0">
+                  <a:solidFill>
+                    <a:srgbClr val="FF0000"/>
+                  </a:solidFill>
+                </a:rPr>
+                <a:t>ε</a:t>
+              </a:r>
+              <a:r>
+                <a:rPr lang="en-US" baseline="-25000" dirty="0" smtClean="0">
+                  <a:solidFill>
+                    <a:srgbClr val="FF0000"/>
+                  </a:solidFill>
+                </a:rPr>
+                <a:t>1</a:t>
+              </a:r>
+              <a:r>
+                <a:rPr lang="en-US" dirty="0" smtClean="0">
+                  <a:solidFill>
+                    <a:srgbClr val="FF0000"/>
+                  </a:solidFill>
+                </a:rPr>
+                <a:t>)(1-</a:t>
+              </a:r>
+              <a:r>
+                <a:rPr lang="el-GR" dirty="0" smtClean="0">
+                  <a:solidFill>
+                    <a:srgbClr val="FF0000"/>
+                  </a:solidFill>
+                </a:rPr>
+                <a:t>τ</a:t>
+              </a:r>
+              <a:r>
+                <a:rPr lang="en-US" baseline="-25000" dirty="0" err="1" smtClean="0">
+                  <a:solidFill>
+                    <a:srgbClr val="FF0000"/>
+                  </a:solidFill>
+                </a:rPr>
+                <a:t>cov</a:t>
+              </a:r>
+              <a:r>
+                <a:rPr lang="en-US" dirty="0" smtClean="0">
+                  <a:solidFill>
+                    <a:srgbClr val="FF0000"/>
+                  </a:solidFill>
+                </a:rPr>
+                <a:t>)</a:t>
+              </a:r>
+              <a:r>
+                <a:rPr lang="en-US" dirty="0" err="1" smtClean="0">
+                  <a:solidFill>
+                    <a:srgbClr val="FF0000"/>
+                  </a:solidFill>
+                </a:rPr>
+                <a:t>T</a:t>
+              </a:r>
+              <a:r>
+                <a:rPr lang="en-US" baseline="-25000" dirty="0" err="1" smtClean="0">
+                  <a:solidFill>
+                    <a:srgbClr val="FF0000"/>
+                  </a:solidFill>
+                </a:rPr>
+                <a:t>cov</a:t>
+              </a:r>
+              <a:endParaRPr lang="en-US" baseline="-25000" dirty="0">
+                <a:solidFill>
+                  <a:srgbClr val="FF0000"/>
+                </a:solidFill>
+              </a:endParaRPr>
+            </a:p>
+          </p:txBody>
+        </p:sp>
+        <p:cxnSp>
+          <p:nvCxnSpPr>
+            <p:cNvPr id="44" name="Straight Arrow Connector 43"/>
+            <p:cNvCxnSpPr/>
+            <p:nvPr/>
+          </p:nvCxnSpPr>
+          <p:spPr>
+            <a:xfrm flipH="1">
+              <a:off x="4518462" y="4089814"/>
+              <a:ext cx="1343771" cy="0"/>
+            </a:xfrm>
+            <a:prstGeom prst="straightConnector1">
+              <a:avLst/>
+            </a:prstGeom>
+            <a:ln w="25400">
+              <a:solidFill>
+                <a:srgbClr val="FF0000"/>
+              </a:solidFill>
+              <a:tailEnd type="arrow"/>
+            </a:ln>
+          </p:spPr>
+          <p:style>
+            <a:lnRef idx="1">
+              <a:schemeClr val="accent1"/>
+            </a:lnRef>
+            <a:fillRef idx="0">
+              <a:schemeClr val="accent1"/>
+            </a:fillRef>
+            <a:effectRef idx="0">
+              <a:schemeClr val="accent1"/>
+            </a:effectRef>
+            <a:fontRef idx="minor">
+              <a:schemeClr val="tx1"/>
+            </a:fontRef>
+          </p:style>
+        </p:cxnSp>
+        <p:sp>
+          <p:nvSpPr>
+            <p:cNvPr id="45" name="TextBox 44"/>
+            <p:cNvSpPr txBox="1"/>
+            <p:nvPr/>
+          </p:nvSpPr>
+          <p:spPr>
+            <a:xfrm>
+              <a:off x="3785617" y="3648126"/>
+              <a:ext cx="2164079" cy="369332"/>
+            </a:xfrm>
+            <a:prstGeom prst="rect">
+              <a:avLst/>
+            </a:prstGeom>
+            <a:noFill/>
+          </p:spPr>
+          <p:txBody>
+            <a:bodyPr wrap="square" rtlCol="0">
+              <a:spAutoFit/>
+            </a:bodyPr>
+            <a:lstStyle/>
+            <a:p>
+              <a:r>
+                <a:rPr lang="el-GR" dirty="0">
+                  <a:solidFill>
+                    <a:srgbClr val="FF0000"/>
+                  </a:solidFill>
+                </a:rPr>
+                <a:t>τ</a:t>
+              </a:r>
+              <a:r>
+                <a:rPr lang="en-US" baseline="-25000" dirty="0" err="1">
+                  <a:solidFill>
+                    <a:srgbClr val="FF0000"/>
+                  </a:solidFill>
+                </a:rPr>
+                <a:t>cov</a:t>
+              </a:r>
+              <a:r>
+                <a:rPr lang="en-US" dirty="0" smtClean="0">
+                  <a:solidFill>
+                    <a:srgbClr val="FF0000"/>
+                  </a:solidFill>
+                </a:rPr>
+                <a:t>(1-</a:t>
+              </a:r>
+              <a:r>
+                <a:rPr lang="el-GR" dirty="0" smtClean="0">
+                  <a:solidFill>
+                    <a:srgbClr val="FF0000"/>
+                  </a:solidFill>
+                </a:rPr>
+                <a:t> ε</a:t>
+              </a:r>
+              <a:r>
+                <a:rPr lang="en-US" baseline="-25000" dirty="0" smtClean="0">
+                  <a:solidFill>
+                    <a:srgbClr val="FF0000"/>
+                  </a:solidFill>
+                </a:rPr>
+                <a:t>1</a:t>
+              </a:r>
+              <a:r>
+                <a:rPr lang="en-US" dirty="0" smtClean="0">
+                  <a:solidFill>
+                    <a:srgbClr val="FF0000"/>
+                  </a:solidFill>
+                </a:rPr>
+                <a:t>)(1-</a:t>
+              </a:r>
+              <a:r>
+                <a:rPr lang="el-GR" dirty="0" smtClean="0">
+                  <a:solidFill>
+                    <a:srgbClr val="FF0000"/>
+                  </a:solidFill>
+                </a:rPr>
+                <a:t>τ</a:t>
+              </a:r>
+              <a:r>
+                <a:rPr lang="en-US" baseline="-25000" dirty="0" err="1" smtClean="0">
+                  <a:solidFill>
+                    <a:srgbClr val="FF0000"/>
+                  </a:solidFill>
+                </a:rPr>
+                <a:t>cov</a:t>
+              </a:r>
+              <a:r>
+                <a:rPr lang="en-US" dirty="0" smtClean="0">
+                  <a:solidFill>
+                    <a:srgbClr val="FF0000"/>
+                  </a:solidFill>
+                </a:rPr>
+                <a:t>)</a:t>
+              </a:r>
+              <a:r>
+                <a:rPr lang="en-US" dirty="0" err="1" smtClean="0">
+                  <a:solidFill>
+                    <a:srgbClr val="FF0000"/>
+                  </a:solidFill>
+                </a:rPr>
+                <a:t>T</a:t>
+              </a:r>
+              <a:r>
+                <a:rPr lang="en-US" baseline="-25000" dirty="0" err="1" smtClean="0">
+                  <a:solidFill>
+                    <a:srgbClr val="FF0000"/>
+                  </a:solidFill>
+                </a:rPr>
+                <a:t>cov</a:t>
+              </a:r>
+              <a:endParaRPr lang="en-US" baseline="-25000" dirty="0">
+                <a:solidFill>
+                  <a:srgbClr val="FF0000"/>
+                </a:solidFill>
+              </a:endParaRPr>
+            </a:p>
+          </p:txBody>
+        </p:sp>
+        <p:cxnSp>
+          <p:nvCxnSpPr>
+            <p:cNvPr id="48" name="Straight Arrow Connector 47"/>
+            <p:cNvCxnSpPr/>
+            <p:nvPr/>
+          </p:nvCxnSpPr>
+          <p:spPr>
+            <a:xfrm flipH="1">
+              <a:off x="6159005" y="5104932"/>
+              <a:ext cx="1454986" cy="0"/>
+            </a:xfrm>
+            <a:prstGeom prst="straightConnector1">
+              <a:avLst/>
+            </a:prstGeom>
+            <a:ln w="25400">
+              <a:solidFill>
+                <a:srgbClr val="0070C0"/>
+              </a:solidFill>
+              <a:tailEnd type="arrow"/>
+            </a:ln>
+          </p:spPr>
+          <p:style>
+            <a:lnRef idx="1">
+              <a:schemeClr val="accent1"/>
+            </a:lnRef>
+            <a:fillRef idx="0">
+              <a:schemeClr val="accent1"/>
+            </a:fillRef>
+            <a:effectRef idx="0">
+              <a:schemeClr val="accent1"/>
+            </a:effectRef>
+            <a:fontRef idx="minor">
+              <a:schemeClr val="tx1"/>
+            </a:fontRef>
+          </p:style>
+        </p:cxnSp>
+        <p:sp>
+          <p:nvSpPr>
+            <p:cNvPr id="49" name="TextBox 48"/>
+            <p:cNvSpPr txBox="1"/>
+            <p:nvPr/>
+          </p:nvSpPr>
+          <p:spPr>
+            <a:xfrm>
+              <a:off x="6568207" y="4685912"/>
+              <a:ext cx="559769" cy="369332"/>
+            </a:xfrm>
+            <a:prstGeom prst="rect">
+              <a:avLst/>
+            </a:prstGeom>
+            <a:noFill/>
+          </p:spPr>
+          <p:txBody>
+            <a:bodyPr wrap="none" rtlCol="0">
+              <a:spAutoFit/>
+            </a:bodyPr>
+            <a:lstStyle/>
+            <a:p>
+              <a:r>
+                <a:rPr lang="el-GR" dirty="0" smtClean="0">
+                  <a:solidFill>
+                    <a:srgbClr val="0070C0"/>
+                  </a:solidFill>
+                </a:rPr>
+                <a:t>ε</a:t>
+              </a:r>
+              <a:r>
+                <a:rPr lang="en-US" baseline="-25000" dirty="0" smtClean="0">
+                  <a:solidFill>
+                    <a:srgbClr val="0070C0"/>
+                  </a:solidFill>
+                </a:rPr>
+                <a:t>1</a:t>
+              </a:r>
+              <a:r>
+                <a:rPr lang="en-US" dirty="0" smtClean="0">
+                  <a:solidFill>
+                    <a:srgbClr val="0070C0"/>
+                  </a:solidFill>
+                </a:rPr>
+                <a:t>T</a:t>
+              </a:r>
+              <a:r>
+                <a:rPr lang="en-US" baseline="-25000" dirty="0" smtClean="0">
+                  <a:solidFill>
+                    <a:srgbClr val="0070C0"/>
+                  </a:solidFill>
+                </a:rPr>
+                <a:t>1</a:t>
+              </a:r>
+              <a:endParaRPr lang="en-US" baseline="-25000" dirty="0">
+                <a:solidFill>
+                  <a:srgbClr val="0070C0"/>
+                </a:solidFill>
+              </a:endParaRPr>
+            </a:p>
+          </p:txBody>
+        </p:sp>
+        <p:cxnSp>
+          <p:nvCxnSpPr>
+            <p:cNvPr id="50" name="Straight Arrow Connector 49"/>
+            <p:cNvCxnSpPr/>
+            <p:nvPr/>
+          </p:nvCxnSpPr>
+          <p:spPr>
+            <a:xfrm flipH="1">
+              <a:off x="4432728" y="5104932"/>
+              <a:ext cx="1454986" cy="0"/>
+            </a:xfrm>
+            <a:prstGeom prst="straightConnector1">
+              <a:avLst/>
+            </a:prstGeom>
+            <a:ln w="25400">
+              <a:solidFill>
+                <a:srgbClr val="0070C0"/>
+              </a:solidFill>
+              <a:tailEnd type="arrow"/>
+            </a:ln>
+          </p:spPr>
+          <p:style>
+            <a:lnRef idx="1">
+              <a:schemeClr val="accent1"/>
+            </a:lnRef>
+            <a:fillRef idx="0">
+              <a:schemeClr val="accent1"/>
+            </a:fillRef>
+            <a:effectRef idx="0">
+              <a:schemeClr val="accent1"/>
+            </a:effectRef>
+            <a:fontRef idx="minor">
+              <a:schemeClr val="tx1"/>
+            </a:fontRef>
+          </p:style>
+        </p:cxnSp>
+        <p:sp>
+          <p:nvSpPr>
+            <p:cNvPr id="51" name="TextBox 50"/>
+            <p:cNvSpPr txBox="1"/>
+            <p:nvPr/>
+          </p:nvSpPr>
+          <p:spPr>
+            <a:xfrm>
+              <a:off x="4841930" y="4685912"/>
+              <a:ext cx="863954" cy="369332"/>
+            </a:xfrm>
+            <a:prstGeom prst="rect">
+              <a:avLst/>
+            </a:prstGeom>
+            <a:noFill/>
+          </p:spPr>
+          <p:txBody>
+            <a:bodyPr wrap="none" rtlCol="0">
+              <a:spAutoFit/>
+            </a:bodyPr>
+            <a:lstStyle/>
+            <a:p>
+              <a:r>
+                <a:rPr lang="el-GR" dirty="0">
+                  <a:solidFill>
+                    <a:srgbClr val="0070C0"/>
+                  </a:solidFill>
+                </a:rPr>
+                <a:t>τ</a:t>
+              </a:r>
+              <a:r>
+                <a:rPr lang="en-US" baseline="-25000" dirty="0" err="1">
+                  <a:solidFill>
+                    <a:srgbClr val="0070C0"/>
+                  </a:solidFill>
+                </a:rPr>
+                <a:t>cov</a:t>
+              </a:r>
+              <a:r>
+                <a:rPr lang="el-GR" dirty="0" smtClean="0">
+                  <a:solidFill>
+                    <a:srgbClr val="0070C0"/>
+                  </a:solidFill>
+                </a:rPr>
+                <a:t>ε</a:t>
+              </a:r>
+              <a:r>
+                <a:rPr lang="en-US" baseline="-25000" dirty="0" smtClean="0">
+                  <a:solidFill>
+                    <a:srgbClr val="0070C0"/>
+                  </a:solidFill>
+                </a:rPr>
+                <a:t>1</a:t>
+              </a:r>
+              <a:r>
+                <a:rPr lang="en-US" dirty="0" smtClean="0">
+                  <a:solidFill>
+                    <a:srgbClr val="0070C0"/>
+                  </a:solidFill>
+                </a:rPr>
+                <a:t>T</a:t>
+              </a:r>
+              <a:r>
+                <a:rPr lang="en-US" baseline="-25000" dirty="0" smtClean="0">
+                  <a:solidFill>
+                    <a:srgbClr val="0070C0"/>
+                  </a:solidFill>
+                </a:rPr>
+                <a:t>1</a:t>
+              </a:r>
+              <a:endParaRPr lang="en-US" baseline="-25000" dirty="0">
+                <a:solidFill>
+                  <a:srgbClr val="0070C0"/>
+                </a:solidFill>
+              </a:endParaRPr>
+            </a:p>
+          </p:txBody>
+        </p:sp>
+        <p:sp>
+          <p:nvSpPr>
+            <p:cNvPr id="52" name="TextBox 51"/>
+            <p:cNvSpPr txBox="1"/>
+            <p:nvPr/>
+          </p:nvSpPr>
+          <p:spPr>
+            <a:xfrm>
+              <a:off x="7776708" y="717973"/>
+              <a:ext cx="375424" cy="646331"/>
+            </a:xfrm>
+            <a:prstGeom prst="rect">
+              <a:avLst/>
+            </a:prstGeom>
+            <a:noFill/>
+            <a:ln>
+              <a:noFill/>
+            </a:ln>
+          </p:spPr>
+          <p:txBody>
+            <a:bodyPr wrap="none" rtlCol="0">
+              <a:spAutoFit/>
+            </a:bodyPr>
+            <a:lstStyle/>
+            <a:p>
+              <a:r>
+                <a:rPr lang="en-US" dirty="0" smtClean="0"/>
+                <a:t>T</a:t>
+              </a:r>
+              <a:r>
+                <a:rPr lang="en-US" baseline="-25000" dirty="0"/>
+                <a:t>1</a:t>
+              </a:r>
+              <a:endParaRPr lang="en-US" baseline="-25000" dirty="0" smtClean="0"/>
+            </a:p>
+            <a:p>
+              <a:r>
+                <a:rPr lang="el-GR" dirty="0" smtClean="0"/>
+                <a:t>ε</a:t>
+              </a:r>
+              <a:r>
+                <a:rPr lang="en-US" baseline="-25000" dirty="0" smtClean="0"/>
+                <a:t>1</a:t>
+              </a:r>
+              <a:endParaRPr lang="en-US" baseline="-25000" dirty="0"/>
+            </a:p>
+          </p:txBody>
+        </p:sp>
+        <p:sp>
+          <p:nvSpPr>
+            <p:cNvPr id="53" name="Rectangle 52"/>
+            <p:cNvSpPr/>
+            <p:nvPr/>
+          </p:nvSpPr>
+          <p:spPr>
+            <a:xfrm>
+              <a:off x="5806386" y="717974"/>
+              <a:ext cx="491353" cy="646331"/>
+            </a:xfrm>
+            <a:prstGeom prst="rect">
+              <a:avLst/>
+            </a:prstGeom>
+          </p:spPr>
+          <p:txBody>
+            <a:bodyPr wrap="none">
+              <a:spAutoFit/>
+            </a:bodyPr>
+            <a:lstStyle/>
+            <a:p>
+              <a:r>
+                <a:rPr lang="en-US" dirty="0" err="1"/>
+                <a:t>T</a:t>
+              </a:r>
+              <a:r>
+                <a:rPr lang="en-US" baseline="-25000" dirty="0" err="1"/>
+                <a:t>cov</a:t>
+              </a:r>
+              <a:endParaRPr lang="en-US" baseline="-25000" dirty="0"/>
+            </a:p>
+            <a:p>
+              <a:r>
+                <a:rPr lang="el-GR" dirty="0" smtClean="0"/>
+                <a:t>τ</a:t>
+              </a:r>
+              <a:r>
+                <a:rPr lang="en-US" baseline="-25000" dirty="0" err="1" smtClean="0"/>
+                <a:t>cov</a:t>
+              </a:r>
+              <a:endParaRPr lang="en-US" baseline="-25000" dirty="0"/>
+            </a:p>
+          </p:txBody>
+        </p:sp>
+        <p:sp>
+          <p:nvSpPr>
+            <p:cNvPr id="55" name="TextBox 54"/>
+            <p:cNvSpPr txBox="1"/>
+            <p:nvPr/>
+          </p:nvSpPr>
+          <p:spPr>
+            <a:xfrm>
+              <a:off x="784917" y="5545551"/>
+              <a:ext cx="7348422" cy="461665"/>
+            </a:xfrm>
+            <a:prstGeom prst="rect">
+              <a:avLst/>
+            </a:prstGeom>
+            <a:noFill/>
+          </p:spPr>
+          <p:txBody>
+            <a:bodyPr wrap="none" rtlCol="0">
+              <a:spAutoFit/>
+            </a:bodyPr>
+            <a:lstStyle/>
+            <a:p>
+              <a:r>
+                <a:rPr lang="en-US" sz="2400" dirty="0" err="1" smtClean="0"/>
+                <a:t>T</a:t>
+              </a:r>
+              <a:r>
+                <a:rPr lang="en-US" sz="2400" baseline="-25000" dirty="0" err="1" smtClean="0"/>
+                <a:t>tot</a:t>
+              </a:r>
+              <a:r>
+                <a:rPr lang="en-US" sz="2400" dirty="0" smtClean="0"/>
+                <a:t> = </a:t>
+              </a:r>
+              <a:r>
+                <a:rPr lang="en-US" sz="2400" dirty="0"/>
+                <a:t>(1-</a:t>
+              </a:r>
+              <a:r>
+                <a:rPr lang="el-GR" sz="2400" dirty="0"/>
+                <a:t> </a:t>
+              </a:r>
+              <a:r>
+                <a:rPr lang="el-GR" sz="2400" dirty="0" smtClean="0"/>
+                <a:t>ε</a:t>
+              </a:r>
+              <a:r>
+                <a:rPr lang="en-US" sz="2400" baseline="-25000" dirty="0" smtClean="0"/>
+                <a:t>1</a:t>
+              </a:r>
+              <a:r>
+                <a:rPr lang="en-US" sz="2400" dirty="0" smtClean="0"/>
+                <a:t>)</a:t>
+              </a:r>
+              <a:r>
+                <a:rPr lang="el-GR" sz="2400" dirty="0"/>
+                <a:t>τ</a:t>
+              </a:r>
+              <a:r>
+                <a:rPr lang="en-US" sz="2400" baseline="30000" dirty="0"/>
+                <a:t>2</a:t>
+              </a:r>
+              <a:r>
+                <a:rPr lang="en-US" sz="2400" baseline="-25000" dirty="0"/>
+                <a:t>cov</a:t>
+              </a:r>
+              <a:r>
+                <a:rPr lang="en-US" sz="2400" dirty="0"/>
+                <a:t> </a:t>
+              </a:r>
+              <a:r>
+                <a:rPr lang="en-US" sz="2400" dirty="0" err="1" smtClean="0"/>
+                <a:t>T</a:t>
+              </a:r>
+              <a:r>
+                <a:rPr lang="en-US" sz="2400" baseline="-25000" dirty="0" err="1" smtClean="0"/>
+                <a:t>amb</a:t>
+              </a:r>
+              <a:r>
+                <a:rPr lang="en-US" sz="2400" baseline="-25000" dirty="0" smtClean="0"/>
+                <a:t> </a:t>
+              </a:r>
+              <a:r>
+                <a:rPr lang="en-US" sz="2400" dirty="0" smtClean="0"/>
+                <a:t> + </a:t>
+              </a:r>
+              <a:r>
+                <a:rPr lang="en-US" sz="2400" dirty="0" smtClean="0">
+                  <a:solidFill>
+                    <a:srgbClr val="FF0000"/>
+                  </a:solidFill>
+                </a:rPr>
+                <a:t>(1 + </a:t>
+              </a:r>
+              <a:r>
+                <a:rPr lang="el-GR" sz="2400" dirty="0" smtClean="0">
+                  <a:solidFill>
+                    <a:srgbClr val="FF0000"/>
+                  </a:solidFill>
+                </a:rPr>
+                <a:t>τ</a:t>
+              </a:r>
+              <a:r>
+                <a:rPr lang="en-US" sz="2400" baseline="-25000" dirty="0" err="1">
+                  <a:solidFill>
+                    <a:srgbClr val="FF0000"/>
+                  </a:solidFill>
+                </a:rPr>
+                <a:t>cov</a:t>
+              </a:r>
+              <a:r>
+                <a:rPr lang="en-US" sz="2400" dirty="0">
+                  <a:solidFill>
+                    <a:srgbClr val="FF0000"/>
+                  </a:solidFill>
+                </a:rPr>
+                <a:t>(1-</a:t>
+              </a:r>
+              <a:r>
+                <a:rPr lang="el-GR" sz="2400" dirty="0">
+                  <a:solidFill>
+                    <a:srgbClr val="FF0000"/>
+                  </a:solidFill>
+                </a:rPr>
+                <a:t> </a:t>
+              </a:r>
+              <a:r>
+                <a:rPr lang="el-GR" sz="2400" dirty="0" smtClean="0">
+                  <a:solidFill>
+                    <a:srgbClr val="FF0000"/>
+                  </a:solidFill>
+                </a:rPr>
+                <a:t>ε</a:t>
+              </a:r>
+              <a:r>
+                <a:rPr lang="en-US" sz="2400" baseline="-25000" dirty="0" smtClean="0">
+                  <a:solidFill>
+                    <a:srgbClr val="FF0000"/>
+                  </a:solidFill>
+                </a:rPr>
+                <a:t>1</a:t>
+              </a:r>
+              <a:r>
+                <a:rPr lang="en-US" sz="2400" dirty="0" smtClean="0">
+                  <a:solidFill>
+                    <a:srgbClr val="FF0000"/>
+                  </a:solidFill>
+                </a:rPr>
+                <a:t>))(</a:t>
+              </a:r>
+              <a:r>
+                <a:rPr lang="en-US" sz="2400" dirty="0">
+                  <a:solidFill>
+                    <a:srgbClr val="FF0000"/>
+                  </a:solidFill>
+                </a:rPr>
+                <a:t>1-</a:t>
+              </a:r>
+              <a:r>
+                <a:rPr lang="el-GR" sz="2400" dirty="0">
+                  <a:solidFill>
+                    <a:srgbClr val="FF0000"/>
+                  </a:solidFill>
+                </a:rPr>
+                <a:t>τ</a:t>
+              </a:r>
+              <a:r>
+                <a:rPr lang="en-US" sz="2400" baseline="-25000" dirty="0" err="1" smtClean="0">
+                  <a:solidFill>
+                    <a:srgbClr val="FF0000"/>
+                  </a:solidFill>
+                </a:rPr>
+                <a:t>cov</a:t>
+              </a:r>
+              <a:r>
+                <a:rPr lang="en-US" sz="2400" dirty="0" smtClean="0">
+                  <a:solidFill>
+                    <a:srgbClr val="FF0000"/>
+                  </a:solidFill>
+                </a:rPr>
+                <a:t>)</a:t>
+              </a:r>
+              <a:r>
+                <a:rPr lang="en-US" sz="2400" dirty="0" err="1" smtClean="0">
+                  <a:solidFill>
+                    <a:srgbClr val="FF0000"/>
+                  </a:solidFill>
+                </a:rPr>
+                <a:t>T</a:t>
+              </a:r>
+              <a:r>
+                <a:rPr lang="en-US" sz="2400" baseline="-25000" dirty="0" err="1" smtClean="0">
+                  <a:solidFill>
+                    <a:srgbClr val="FF0000"/>
+                  </a:solidFill>
+                </a:rPr>
+                <a:t>cov</a:t>
+              </a:r>
+              <a:r>
+                <a:rPr lang="en-US" sz="2400" dirty="0"/>
+                <a:t> </a:t>
+              </a:r>
+              <a:r>
+                <a:rPr lang="en-US" sz="2400" dirty="0" smtClean="0"/>
+                <a:t>+ </a:t>
+              </a:r>
+              <a:r>
+                <a:rPr lang="el-GR" sz="2400" dirty="0">
+                  <a:solidFill>
+                    <a:srgbClr val="0070C0"/>
+                  </a:solidFill>
+                </a:rPr>
+                <a:t>τ</a:t>
+              </a:r>
+              <a:r>
+                <a:rPr lang="en-US" sz="2400" baseline="-25000" dirty="0" err="1">
+                  <a:solidFill>
+                    <a:srgbClr val="0070C0"/>
+                  </a:solidFill>
+                </a:rPr>
+                <a:t>cov</a:t>
+              </a:r>
+              <a:r>
+                <a:rPr lang="el-GR" sz="2400" dirty="0" smtClean="0">
+                  <a:solidFill>
+                    <a:srgbClr val="0070C0"/>
+                  </a:solidFill>
+                </a:rPr>
+                <a:t>ε</a:t>
+              </a:r>
+              <a:r>
+                <a:rPr lang="en-US" sz="2400" baseline="-25000" dirty="0" smtClean="0">
+                  <a:solidFill>
+                    <a:srgbClr val="0070C0"/>
+                  </a:solidFill>
+                </a:rPr>
+                <a:t>1</a:t>
+              </a:r>
+              <a:r>
+                <a:rPr lang="en-US" sz="2400" dirty="0" smtClean="0">
+                  <a:solidFill>
+                    <a:srgbClr val="0070C0"/>
+                  </a:solidFill>
+                </a:rPr>
+                <a:t>T</a:t>
+              </a:r>
+              <a:r>
+                <a:rPr lang="en-US" sz="2400" baseline="-25000" dirty="0" smtClean="0">
+                  <a:solidFill>
+                    <a:srgbClr val="0070C0"/>
+                  </a:solidFill>
+                </a:rPr>
+                <a:t>1</a:t>
+              </a:r>
+              <a:endParaRPr lang="en-US" sz="2400" baseline="-25000" dirty="0">
+                <a:solidFill>
+                  <a:srgbClr val="0070C0"/>
+                </a:solidFill>
+              </a:endParaRPr>
+            </a:p>
+          </p:txBody>
+        </p:sp>
+        <p:cxnSp>
+          <p:nvCxnSpPr>
+            <p:cNvPr id="58" name="Straight Connector 57"/>
+            <p:cNvCxnSpPr/>
+            <p:nvPr/>
+          </p:nvCxnSpPr>
+          <p:spPr>
+            <a:xfrm>
+              <a:off x="949416" y="3089238"/>
+              <a:ext cx="1106473" cy="1"/>
+            </a:xfrm>
+            <a:prstGeom prst="line">
+              <a:avLst/>
+            </a:prstGeom>
+            <a:ln w="38100">
+              <a:solidFill>
+                <a:schemeClr val="tx1"/>
+              </a:solidFill>
+            </a:ln>
+          </p:spPr>
+          <p:style>
+            <a:lnRef idx="1">
+              <a:schemeClr val="accent1"/>
+            </a:lnRef>
+            <a:fillRef idx="0">
+              <a:schemeClr val="accent1"/>
+            </a:fillRef>
+            <a:effectRef idx="0">
+              <a:schemeClr val="accent1"/>
+            </a:effectRef>
+            <a:fontRef idx="minor">
+              <a:schemeClr val="tx1"/>
+            </a:fontRef>
+          </p:style>
+        </p:cxnSp>
+        <p:cxnSp>
+          <p:nvCxnSpPr>
+            <p:cNvPr id="59" name="Straight Connector 58"/>
+            <p:cNvCxnSpPr/>
+            <p:nvPr/>
+          </p:nvCxnSpPr>
+          <p:spPr>
+            <a:xfrm>
+              <a:off x="949416" y="3303059"/>
+              <a:ext cx="1106473" cy="0"/>
+            </a:xfrm>
+            <a:prstGeom prst="line">
+              <a:avLst/>
+            </a:prstGeom>
+            <a:ln w="38100">
+              <a:solidFill>
+                <a:schemeClr val="tx1"/>
+              </a:solidFill>
+            </a:ln>
+          </p:spPr>
+          <p:style>
+            <a:lnRef idx="1">
+              <a:schemeClr val="accent1"/>
+            </a:lnRef>
+            <a:fillRef idx="0">
+              <a:schemeClr val="accent1"/>
+            </a:fillRef>
+            <a:effectRef idx="0">
+              <a:schemeClr val="accent1"/>
+            </a:effectRef>
+            <a:fontRef idx="minor">
+              <a:schemeClr val="tx1"/>
+            </a:fontRef>
+          </p:style>
+        </p:cxnSp>
+        <p:cxnSp>
+          <p:nvCxnSpPr>
+            <p:cNvPr id="60" name="Straight Connector 59"/>
+            <p:cNvCxnSpPr/>
+            <p:nvPr/>
+          </p:nvCxnSpPr>
+          <p:spPr>
+            <a:xfrm flipV="1">
+              <a:off x="2034504" y="2559506"/>
+              <a:ext cx="704016" cy="529733"/>
+            </a:xfrm>
+            <a:prstGeom prst="line">
+              <a:avLst/>
+            </a:prstGeom>
+            <a:ln w="38100">
+              <a:solidFill>
+                <a:schemeClr val="tx1"/>
+              </a:solidFill>
+            </a:ln>
+          </p:spPr>
+          <p:style>
+            <a:lnRef idx="1">
+              <a:schemeClr val="accent1"/>
+            </a:lnRef>
+            <a:fillRef idx="0">
+              <a:schemeClr val="accent1"/>
+            </a:fillRef>
+            <a:effectRef idx="0">
+              <a:schemeClr val="accent1"/>
+            </a:effectRef>
+            <a:fontRef idx="minor">
+              <a:schemeClr val="tx1"/>
+            </a:fontRef>
+          </p:style>
+        </p:cxnSp>
+        <p:cxnSp>
+          <p:nvCxnSpPr>
+            <p:cNvPr id="65" name="Straight Connector 64"/>
+            <p:cNvCxnSpPr/>
+            <p:nvPr/>
+          </p:nvCxnSpPr>
+          <p:spPr>
+            <a:xfrm>
+              <a:off x="2034504" y="3303059"/>
+              <a:ext cx="704016" cy="529733"/>
+            </a:xfrm>
+            <a:prstGeom prst="line">
+              <a:avLst/>
+            </a:prstGeom>
+            <a:ln w="38100">
+              <a:solidFill>
+                <a:schemeClr val="tx1"/>
+              </a:solidFill>
+            </a:ln>
+          </p:spPr>
+          <p:style>
+            <a:lnRef idx="1">
+              <a:schemeClr val="accent1"/>
+            </a:lnRef>
+            <a:fillRef idx="0">
+              <a:schemeClr val="accent1"/>
+            </a:fillRef>
+            <a:effectRef idx="0">
+              <a:schemeClr val="accent1"/>
+            </a:effectRef>
+            <a:fontRef idx="minor">
+              <a:schemeClr val="tx1"/>
+            </a:fontRef>
+          </p:style>
+        </p:cxnSp>
+      </p:grpSp>
+    </p:spTree>
+    <p:extLst>
+      <p:ext uri="{BB962C8B-B14F-4D97-AF65-F5344CB8AC3E}">
+        <p14:creationId xmlns:p14="http://schemas.microsoft.com/office/powerpoint/2010/main" val="2579324206"/>
+      </p:ext>
+    </p:extLst>
+  </p:cSld>
+  <p:clrMapOvr>
+    <a:masterClrMapping/>
+  </p:clrMapOvr>
 </p:sld>
 </file>
 

</xml_diff>

<commit_message>
Improvements to T_tot drawing
</commit_message>
<xml_diff>
--- a/support/thesis-drawings.pptx
+++ b/support/thesis-drawings.pptx
@@ -194,7 +194,7 @@
           <a:p>
             <a:fld id="{FE111C9F-A33E-4952-BC38-37E17DCB4FBF}" type="datetimeFigureOut">
               <a:rPr lang="en-US" smtClean="0"/>
-              <a:t>3/11/2014</a:t>
+              <a:t>3/14/2014</a:t>
             </a:fld>
             <a:endParaRPr lang="en-US"/>
           </a:p>
@@ -984,7 +984,7 @@
           <a:p>
             <a:fld id="{A6C27610-B903-4030-BF6B-58161B6517DA}" type="datetimeFigureOut">
               <a:rPr lang="en-US" smtClean="0"/>
-              <a:t>3/11/2014</a:t>
+              <a:t>3/14/2014</a:t>
             </a:fld>
             <a:endParaRPr lang="en-US"/>
           </a:p>
@@ -1154,7 +1154,7 @@
           <a:p>
             <a:fld id="{A6C27610-B903-4030-BF6B-58161B6517DA}" type="datetimeFigureOut">
               <a:rPr lang="en-US" smtClean="0"/>
-              <a:t>3/11/2014</a:t>
+              <a:t>3/14/2014</a:t>
             </a:fld>
             <a:endParaRPr lang="en-US"/>
           </a:p>
@@ -1334,7 +1334,7 @@
           <a:p>
             <a:fld id="{A6C27610-B903-4030-BF6B-58161B6517DA}" type="datetimeFigureOut">
               <a:rPr lang="en-US" smtClean="0"/>
-              <a:t>3/11/2014</a:t>
+              <a:t>3/14/2014</a:t>
             </a:fld>
             <a:endParaRPr lang="en-US"/>
           </a:p>
@@ -1504,7 +1504,7 @@
           <a:p>
             <a:fld id="{A6C27610-B903-4030-BF6B-58161B6517DA}" type="datetimeFigureOut">
               <a:rPr lang="en-US" smtClean="0"/>
-              <a:t>3/11/2014</a:t>
+              <a:t>3/14/2014</a:t>
             </a:fld>
             <a:endParaRPr lang="en-US"/>
           </a:p>
@@ -1750,7 +1750,7 @@
           <a:p>
             <a:fld id="{A6C27610-B903-4030-BF6B-58161B6517DA}" type="datetimeFigureOut">
               <a:rPr lang="en-US" smtClean="0"/>
-              <a:t>3/11/2014</a:t>
+              <a:t>3/14/2014</a:t>
             </a:fld>
             <a:endParaRPr lang="en-US"/>
           </a:p>
@@ -2038,7 +2038,7 @@
           <a:p>
             <a:fld id="{A6C27610-B903-4030-BF6B-58161B6517DA}" type="datetimeFigureOut">
               <a:rPr lang="en-US" smtClean="0"/>
-              <a:t>3/11/2014</a:t>
+              <a:t>3/14/2014</a:t>
             </a:fld>
             <a:endParaRPr lang="en-US"/>
           </a:p>
@@ -2460,7 +2460,7 @@
           <a:p>
             <a:fld id="{A6C27610-B903-4030-BF6B-58161B6517DA}" type="datetimeFigureOut">
               <a:rPr lang="en-US" smtClean="0"/>
-              <a:t>3/11/2014</a:t>
+              <a:t>3/14/2014</a:t>
             </a:fld>
             <a:endParaRPr lang="en-US"/>
           </a:p>
@@ -2578,7 +2578,7 @@
           <a:p>
             <a:fld id="{A6C27610-B903-4030-BF6B-58161B6517DA}" type="datetimeFigureOut">
               <a:rPr lang="en-US" smtClean="0"/>
-              <a:t>3/11/2014</a:t>
+              <a:t>3/14/2014</a:t>
             </a:fld>
             <a:endParaRPr lang="en-US"/>
           </a:p>
@@ -2673,7 +2673,7 @@
           <a:p>
             <a:fld id="{A6C27610-B903-4030-BF6B-58161B6517DA}" type="datetimeFigureOut">
               <a:rPr lang="en-US" smtClean="0"/>
-              <a:t>3/11/2014</a:t>
+              <a:t>3/14/2014</a:t>
             </a:fld>
             <a:endParaRPr lang="en-US"/>
           </a:p>
@@ -2950,7 +2950,7 @@
           <a:p>
             <a:fld id="{A6C27610-B903-4030-BF6B-58161B6517DA}" type="datetimeFigureOut">
               <a:rPr lang="en-US" smtClean="0"/>
-              <a:t>3/11/2014</a:t>
+              <a:t>3/14/2014</a:t>
             </a:fld>
             <a:endParaRPr lang="en-US"/>
           </a:p>
@@ -3203,7 +3203,7 @@
           <a:p>
             <a:fld id="{A6C27610-B903-4030-BF6B-58161B6517DA}" type="datetimeFigureOut">
               <a:rPr lang="en-US" smtClean="0"/>
-              <a:t>3/11/2014</a:t>
+              <a:t>3/14/2014</a:t>
             </a:fld>
             <a:endParaRPr lang="en-US"/>
           </a:p>
@@ -3416,7 +3416,7 @@
           <a:p>
             <a:fld id="{A6C27610-B903-4030-BF6B-58161B6517DA}" type="datetimeFigureOut">
               <a:rPr lang="en-US" smtClean="0"/>
-              <a:t>3/11/2014</a:t>
+              <a:t>3/14/2014</a:t>
             </a:fld>
             <a:endParaRPr lang="en-US"/>
           </a:p>
@@ -6362,16 +6362,16 @@
       </p:grpSpPr>
       <p:grpSp>
         <p:nvGrpSpPr>
-          <p:cNvPr id="68" name="Group 67"/>
+          <p:cNvPr id="35" name="Group 34"/>
           <p:cNvGrpSpPr/>
           <p:nvPr/>
         </p:nvGrpSpPr>
         <p:grpSpPr>
           <a:xfrm>
-            <a:off x="784917" y="717973"/>
-            <a:ext cx="7465506" cy="5289243"/>
-            <a:chOff x="784917" y="717973"/>
-            <a:chExt cx="7465506" cy="5289243"/>
+            <a:off x="748341" y="699685"/>
+            <a:ext cx="7943072" cy="4923483"/>
+            <a:chOff x="748341" y="699685"/>
+            <a:chExt cx="7943072" cy="4923483"/>
           </a:xfrm>
         </p:grpSpPr>
         <p:sp>
@@ -6382,8 +6382,8 @@
           </p:nvSpPr>
           <p:spPr>
             <a:xfrm>
-              <a:off x="7750551" y="1383192"/>
-              <a:ext cx="499872" cy="3950208"/>
+              <a:off x="7750551" y="1364304"/>
+              <a:ext cx="499872" cy="3427152"/>
             </a:xfrm>
             <a:prstGeom prst="rect">
               <a:avLst/>
@@ -6424,7 +6424,9 @@
             <a:lstStyle/>
             <a:p>
               <a:pPr algn="ctr"/>
-              <a:endParaRPr lang="en-US"/>
+              <a:endParaRPr lang="en-US">
+                <a:latin typeface="Palatino Linotype" panose="02040502050505030304" pitchFamily="18" charset="0"/>
+              </a:endParaRPr>
             </a:p>
           </p:txBody>
         </p:sp>
@@ -6436,8 +6438,8 @@
           </p:nvCxnSpPr>
           <p:spPr>
             <a:xfrm>
-              <a:off x="6009863" y="1364305"/>
-              <a:ext cx="24384" cy="3950208"/>
+              <a:off x="5680679" y="1364305"/>
+              <a:ext cx="24384" cy="3427151"/>
             </a:xfrm>
             <a:prstGeom prst="line">
               <a:avLst/>
@@ -6471,8 +6473,8 @@
           </p:nvCxnSpPr>
           <p:spPr>
             <a:xfrm>
-              <a:off x="4242816" y="1870872"/>
-              <a:ext cx="1694688" cy="0"/>
+              <a:off x="4114800" y="1870872"/>
+              <a:ext cx="3537032" cy="0"/>
             </a:xfrm>
             <a:prstGeom prst="straightConnector1">
               <a:avLst/>
@@ -6481,7 +6483,9 @@
               <a:solidFill>
                 <a:schemeClr val="tx1"/>
               </a:solidFill>
-              <a:tailEnd type="arrow"/>
+              <a:round/>
+              <a:headEnd type="none" w="med" len="med"/>
+              <a:tailEnd type="none" w="med" len="med"/>
             </a:ln>
           </p:spPr>
           <p:style>
@@ -6507,8 +6511,8 @@
           </p:nvSpPr>
           <p:spPr>
             <a:xfrm>
-              <a:off x="4857093" y="1442366"/>
-              <a:ext cx="556178" cy="369332"/>
+              <a:off x="4555787" y="1501540"/>
+              <a:ext cx="605294" cy="369332"/>
             </a:xfrm>
             <a:prstGeom prst="rect">
               <a:avLst/>
@@ -6522,53 +6526,23 @@
             <a:lstStyle/>
             <a:p>
               <a:r>
-                <a:rPr lang="en-US" dirty="0" err="1" smtClean="0"/>
+                <a:rPr lang="en-US" dirty="0" err="1" smtClean="0">
+                  <a:latin typeface="Palatino Linotype" panose="02040502050505030304" pitchFamily="18" charset="0"/>
+                </a:rPr>
                 <a:t>T</a:t>
               </a:r>
               <a:r>
-                <a:rPr lang="en-US" baseline="-25000" dirty="0" err="1" smtClean="0"/>
+                <a:rPr lang="en-US" baseline="-25000" dirty="0" err="1" smtClean="0">
+                  <a:latin typeface="Palatino Linotype" panose="02040502050505030304" pitchFamily="18" charset="0"/>
+                </a:rPr>
                 <a:t>amb</a:t>
               </a:r>
-              <a:endParaRPr lang="en-US" baseline="-25000" dirty="0"/>
+              <a:endParaRPr lang="en-US" baseline="-25000" dirty="0">
+                <a:latin typeface="Palatino Linotype" panose="02040502050505030304" pitchFamily="18" charset="0"/>
+              </a:endParaRPr>
             </a:p>
           </p:txBody>
         </p:sp>
-        <p:cxnSp>
-          <p:nvCxnSpPr>
-            <p:cNvPr id="11" name="Straight Arrow Connector 10"/>
-            <p:cNvCxnSpPr/>
-            <p:nvPr/>
-          </p:nvCxnSpPr>
-          <p:spPr>
-            <a:xfrm>
-              <a:off x="6089904" y="1864776"/>
-              <a:ext cx="1292352" cy="0"/>
-            </a:xfrm>
-            <a:prstGeom prst="straightConnector1">
-              <a:avLst/>
-            </a:prstGeom>
-            <a:ln w="25400">
-              <a:solidFill>
-                <a:schemeClr val="tx1"/>
-              </a:solidFill>
-              <a:tailEnd type="arrow"/>
-            </a:ln>
-          </p:spPr>
-          <p:style>
-            <a:lnRef idx="1">
-              <a:schemeClr val="accent1"/>
-            </a:lnRef>
-            <a:fillRef idx="0">
-              <a:schemeClr val="accent1"/>
-            </a:fillRef>
-            <a:effectRef idx="0">
-              <a:schemeClr val="accent1"/>
-            </a:effectRef>
-            <a:fontRef idx="minor">
-              <a:schemeClr val="tx1"/>
-            </a:fontRef>
-          </p:style>
-        </p:cxnSp>
         <p:sp>
           <p:nvSpPr>
             <p:cNvPr id="14" name="TextBox 13"/>
@@ -6577,8 +6551,8 @@
           </p:nvSpPr>
           <p:spPr>
             <a:xfrm>
-              <a:off x="6303264" y="1442366"/>
-              <a:ext cx="913263" cy="369332"/>
+              <a:off x="6184490" y="1501540"/>
+              <a:ext cx="1014060" cy="369332"/>
             </a:xfrm>
             <a:prstGeom prst="rect">
               <a:avLst/>
@@ -6592,65 +6566,41 @@
             <a:lstStyle/>
             <a:p>
               <a:r>
-                <a:rPr lang="el-GR" dirty="0" smtClean="0"/>
+                <a:rPr lang="el-GR" dirty="0" smtClean="0">
+                  <a:latin typeface="Palatino Linotype" panose="02040502050505030304" pitchFamily="18" charset="0"/>
+                </a:rPr>
                 <a:t>τ</a:t>
               </a:r>
               <a:r>
-                <a:rPr lang="en-US" baseline="-25000" dirty="0" err="1" smtClean="0"/>
+                <a:rPr lang="en-US" baseline="-25000" dirty="0" err="1" smtClean="0">
+                  <a:latin typeface="Palatino Linotype" panose="02040502050505030304" pitchFamily="18" charset="0"/>
+                </a:rPr>
                 <a:t>cov</a:t>
               </a:r>
               <a:r>
-                <a:rPr lang="en-US" dirty="0"/>
+                <a:rPr lang="en-US" dirty="0">
+                  <a:latin typeface="Palatino Linotype" panose="02040502050505030304" pitchFamily="18" charset="0"/>
+                </a:rPr>
                 <a:t> </a:t>
               </a:r>
               <a:r>
-                <a:rPr lang="en-US" dirty="0" err="1"/>
+                <a:rPr lang="en-US" dirty="0" err="1">
+                  <a:latin typeface="Palatino Linotype" panose="02040502050505030304" pitchFamily="18" charset="0"/>
+                </a:rPr>
                 <a:t>T</a:t>
               </a:r>
               <a:r>
-                <a:rPr lang="en-US" baseline="-25000" dirty="0" err="1"/>
+                <a:rPr lang="en-US" baseline="-25000" dirty="0" err="1">
+                  <a:latin typeface="Palatino Linotype" panose="02040502050505030304" pitchFamily="18" charset="0"/>
+                </a:rPr>
                 <a:t>amb</a:t>
               </a:r>
-              <a:endParaRPr lang="en-US" baseline="-25000" dirty="0"/>
+              <a:endParaRPr lang="en-US" baseline="-25000" dirty="0">
+                <a:latin typeface="Palatino Linotype" panose="02040502050505030304" pitchFamily="18" charset="0"/>
+              </a:endParaRPr>
             </a:p>
           </p:txBody>
         </p:sp>
-        <p:cxnSp>
-          <p:nvCxnSpPr>
-            <p:cNvPr id="15" name="Straight Arrow Connector 14"/>
-            <p:cNvCxnSpPr/>
-            <p:nvPr/>
-          </p:nvCxnSpPr>
-          <p:spPr>
-            <a:xfrm flipH="1">
-              <a:off x="6089904" y="2382936"/>
-              <a:ext cx="1554566" cy="0"/>
-            </a:xfrm>
-            <a:prstGeom prst="straightConnector1">
-              <a:avLst/>
-            </a:prstGeom>
-            <a:ln w="25400">
-              <a:solidFill>
-                <a:schemeClr val="tx1"/>
-              </a:solidFill>
-              <a:tailEnd type="arrow"/>
-            </a:ln>
-          </p:spPr>
-          <p:style>
-            <a:lnRef idx="1">
-              <a:schemeClr val="accent1"/>
-            </a:lnRef>
-            <a:fillRef idx="0">
-              <a:schemeClr val="accent1"/>
-            </a:fillRef>
-            <a:effectRef idx="0">
-              <a:schemeClr val="accent1"/>
-            </a:effectRef>
-            <a:fontRef idx="minor">
-              <a:schemeClr val="tx1"/>
-            </a:fontRef>
-          </p:style>
-        </p:cxnSp>
         <p:sp>
           <p:nvSpPr>
             <p:cNvPr id="18" name="TextBox 17"/>
@@ -6659,8 +6609,8 @@
           </p:nvSpPr>
           <p:spPr>
             <a:xfrm>
-              <a:off x="6089904" y="1923950"/>
-              <a:ext cx="1479123" cy="369332"/>
+              <a:off x="5888736" y="1997102"/>
+              <a:ext cx="1605568" cy="369332"/>
             </a:xfrm>
             <a:prstGeom prst="rect">
               <a:avLst/>
@@ -6674,46 +6624,68 @@
             <a:lstStyle/>
             <a:p>
               <a:r>
-                <a:rPr lang="en-US" dirty="0" smtClean="0"/>
+                <a:rPr lang="en-US" dirty="0" smtClean="0">
+                  <a:latin typeface="Palatino Linotype" panose="02040502050505030304" pitchFamily="18" charset="0"/>
+                </a:rPr>
                 <a:t>(1-</a:t>
               </a:r>
               <a:r>
-                <a:rPr lang="el-GR" dirty="0"/>
+                <a:rPr lang="el-GR" dirty="0">
+                  <a:latin typeface="Palatino Linotype" panose="02040502050505030304" pitchFamily="18" charset="0"/>
+                </a:rPr>
                 <a:t> </a:t>
               </a:r>
               <a:r>
-                <a:rPr lang="el-GR" dirty="0" smtClean="0"/>
+                <a:rPr lang="el-GR" dirty="0" smtClean="0">
+                  <a:latin typeface="Palatino Linotype" panose="02040502050505030304" pitchFamily="18" charset="0"/>
+                </a:rPr>
                 <a:t>ε</a:t>
               </a:r>
               <a:r>
-                <a:rPr lang="en-US" baseline="-25000" dirty="0" smtClean="0"/>
+                <a:rPr lang="en-US" baseline="-25000" dirty="0" smtClean="0">
+                  <a:latin typeface="Palatino Linotype" panose="02040502050505030304" pitchFamily="18" charset="0"/>
+                </a:rPr>
                 <a:t>1</a:t>
               </a:r>
               <a:r>
-                <a:rPr lang="en-US" dirty="0"/>
+                <a:rPr lang="en-US" dirty="0">
+                  <a:latin typeface="Palatino Linotype" panose="02040502050505030304" pitchFamily="18" charset="0"/>
+                </a:rPr>
                 <a:t>)</a:t>
               </a:r>
               <a:r>
-                <a:rPr lang="el-GR" dirty="0" smtClean="0"/>
+                <a:rPr lang="el-GR" dirty="0" smtClean="0">
+                  <a:latin typeface="Palatino Linotype" panose="02040502050505030304" pitchFamily="18" charset="0"/>
+                </a:rPr>
                 <a:t>τ</a:t>
               </a:r>
               <a:r>
-                <a:rPr lang="en-US" baseline="-25000" dirty="0" err="1" smtClean="0"/>
+                <a:rPr lang="en-US" baseline="-25000" dirty="0" err="1" smtClean="0">
+                  <a:latin typeface="Palatino Linotype" panose="02040502050505030304" pitchFamily="18" charset="0"/>
+                </a:rPr>
                 <a:t>cov</a:t>
               </a:r>
               <a:r>
-                <a:rPr lang="en-US" dirty="0"/>
+                <a:rPr lang="en-US" dirty="0">
+                  <a:latin typeface="Palatino Linotype" panose="02040502050505030304" pitchFamily="18" charset="0"/>
+                </a:rPr>
                 <a:t> </a:t>
               </a:r>
               <a:r>
-                <a:rPr lang="en-US" dirty="0" err="1"/>
+                <a:rPr lang="en-US" dirty="0" err="1">
+                  <a:latin typeface="Palatino Linotype" panose="02040502050505030304" pitchFamily="18" charset="0"/>
+                </a:rPr>
                 <a:t>T</a:t>
               </a:r>
               <a:r>
-                <a:rPr lang="en-US" baseline="-25000" dirty="0" err="1"/>
+                <a:rPr lang="en-US" baseline="-25000" dirty="0" err="1">
+                  <a:latin typeface="Palatino Linotype" panose="02040502050505030304" pitchFamily="18" charset="0"/>
+                </a:rPr>
                 <a:t>amb</a:t>
               </a:r>
-              <a:endParaRPr lang="en-US" baseline="-25000" dirty="0"/>
+              <a:endParaRPr lang="en-US" baseline="-25000" dirty="0">
+                <a:latin typeface="Palatino Linotype" panose="02040502050505030304" pitchFamily="18" charset="0"/>
+              </a:endParaRPr>
             </a:p>
           </p:txBody>
         </p:sp>
@@ -6725,8 +6697,8 @@
           </p:nvCxnSpPr>
           <p:spPr>
             <a:xfrm flipH="1">
-              <a:off x="4364650" y="2370744"/>
-              <a:ext cx="1554566" cy="0"/>
+              <a:off x="4035466" y="2379888"/>
+              <a:ext cx="3616366" cy="0"/>
             </a:xfrm>
             <a:prstGeom prst="straightConnector1">
               <a:avLst/>
@@ -6761,8 +6733,8 @@
           </p:nvSpPr>
           <p:spPr>
             <a:xfrm>
-              <a:off x="4382938" y="1923950"/>
-              <a:ext cx="1557671" cy="369332"/>
+              <a:off x="4017178" y="1987958"/>
+              <a:ext cx="1682512" cy="369332"/>
             </a:xfrm>
             <a:prstGeom prst="rect">
               <a:avLst/>
@@ -6776,50 +6748,74 @@
             <a:lstStyle/>
             <a:p>
               <a:r>
-                <a:rPr lang="en-US" dirty="0" smtClean="0"/>
+                <a:rPr lang="en-US" dirty="0" smtClean="0">
+                  <a:latin typeface="Palatino Linotype" panose="02040502050505030304" pitchFamily="18" charset="0"/>
+                </a:rPr>
                 <a:t>(1-</a:t>
               </a:r>
               <a:r>
-                <a:rPr lang="el-GR" dirty="0"/>
+                <a:rPr lang="el-GR" dirty="0">
+                  <a:latin typeface="Palatino Linotype" panose="02040502050505030304" pitchFamily="18" charset="0"/>
+                </a:rPr>
                 <a:t> </a:t>
               </a:r>
               <a:r>
-                <a:rPr lang="el-GR" dirty="0" smtClean="0"/>
+                <a:rPr lang="el-GR" dirty="0" smtClean="0">
+                  <a:latin typeface="Palatino Linotype" panose="02040502050505030304" pitchFamily="18" charset="0"/>
+                </a:rPr>
                 <a:t>ε</a:t>
               </a:r>
               <a:r>
-                <a:rPr lang="en-US" baseline="-25000" dirty="0" smtClean="0"/>
+                <a:rPr lang="en-US" baseline="-25000" dirty="0" smtClean="0">
+                  <a:latin typeface="Palatino Linotype" panose="02040502050505030304" pitchFamily="18" charset="0"/>
+                </a:rPr>
                 <a:t>1</a:t>
               </a:r>
               <a:r>
-                <a:rPr lang="en-US" dirty="0" smtClean="0"/>
+                <a:rPr lang="en-US" dirty="0" smtClean="0">
+                  <a:latin typeface="Palatino Linotype" panose="02040502050505030304" pitchFamily="18" charset="0"/>
+                </a:rPr>
                 <a:t>)</a:t>
               </a:r>
               <a:r>
-                <a:rPr lang="el-GR" dirty="0" smtClean="0"/>
+                <a:rPr lang="el-GR" dirty="0" smtClean="0">
+                  <a:latin typeface="Palatino Linotype" panose="02040502050505030304" pitchFamily="18" charset="0"/>
+                </a:rPr>
                 <a:t>τ</a:t>
               </a:r>
               <a:r>
-                <a:rPr lang="en-US" baseline="30000" dirty="0" smtClean="0"/>
+                <a:rPr lang="en-US" baseline="30000" dirty="0" smtClean="0">
+                  <a:latin typeface="Palatino Linotype" panose="02040502050505030304" pitchFamily="18" charset="0"/>
+                </a:rPr>
                 <a:t>2</a:t>
               </a:r>
               <a:r>
-                <a:rPr lang="en-US" baseline="-25000" dirty="0" smtClean="0"/>
+                <a:rPr lang="en-US" baseline="-25000" dirty="0" smtClean="0">
+                  <a:latin typeface="Palatino Linotype" panose="02040502050505030304" pitchFamily="18" charset="0"/>
+                </a:rPr>
                 <a:t>cov</a:t>
               </a:r>
               <a:r>
-                <a:rPr lang="en-US" dirty="0" smtClean="0"/>
+                <a:rPr lang="en-US" dirty="0" smtClean="0">
+                  <a:latin typeface="Palatino Linotype" panose="02040502050505030304" pitchFamily="18" charset="0"/>
+                </a:rPr>
                 <a:t> </a:t>
               </a:r>
               <a:r>
-                <a:rPr lang="en-US" dirty="0" err="1"/>
+                <a:rPr lang="en-US" dirty="0" err="1">
+                  <a:latin typeface="Palatino Linotype" panose="02040502050505030304" pitchFamily="18" charset="0"/>
+                </a:rPr>
                 <a:t>T</a:t>
               </a:r>
               <a:r>
-                <a:rPr lang="en-US" baseline="-25000" dirty="0" err="1"/>
+                <a:rPr lang="en-US" baseline="-25000" dirty="0" err="1">
+                  <a:latin typeface="Palatino Linotype" panose="02040502050505030304" pitchFamily="18" charset="0"/>
+                </a:rPr>
                 <a:t>amb</a:t>
               </a:r>
-              <a:endParaRPr lang="en-US" baseline="-25000" dirty="0"/>
+              <a:endParaRPr lang="en-US" baseline="-25000" dirty="0">
+                <a:latin typeface="Palatino Linotype" panose="02040502050505030304" pitchFamily="18" charset="0"/>
+              </a:endParaRPr>
             </a:p>
           </p:txBody>
         </p:sp>
@@ -6831,8 +6827,8 @@
           </p:nvCxnSpPr>
           <p:spPr>
             <a:xfrm>
-              <a:off x="6101294" y="3480216"/>
-              <a:ext cx="1292352" cy="0"/>
+              <a:off x="5751315" y="3251616"/>
+              <a:ext cx="1900517" cy="40"/>
             </a:xfrm>
             <a:prstGeom prst="straightConnector1">
               <a:avLst/>
@@ -6841,7 +6837,8 @@
               <a:solidFill>
                 <a:srgbClr val="FF0000"/>
               </a:solidFill>
-              <a:tailEnd type="arrow"/>
+              <a:headEnd type="none" w="med" len="med"/>
+              <a:tailEnd type="none" w="med" len="med"/>
             </a:ln>
           </p:spPr>
           <p:style>
@@ -6867,8 +6864,8 @@
           </p:nvSpPr>
           <p:spPr>
             <a:xfrm>
-              <a:off x="6101294" y="3000027"/>
-              <a:ext cx="1124154" cy="369332"/>
+              <a:off x="6107492" y="2890299"/>
+              <a:ext cx="1245534" cy="369332"/>
             </a:xfrm>
             <a:prstGeom prst="rect">
               <a:avLst/>
@@ -6886,6 +6883,7 @@
                   <a:solidFill>
                     <a:srgbClr val="FF0000"/>
                   </a:solidFill>
+                  <a:latin typeface="Palatino Linotype" panose="02040502050505030304" pitchFamily="18" charset="0"/>
                 </a:rPr>
                 <a:t>(1-</a:t>
               </a:r>
@@ -6894,6 +6892,7 @@
                   <a:solidFill>
                     <a:srgbClr val="FF0000"/>
                   </a:solidFill>
+                  <a:latin typeface="Palatino Linotype" panose="02040502050505030304" pitchFamily="18" charset="0"/>
                 </a:rPr>
                 <a:t>τ</a:t>
               </a:r>
@@ -6902,6 +6901,7 @@
                   <a:solidFill>
                     <a:srgbClr val="FF0000"/>
                   </a:solidFill>
+                  <a:latin typeface="Palatino Linotype" panose="02040502050505030304" pitchFamily="18" charset="0"/>
                 </a:rPr>
                 <a:t>cov</a:t>
               </a:r>
@@ -6910,6 +6910,7 @@
                   <a:solidFill>
                     <a:srgbClr val="FF0000"/>
                   </a:solidFill>
+                  <a:latin typeface="Palatino Linotype" panose="02040502050505030304" pitchFamily="18" charset="0"/>
                 </a:rPr>
                 <a:t>)</a:t>
               </a:r>
@@ -6918,6 +6919,7 @@
                   <a:solidFill>
                     <a:srgbClr val="FF0000"/>
                   </a:solidFill>
+                  <a:latin typeface="Palatino Linotype" panose="02040502050505030304" pitchFamily="18" charset="0"/>
                 </a:rPr>
                 <a:t>T</a:t>
               </a:r>
@@ -6926,6 +6928,7 @@
                   <a:solidFill>
                     <a:srgbClr val="FF0000"/>
                   </a:solidFill>
+                  <a:latin typeface="Palatino Linotype" panose="02040502050505030304" pitchFamily="18" charset="0"/>
                 </a:rPr>
                 <a:t>cov</a:t>
               </a:r>
@@ -6933,6 +6936,7 @@
                 <a:solidFill>
                   <a:srgbClr val="FF0000"/>
                 </a:solidFill>
+                <a:latin typeface="Palatino Linotype" panose="02040502050505030304" pitchFamily="18" charset="0"/>
               </a:endParaRPr>
             </a:p>
           </p:txBody>
@@ -6945,8 +6949,8 @@
           </p:nvCxnSpPr>
           <p:spPr>
             <a:xfrm flipH="1">
-              <a:off x="4518462" y="3480216"/>
-              <a:ext cx="1280160" cy="0"/>
+              <a:off x="4189278" y="3251616"/>
+              <a:ext cx="1431235" cy="0"/>
             </a:xfrm>
             <a:prstGeom prst="straightConnector1">
               <a:avLst/>
@@ -6981,8 +6985,8 @@
           </p:nvSpPr>
           <p:spPr>
             <a:xfrm>
-              <a:off x="4443984" y="2970077"/>
-              <a:ext cx="1124154" cy="369332"/>
+              <a:off x="4288536" y="2887781"/>
+              <a:ext cx="1245534" cy="369332"/>
             </a:xfrm>
             <a:prstGeom prst="rect">
               <a:avLst/>
@@ -7000,6 +7004,7 @@
                   <a:solidFill>
                     <a:srgbClr val="FF0000"/>
                   </a:solidFill>
+                  <a:latin typeface="Palatino Linotype" panose="02040502050505030304" pitchFamily="18" charset="0"/>
                 </a:rPr>
                 <a:t>(1-</a:t>
               </a:r>
@@ -7008,6 +7013,7 @@
                   <a:solidFill>
                     <a:srgbClr val="FF0000"/>
                   </a:solidFill>
+                  <a:latin typeface="Palatino Linotype" panose="02040502050505030304" pitchFamily="18" charset="0"/>
                 </a:rPr>
                 <a:t>τ</a:t>
               </a:r>
@@ -7016,6 +7022,7 @@
                   <a:solidFill>
                     <a:srgbClr val="FF0000"/>
                   </a:solidFill>
+                  <a:latin typeface="Palatino Linotype" panose="02040502050505030304" pitchFamily="18" charset="0"/>
                 </a:rPr>
                 <a:t>cov</a:t>
               </a:r>
@@ -7024,6 +7031,7 @@
                   <a:solidFill>
                     <a:srgbClr val="FF0000"/>
                   </a:solidFill>
+                  <a:latin typeface="Palatino Linotype" panose="02040502050505030304" pitchFamily="18" charset="0"/>
                 </a:rPr>
                 <a:t>)</a:t>
               </a:r>
@@ -7032,6 +7040,7 @@
                   <a:solidFill>
                     <a:srgbClr val="FF0000"/>
                   </a:solidFill>
+                  <a:latin typeface="Palatino Linotype" panose="02040502050505030304" pitchFamily="18" charset="0"/>
                 </a:rPr>
                 <a:t>T</a:t>
               </a:r>
@@ -7040,6 +7049,7 @@
                   <a:solidFill>
                     <a:srgbClr val="FF0000"/>
                   </a:solidFill>
+                  <a:latin typeface="Palatino Linotype" panose="02040502050505030304" pitchFamily="18" charset="0"/>
                 </a:rPr>
                 <a:t>cov</a:t>
               </a:r>
@@ -7047,6 +7057,7 @@
                 <a:solidFill>
                   <a:srgbClr val="FF0000"/>
                 </a:solidFill>
+                <a:latin typeface="Palatino Linotype" panose="02040502050505030304" pitchFamily="18" charset="0"/>
               </a:endParaRPr>
             </a:p>
           </p:txBody>
@@ -7059,8 +7070,8 @@
           </p:nvCxnSpPr>
           <p:spPr>
             <a:xfrm flipH="1">
-              <a:off x="6159005" y="4038132"/>
-              <a:ext cx="1454986" cy="0"/>
+              <a:off x="3523069" y="3760170"/>
+              <a:ext cx="4128763" cy="1148"/>
             </a:xfrm>
             <a:prstGeom prst="straightConnector1">
               <a:avLst/>
@@ -7095,8 +7106,8 @@
           </p:nvSpPr>
           <p:spPr>
             <a:xfrm>
-              <a:off x="6034247" y="3596444"/>
-              <a:ext cx="1690014" cy="369332"/>
+              <a:off x="5811739" y="3391424"/>
+              <a:ext cx="1837041" cy="369332"/>
             </a:xfrm>
             <a:prstGeom prst="rect">
               <a:avLst/>
@@ -7114,6 +7125,7 @@
                   <a:solidFill>
                     <a:srgbClr val="FF0000"/>
                   </a:solidFill>
+                  <a:latin typeface="Palatino Linotype" panose="02040502050505030304" pitchFamily="18" charset="0"/>
                 </a:rPr>
                 <a:t>(1-</a:t>
               </a:r>
@@ -7122,6 +7134,7 @@
                   <a:solidFill>
                     <a:srgbClr val="FF0000"/>
                   </a:solidFill>
+                  <a:latin typeface="Palatino Linotype" panose="02040502050505030304" pitchFamily="18" charset="0"/>
                 </a:rPr>
                 <a:t> </a:t>
               </a:r>
@@ -7130,6 +7143,7 @@
                   <a:solidFill>
                     <a:srgbClr val="FF0000"/>
                   </a:solidFill>
+                  <a:latin typeface="Palatino Linotype" panose="02040502050505030304" pitchFamily="18" charset="0"/>
                 </a:rPr>
                 <a:t>ε</a:t>
               </a:r>
@@ -7138,6 +7152,7 @@
                   <a:solidFill>
                     <a:srgbClr val="FF0000"/>
                   </a:solidFill>
+                  <a:latin typeface="Palatino Linotype" panose="02040502050505030304" pitchFamily="18" charset="0"/>
                 </a:rPr>
                 <a:t>1</a:t>
               </a:r>
@@ -7146,6 +7161,7 @@
                   <a:solidFill>
                     <a:srgbClr val="FF0000"/>
                   </a:solidFill>
+                  <a:latin typeface="Palatino Linotype" panose="02040502050505030304" pitchFamily="18" charset="0"/>
                 </a:rPr>
                 <a:t>)(1-</a:t>
               </a:r>
@@ -7154,6 +7170,7 @@
                   <a:solidFill>
                     <a:srgbClr val="FF0000"/>
                   </a:solidFill>
+                  <a:latin typeface="Palatino Linotype" panose="02040502050505030304" pitchFamily="18" charset="0"/>
                 </a:rPr>
                 <a:t>τ</a:t>
               </a:r>
@@ -7162,6 +7179,7 @@
                   <a:solidFill>
                     <a:srgbClr val="FF0000"/>
                   </a:solidFill>
+                  <a:latin typeface="Palatino Linotype" panose="02040502050505030304" pitchFamily="18" charset="0"/>
                 </a:rPr>
                 <a:t>cov</a:t>
               </a:r>
@@ -7170,6 +7188,7 @@
                   <a:solidFill>
                     <a:srgbClr val="FF0000"/>
                   </a:solidFill>
+                  <a:latin typeface="Palatino Linotype" panose="02040502050505030304" pitchFamily="18" charset="0"/>
                 </a:rPr>
                 <a:t>)</a:t>
               </a:r>
@@ -7178,6 +7197,7 @@
                   <a:solidFill>
                     <a:srgbClr val="FF0000"/>
                   </a:solidFill>
+                  <a:latin typeface="Palatino Linotype" panose="02040502050505030304" pitchFamily="18" charset="0"/>
                 </a:rPr>
                 <a:t>T</a:t>
               </a:r>
@@ -7186,6 +7206,7 @@
                   <a:solidFill>
                     <a:srgbClr val="FF0000"/>
                   </a:solidFill>
+                  <a:latin typeface="Palatino Linotype" panose="02040502050505030304" pitchFamily="18" charset="0"/>
                 </a:rPr>
                 <a:t>cov</a:t>
               </a:r>
@@ -7193,46 +7214,11 @@
                 <a:solidFill>
                   <a:srgbClr val="FF0000"/>
                 </a:solidFill>
+                <a:latin typeface="Palatino Linotype" panose="02040502050505030304" pitchFamily="18" charset="0"/>
               </a:endParaRPr>
             </a:p>
           </p:txBody>
         </p:sp>
-        <p:cxnSp>
-          <p:nvCxnSpPr>
-            <p:cNvPr id="44" name="Straight Arrow Connector 43"/>
-            <p:cNvCxnSpPr/>
-            <p:nvPr/>
-          </p:nvCxnSpPr>
-          <p:spPr>
-            <a:xfrm flipH="1">
-              <a:off x="4518462" y="4089814"/>
-              <a:ext cx="1343771" cy="0"/>
-            </a:xfrm>
-            <a:prstGeom prst="straightConnector1">
-              <a:avLst/>
-            </a:prstGeom>
-            <a:ln w="25400">
-              <a:solidFill>
-                <a:srgbClr val="FF0000"/>
-              </a:solidFill>
-              <a:tailEnd type="arrow"/>
-            </a:ln>
-          </p:spPr>
-          <p:style>
-            <a:lnRef idx="1">
-              <a:schemeClr val="accent1"/>
-            </a:lnRef>
-            <a:fillRef idx="0">
-              <a:schemeClr val="accent1"/>
-            </a:fillRef>
-            <a:effectRef idx="0">
-              <a:schemeClr val="accent1"/>
-            </a:effectRef>
-            <a:fontRef idx="minor">
-              <a:schemeClr val="tx1"/>
-            </a:fontRef>
-          </p:style>
-        </p:cxnSp>
         <p:sp>
           <p:nvSpPr>
             <p:cNvPr id="45" name="TextBox 44"/>
@@ -7241,8 +7227,8 @@
           </p:nvSpPr>
           <p:spPr>
             <a:xfrm>
-              <a:off x="3785617" y="3648126"/>
-              <a:ext cx="2164079" cy="369332"/>
+              <a:off x="3523069" y="3391986"/>
+              <a:ext cx="2319528" cy="369332"/>
             </a:xfrm>
             <a:prstGeom prst="rect">
               <a:avLst/>
@@ -7260,6 +7246,7 @@
                   <a:solidFill>
                     <a:srgbClr val="FF0000"/>
                   </a:solidFill>
+                  <a:latin typeface="Palatino Linotype" panose="02040502050505030304" pitchFamily="18" charset="0"/>
                 </a:rPr>
                 <a:t>τ</a:t>
               </a:r>
@@ -7268,6 +7255,7 @@
                   <a:solidFill>
                     <a:srgbClr val="FF0000"/>
                   </a:solidFill>
+                  <a:latin typeface="Palatino Linotype" panose="02040502050505030304" pitchFamily="18" charset="0"/>
                 </a:rPr>
                 <a:t>cov</a:t>
               </a:r>
@@ -7276,6 +7264,7 @@
                   <a:solidFill>
                     <a:srgbClr val="FF0000"/>
                   </a:solidFill>
+                  <a:latin typeface="Palatino Linotype" panose="02040502050505030304" pitchFamily="18" charset="0"/>
                 </a:rPr>
                 <a:t>(1-</a:t>
               </a:r>
@@ -7284,6 +7273,7 @@
                   <a:solidFill>
                     <a:srgbClr val="FF0000"/>
                   </a:solidFill>
+                  <a:latin typeface="Palatino Linotype" panose="02040502050505030304" pitchFamily="18" charset="0"/>
                 </a:rPr>
                 <a:t> ε</a:t>
               </a:r>
@@ -7292,6 +7282,7 @@
                   <a:solidFill>
                     <a:srgbClr val="FF0000"/>
                   </a:solidFill>
+                  <a:latin typeface="Palatino Linotype" panose="02040502050505030304" pitchFamily="18" charset="0"/>
                 </a:rPr>
                 <a:t>1</a:t>
               </a:r>
@@ -7300,6 +7291,7 @@
                   <a:solidFill>
                     <a:srgbClr val="FF0000"/>
                   </a:solidFill>
+                  <a:latin typeface="Palatino Linotype" panose="02040502050505030304" pitchFamily="18" charset="0"/>
                 </a:rPr>
                 <a:t>)(1-</a:t>
               </a:r>
@@ -7308,6 +7300,7 @@
                   <a:solidFill>
                     <a:srgbClr val="FF0000"/>
                   </a:solidFill>
+                  <a:latin typeface="Palatino Linotype" panose="02040502050505030304" pitchFamily="18" charset="0"/>
                 </a:rPr>
                 <a:t>τ</a:t>
               </a:r>
@@ -7316,6 +7309,7 @@
                   <a:solidFill>
                     <a:srgbClr val="FF0000"/>
                   </a:solidFill>
+                  <a:latin typeface="Palatino Linotype" panose="02040502050505030304" pitchFamily="18" charset="0"/>
                 </a:rPr>
                 <a:t>cov</a:t>
               </a:r>
@@ -7324,6 +7318,7 @@
                   <a:solidFill>
                     <a:srgbClr val="FF0000"/>
                   </a:solidFill>
+                  <a:latin typeface="Palatino Linotype" panose="02040502050505030304" pitchFamily="18" charset="0"/>
                 </a:rPr>
                 <a:t>)</a:t>
               </a:r>
@@ -7332,6 +7327,7 @@
                   <a:solidFill>
                     <a:srgbClr val="FF0000"/>
                   </a:solidFill>
+                  <a:latin typeface="Palatino Linotype" panose="02040502050505030304" pitchFamily="18" charset="0"/>
                 </a:rPr>
                 <a:t>T</a:t>
               </a:r>
@@ -7340,6 +7336,7 @@
                   <a:solidFill>
                     <a:srgbClr val="FF0000"/>
                   </a:solidFill>
+                  <a:latin typeface="Palatino Linotype" panose="02040502050505030304" pitchFamily="18" charset="0"/>
                 </a:rPr>
                 <a:t>cov</a:t>
               </a:r>
@@ -7347,46 +7344,11 @@
                 <a:solidFill>
                   <a:srgbClr val="FF0000"/>
                 </a:solidFill>
+                <a:latin typeface="Palatino Linotype" panose="02040502050505030304" pitchFamily="18" charset="0"/>
               </a:endParaRPr>
             </a:p>
           </p:txBody>
         </p:sp>
-        <p:cxnSp>
-          <p:nvCxnSpPr>
-            <p:cNvPr id="48" name="Straight Arrow Connector 47"/>
-            <p:cNvCxnSpPr/>
-            <p:nvPr/>
-          </p:nvCxnSpPr>
-          <p:spPr>
-            <a:xfrm flipH="1">
-              <a:off x="6159005" y="5104932"/>
-              <a:ext cx="1454986" cy="0"/>
-            </a:xfrm>
-            <a:prstGeom prst="straightConnector1">
-              <a:avLst/>
-            </a:prstGeom>
-            <a:ln w="25400">
-              <a:solidFill>
-                <a:srgbClr val="0070C0"/>
-              </a:solidFill>
-              <a:tailEnd type="arrow"/>
-            </a:ln>
-          </p:spPr>
-          <p:style>
-            <a:lnRef idx="1">
-              <a:schemeClr val="accent1"/>
-            </a:lnRef>
-            <a:fillRef idx="0">
-              <a:schemeClr val="accent1"/>
-            </a:fillRef>
-            <a:effectRef idx="0">
-              <a:schemeClr val="accent1"/>
-            </a:effectRef>
-            <a:fontRef idx="minor">
-              <a:schemeClr val="tx1"/>
-            </a:fontRef>
-          </p:style>
-        </p:cxnSp>
         <p:sp>
           <p:nvSpPr>
             <p:cNvPr id="49" name="TextBox 48"/>
@@ -7395,8 +7357,8 @@
           </p:nvSpPr>
           <p:spPr>
             <a:xfrm>
-              <a:off x="6568207" y="4685912"/>
-              <a:ext cx="559769" cy="369332"/>
+              <a:off x="6348751" y="4292720"/>
+              <a:ext cx="590226" cy="369332"/>
             </a:xfrm>
             <a:prstGeom prst="rect">
               <a:avLst/>
@@ -7414,6 +7376,7 @@
                   <a:solidFill>
                     <a:srgbClr val="0070C0"/>
                   </a:solidFill>
+                  <a:latin typeface="Palatino Linotype" panose="02040502050505030304" pitchFamily="18" charset="0"/>
                 </a:rPr>
                 <a:t>ε</a:t>
               </a:r>
@@ -7422,6 +7385,7 @@
                   <a:solidFill>
                     <a:srgbClr val="0070C0"/>
                   </a:solidFill>
+                  <a:latin typeface="Palatino Linotype" panose="02040502050505030304" pitchFamily="18" charset="0"/>
                 </a:rPr>
                 <a:t>1</a:t>
               </a:r>
@@ -7430,6 +7394,7 @@
                   <a:solidFill>
                     <a:srgbClr val="0070C0"/>
                   </a:solidFill>
+                  <a:latin typeface="Palatino Linotype" panose="02040502050505030304" pitchFamily="18" charset="0"/>
                 </a:rPr>
                 <a:t>T</a:t>
               </a:r>
@@ -7438,6 +7403,7 @@
                   <a:solidFill>
                     <a:srgbClr val="0070C0"/>
                   </a:solidFill>
+                  <a:latin typeface="Palatino Linotype" panose="02040502050505030304" pitchFamily="18" charset="0"/>
                 </a:rPr>
                 <a:t>1</a:t>
               </a:r>
@@ -7445,6 +7411,7 @@
                 <a:solidFill>
                   <a:srgbClr val="0070C0"/>
                 </a:solidFill>
+                <a:latin typeface="Palatino Linotype" panose="02040502050505030304" pitchFamily="18" charset="0"/>
               </a:endParaRPr>
             </a:p>
           </p:txBody>
@@ -7457,8 +7424,8 @@
           </p:nvCxnSpPr>
           <p:spPr>
             <a:xfrm flipH="1">
-              <a:off x="4432728" y="5104932"/>
-              <a:ext cx="1454986" cy="0"/>
+              <a:off x="4103544" y="4666020"/>
+              <a:ext cx="3548288" cy="0"/>
             </a:xfrm>
             <a:prstGeom prst="straightConnector1">
               <a:avLst/>
@@ -7493,8 +7460,8 @@
           </p:nvSpPr>
           <p:spPr>
             <a:xfrm>
-              <a:off x="4841930" y="4685912"/>
-              <a:ext cx="863954" cy="369332"/>
+              <a:off x="4512746" y="4292720"/>
+              <a:ext cx="941283" cy="369332"/>
             </a:xfrm>
             <a:prstGeom prst="rect">
               <a:avLst/>
@@ -7512,6 +7479,7 @@
                   <a:solidFill>
                     <a:srgbClr val="0070C0"/>
                   </a:solidFill>
+                  <a:latin typeface="Palatino Linotype" panose="02040502050505030304" pitchFamily="18" charset="0"/>
                 </a:rPr>
                 <a:t>τ</a:t>
               </a:r>
@@ -7520,6 +7488,7 @@
                   <a:solidFill>
                     <a:srgbClr val="0070C0"/>
                   </a:solidFill>
+                  <a:latin typeface="Palatino Linotype" panose="02040502050505030304" pitchFamily="18" charset="0"/>
                 </a:rPr>
                 <a:t>cov</a:t>
               </a:r>
@@ -7528,6 +7497,7 @@
                   <a:solidFill>
                     <a:srgbClr val="0070C0"/>
                   </a:solidFill>
+                  <a:latin typeface="Palatino Linotype" panose="02040502050505030304" pitchFamily="18" charset="0"/>
                 </a:rPr>
                 <a:t>ε</a:t>
               </a:r>
@@ -7536,6 +7506,7 @@
                   <a:solidFill>
                     <a:srgbClr val="0070C0"/>
                   </a:solidFill>
+                  <a:latin typeface="Palatino Linotype" panose="02040502050505030304" pitchFamily="18" charset="0"/>
                 </a:rPr>
                 <a:t>1</a:t>
               </a:r>
@@ -7544,6 +7515,7 @@
                   <a:solidFill>
                     <a:srgbClr val="0070C0"/>
                   </a:solidFill>
+                  <a:latin typeface="Palatino Linotype" panose="02040502050505030304" pitchFamily="18" charset="0"/>
                 </a:rPr>
                 <a:t>T</a:t>
               </a:r>
@@ -7552,6 +7524,7 @@
                   <a:solidFill>
                     <a:srgbClr val="0070C0"/>
                   </a:solidFill>
+                  <a:latin typeface="Palatino Linotype" panose="02040502050505030304" pitchFamily="18" charset="0"/>
                 </a:rPr>
                 <a:t>1</a:t>
               </a:r>
@@ -7559,6 +7532,7 @@
                 <a:solidFill>
                   <a:srgbClr val="0070C0"/>
                 </a:solidFill>
+                <a:latin typeface="Palatino Linotype" panose="02040502050505030304" pitchFamily="18" charset="0"/>
               </a:endParaRPr>
             </a:p>
           </p:txBody>
@@ -7571,8 +7545,8 @@
           </p:nvSpPr>
           <p:spPr>
             <a:xfrm>
-              <a:off x="7776708" y="717973"/>
-              <a:ext cx="375424" cy="646331"/>
+              <a:off x="7776708" y="699685"/>
+              <a:ext cx="402674" cy="646331"/>
             </a:xfrm>
             <a:prstGeom prst="rect">
               <a:avLst/>
@@ -7589,25 +7563,37 @@
             <a:lstStyle/>
             <a:p>
               <a:r>
-                <a:rPr lang="en-US" dirty="0" smtClean="0"/>
+                <a:rPr lang="en-US" dirty="0" smtClean="0">
+                  <a:latin typeface="Palatino Linotype" panose="02040502050505030304" pitchFamily="18" charset="0"/>
+                </a:rPr>
                 <a:t>T</a:t>
               </a:r>
               <a:r>
-                <a:rPr lang="en-US" baseline="-25000" dirty="0"/>
+                <a:rPr lang="en-US" baseline="-25000" dirty="0">
+                  <a:latin typeface="Palatino Linotype" panose="02040502050505030304" pitchFamily="18" charset="0"/>
+                </a:rPr>
                 <a:t>1</a:t>
               </a:r>
-              <a:endParaRPr lang="en-US" baseline="-25000" dirty="0" smtClean="0"/>
+              <a:endParaRPr lang="en-US" baseline="-25000" dirty="0" smtClean="0">
+                <a:latin typeface="Palatino Linotype" panose="02040502050505030304" pitchFamily="18" charset="0"/>
+              </a:endParaRPr>
             </a:p>
             <a:p>
               <a:r>
-                <a:rPr lang="el-GR" dirty="0" smtClean="0"/>
+                <a:rPr lang="el-GR" dirty="0" smtClean="0">
+                  <a:latin typeface="Palatino Linotype" panose="02040502050505030304" pitchFamily="18" charset="0"/>
+                </a:rPr>
                 <a:t>ε</a:t>
               </a:r>
               <a:r>
-                <a:rPr lang="en-US" baseline="-25000" dirty="0" smtClean="0"/>
+                <a:rPr lang="en-US" baseline="-25000" dirty="0" smtClean="0">
+                  <a:latin typeface="Palatino Linotype" panose="02040502050505030304" pitchFamily="18" charset="0"/>
+                </a:rPr>
                 <a:t>1</a:t>
               </a:r>
-              <a:endParaRPr lang="en-US" baseline="-25000" dirty="0"/>
+              <a:endParaRPr lang="en-US" baseline="-25000" dirty="0">
+                <a:latin typeface="Palatino Linotype" panose="02040502050505030304" pitchFamily="18" charset="0"/>
+              </a:endParaRPr>
             </a:p>
           </p:txBody>
         </p:sp>
@@ -7619,8 +7605,8 @@
           </p:nvSpPr>
           <p:spPr>
             <a:xfrm>
-              <a:off x="5806386" y="717974"/>
-              <a:ext cx="491353" cy="646331"/>
+              <a:off x="5477202" y="717974"/>
+              <a:ext cx="548227" cy="646331"/>
             </a:xfrm>
             <a:prstGeom prst="rect">
               <a:avLst/>
@@ -7633,25 +7619,37 @@
             <a:lstStyle/>
             <a:p>
               <a:r>
-                <a:rPr lang="en-US" dirty="0" err="1"/>
+                <a:rPr lang="en-US" dirty="0" err="1">
+                  <a:latin typeface="Palatino Linotype" panose="02040502050505030304" pitchFamily="18" charset="0"/>
+                </a:rPr>
                 <a:t>T</a:t>
               </a:r>
               <a:r>
-                <a:rPr lang="en-US" baseline="-25000" dirty="0" err="1"/>
+                <a:rPr lang="en-US" baseline="-25000" dirty="0" err="1">
+                  <a:latin typeface="Palatino Linotype" panose="02040502050505030304" pitchFamily="18" charset="0"/>
+                </a:rPr>
                 <a:t>cov</a:t>
               </a:r>
-              <a:endParaRPr lang="en-US" baseline="-25000" dirty="0"/>
+              <a:endParaRPr lang="en-US" baseline="-25000" dirty="0">
+                <a:latin typeface="Palatino Linotype" panose="02040502050505030304" pitchFamily="18" charset="0"/>
+              </a:endParaRPr>
             </a:p>
             <a:p>
               <a:r>
-                <a:rPr lang="el-GR" dirty="0" smtClean="0"/>
+                <a:rPr lang="el-GR" dirty="0" smtClean="0">
+                  <a:latin typeface="Palatino Linotype" panose="02040502050505030304" pitchFamily="18" charset="0"/>
+                </a:rPr>
                 <a:t>τ</a:t>
               </a:r>
               <a:r>
-                <a:rPr lang="en-US" baseline="-25000" dirty="0" err="1" smtClean="0"/>
+                <a:rPr lang="en-US" baseline="-25000" dirty="0" err="1" smtClean="0">
+                  <a:latin typeface="Palatino Linotype" panose="02040502050505030304" pitchFamily="18" charset="0"/>
+                </a:rPr>
                 <a:t>cov</a:t>
               </a:r>
-              <a:endParaRPr lang="en-US" baseline="-25000" dirty="0"/>
+              <a:endParaRPr lang="en-US" baseline="-25000" dirty="0">
+                <a:latin typeface="Palatino Linotype" panose="02040502050505030304" pitchFamily="18" charset="0"/>
+              </a:endParaRPr>
             </a:p>
           </p:txBody>
         </p:sp>
@@ -7663,8 +7661,8 @@
           </p:nvSpPr>
           <p:spPr>
             <a:xfrm>
-              <a:off x="784917" y="5545551"/>
-              <a:ext cx="7348422" cy="461665"/>
+              <a:off x="748341" y="5161503"/>
+              <a:ext cx="7943072" cy="461665"/>
             </a:xfrm>
             <a:prstGeom prst="rect">
               <a:avLst/>
@@ -7678,67 +7676,99 @@
             <a:lstStyle/>
             <a:p>
               <a:r>
-                <a:rPr lang="en-US" sz="2400" dirty="0" err="1" smtClean="0"/>
+                <a:rPr lang="en-US" sz="2400" dirty="0" err="1" smtClean="0">
+                  <a:latin typeface="Palatino Linotype" panose="02040502050505030304" pitchFamily="18" charset="0"/>
+                </a:rPr>
                 <a:t>T</a:t>
               </a:r>
               <a:r>
-                <a:rPr lang="en-US" sz="2400" baseline="-25000" dirty="0" err="1" smtClean="0"/>
+                <a:rPr lang="en-US" sz="2400" baseline="-25000" dirty="0" err="1" smtClean="0">
+                  <a:latin typeface="Palatino Linotype" panose="02040502050505030304" pitchFamily="18" charset="0"/>
+                </a:rPr>
                 <a:t>tot</a:t>
               </a:r>
               <a:r>
-                <a:rPr lang="en-US" sz="2400" dirty="0" smtClean="0"/>
+                <a:rPr lang="en-US" sz="2400" dirty="0" smtClean="0">
+                  <a:latin typeface="Palatino Linotype" panose="02040502050505030304" pitchFamily="18" charset="0"/>
+                </a:rPr>
                 <a:t> = </a:t>
               </a:r>
               <a:r>
-                <a:rPr lang="en-US" sz="2400" dirty="0"/>
+                <a:rPr lang="en-US" sz="2400" dirty="0">
+                  <a:latin typeface="Palatino Linotype" panose="02040502050505030304" pitchFamily="18" charset="0"/>
+                </a:rPr>
                 <a:t>(1-</a:t>
               </a:r>
               <a:r>
-                <a:rPr lang="el-GR" sz="2400" dirty="0"/>
+                <a:rPr lang="el-GR" sz="2400" dirty="0">
+                  <a:latin typeface="Palatino Linotype" panose="02040502050505030304" pitchFamily="18" charset="0"/>
+                </a:rPr>
                 <a:t> </a:t>
               </a:r>
               <a:r>
-                <a:rPr lang="el-GR" sz="2400" dirty="0" smtClean="0"/>
+                <a:rPr lang="el-GR" sz="2400" dirty="0" smtClean="0">
+                  <a:latin typeface="Palatino Linotype" panose="02040502050505030304" pitchFamily="18" charset="0"/>
+                </a:rPr>
                 <a:t>ε</a:t>
               </a:r>
               <a:r>
-                <a:rPr lang="en-US" sz="2400" baseline="-25000" dirty="0" smtClean="0"/>
+                <a:rPr lang="en-US" sz="2400" baseline="-25000" dirty="0" smtClean="0">
+                  <a:latin typeface="Palatino Linotype" panose="02040502050505030304" pitchFamily="18" charset="0"/>
+                </a:rPr>
                 <a:t>1</a:t>
               </a:r>
               <a:r>
-                <a:rPr lang="en-US" sz="2400" dirty="0" smtClean="0"/>
+                <a:rPr lang="en-US" sz="2400" dirty="0" smtClean="0">
+                  <a:latin typeface="Palatino Linotype" panose="02040502050505030304" pitchFamily="18" charset="0"/>
+                </a:rPr>
                 <a:t>)</a:t>
               </a:r>
               <a:r>
-                <a:rPr lang="el-GR" sz="2400" dirty="0"/>
+                <a:rPr lang="el-GR" sz="2400" dirty="0">
+                  <a:latin typeface="Palatino Linotype" panose="02040502050505030304" pitchFamily="18" charset="0"/>
+                </a:rPr>
                 <a:t>τ</a:t>
               </a:r>
               <a:r>
-                <a:rPr lang="en-US" sz="2400" baseline="30000" dirty="0"/>
+                <a:rPr lang="en-US" sz="2400" baseline="30000" dirty="0">
+                  <a:latin typeface="Palatino Linotype" panose="02040502050505030304" pitchFamily="18" charset="0"/>
+                </a:rPr>
                 <a:t>2</a:t>
               </a:r>
               <a:r>
-                <a:rPr lang="en-US" sz="2400" baseline="-25000" dirty="0"/>
+                <a:rPr lang="en-US" sz="2400" baseline="-25000" dirty="0">
+                  <a:latin typeface="Palatino Linotype" panose="02040502050505030304" pitchFamily="18" charset="0"/>
+                </a:rPr>
                 <a:t>cov</a:t>
               </a:r>
               <a:r>
-                <a:rPr lang="en-US" sz="2400" dirty="0"/>
+                <a:rPr lang="en-US" sz="2400" dirty="0">
+                  <a:latin typeface="Palatino Linotype" panose="02040502050505030304" pitchFamily="18" charset="0"/>
+                </a:rPr>
                 <a:t> </a:t>
               </a:r>
               <a:r>
-                <a:rPr lang="en-US" sz="2400" dirty="0" err="1" smtClean="0"/>
+                <a:rPr lang="en-US" sz="2400" dirty="0" err="1" smtClean="0">
+                  <a:latin typeface="Palatino Linotype" panose="02040502050505030304" pitchFamily="18" charset="0"/>
+                </a:rPr>
                 <a:t>T</a:t>
               </a:r>
               <a:r>
-                <a:rPr lang="en-US" sz="2400" baseline="-25000" dirty="0" err="1" smtClean="0"/>
+                <a:rPr lang="en-US" sz="2400" baseline="-25000" dirty="0" err="1" smtClean="0">
+                  <a:latin typeface="Palatino Linotype" panose="02040502050505030304" pitchFamily="18" charset="0"/>
+                </a:rPr>
                 <a:t>amb</a:t>
               </a:r>
               <a:r>
-                <a:rPr lang="en-US" sz="2400" baseline="-25000" dirty="0" smtClean="0"/>
+                <a:rPr lang="en-US" sz="2400" baseline="-25000" dirty="0" smtClean="0">
+                  <a:latin typeface="Palatino Linotype" panose="02040502050505030304" pitchFamily="18" charset="0"/>
+                </a:rPr>
                 <a:t> </a:t>
               </a:r>
               <a:r>
-                <a:rPr lang="en-US" sz="2400" dirty="0" smtClean="0"/>
+                <a:rPr lang="en-US" sz="2400" dirty="0" smtClean="0">
+                  <a:latin typeface="Palatino Linotype" panose="02040502050505030304" pitchFamily="18" charset="0"/>
+                </a:rPr>
                 <a:t> + </a:t>
               </a:r>
               <a:r>
@@ -7746,6 +7776,7 @@
                   <a:solidFill>
                     <a:srgbClr val="FF0000"/>
                   </a:solidFill>
+                  <a:latin typeface="Palatino Linotype" panose="02040502050505030304" pitchFamily="18" charset="0"/>
                 </a:rPr>
                 <a:t>(1 + </a:t>
               </a:r>
@@ -7754,6 +7785,7 @@
                   <a:solidFill>
                     <a:srgbClr val="FF0000"/>
                   </a:solidFill>
+                  <a:latin typeface="Palatino Linotype" panose="02040502050505030304" pitchFamily="18" charset="0"/>
                 </a:rPr>
                 <a:t>τ</a:t>
               </a:r>
@@ -7762,6 +7794,7 @@
                   <a:solidFill>
                     <a:srgbClr val="FF0000"/>
                   </a:solidFill>
+                  <a:latin typeface="Palatino Linotype" panose="02040502050505030304" pitchFamily="18" charset="0"/>
                 </a:rPr>
                 <a:t>cov</a:t>
               </a:r>
@@ -7770,6 +7803,7 @@
                   <a:solidFill>
                     <a:srgbClr val="FF0000"/>
                   </a:solidFill>
+                  <a:latin typeface="Palatino Linotype" panose="02040502050505030304" pitchFamily="18" charset="0"/>
                 </a:rPr>
                 <a:t>(1-</a:t>
               </a:r>
@@ -7778,6 +7812,7 @@
                   <a:solidFill>
                     <a:srgbClr val="FF0000"/>
                   </a:solidFill>
+                  <a:latin typeface="Palatino Linotype" panose="02040502050505030304" pitchFamily="18" charset="0"/>
                 </a:rPr>
                 <a:t> </a:t>
               </a:r>
@@ -7786,6 +7821,7 @@
                   <a:solidFill>
                     <a:srgbClr val="FF0000"/>
                   </a:solidFill>
+                  <a:latin typeface="Palatino Linotype" panose="02040502050505030304" pitchFamily="18" charset="0"/>
                 </a:rPr>
                 <a:t>ε</a:t>
               </a:r>
@@ -7794,6 +7830,7 @@
                   <a:solidFill>
                     <a:srgbClr val="FF0000"/>
                   </a:solidFill>
+                  <a:latin typeface="Palatino Linotype" panose="02040502050505030304" pitchFamily="18" charset="0"/>
                 </a:rPr>
                 <a:t>1</a:t>
               </a:r>
@@ -7802,6 +7839,7 @@
                   <a:solidFill>
                     <a:srgbClr val="FF0000"/>
                   </a:solidFill>
+                  <a:latin typeface="Palatino Linotype" panose="02040502050505030304" pitchFamily="18" charset="0"/>
                 </a:rPr>
                 <a:t>))(</a:t>
               </a:r>
@@ -7810,6 +7848,7 @@
                   <a:solidFill>
                     <a:srgbClr val="FF0000"/>
                   </a:solidFill>
+                  <a:latin typeface="Palatino Linotype" panose="02040502050505030304" pitchFamily="18" charset="0"/>
                 </a:rPr>
                 <a:t>1-</a:t>
               </a:r>
@@ -7818,6 +7857,7 @@
                   <a:solidFill>
                     <a:srgbClr val="FF0000"/>
                   </a:solidFill>
+                  <a:latin typeface="Palatino Linotype" panose="02040502050505030304" pitchFamily="18" charset="0"/>
                 </a:rPr>
                 <a:t>τ</a:t>
               </a:r>
@@ -7826,6 +7866,7 @@
                   <a:solidFill>
                     <a:srgbClr val="FF0000"/>
                   </a:solidFill>
+                  <a:latin typeface="Palatino Linotype" panose="02040502050505030304" pitchFamily="18" charset="0"/>
                 </a:rPr>
                 <a:t>cov</a:t>
               </a:r>
@@ -7834,6 +7875,7 @@
                   <a:solidFill>
                     <a:srgbClr val="FF0000"/>
                   </a:solidFill>
+                  <a:latin typeface="Palatino Linotype" panose="02040502050505030304" pitchFamily="18" charset="0"/>
                 </a:rPr>
                 <a:t>)</a:t>
               </a:r>
@@ -7842,6 +7884,7 @@
                   <a:solidFill>
                     <a:srgbClr val="FF0000"/>
                   </a:solidFill>
+                  <a:latin typeface="Palatino Linotype" panose="02040502050505030304" pitchFamily="18" charset="0"/>
                 </a:rPr>
                 <a:t>T</a:t>
               </a:r>
@@ -7850,15 +7893,20 @@
                   <a:solidFill>
                     <a:srgbClr val="FF0000"/>
                   </a:solidFill>
+                  <a:latin typeface="Palatino Linotype" panose="02040502050505030304" pitchFamily="18" charset="0"/>
                 </a:rPr>
                 <a:t>cov</a:t>
               </a:r>
               <a:r>
-                <a:rPr lang="en-US" sz="2400" dirty="0"/>
+                <a:rPr lang="en-US" sz="2400" dirty="0">
+                  <a:latin typeface="Palatino Linotype" panose="02040502050505030304" pitchFamily="18" charset="0"/>
+                </a:rPr>
                 <a:t> </a:t>
               </a:r>
               <a:r>
-                <a:rPr lang="en-US" sz="2400" dirty="0" smtClean="0"/>
+                <a:rPr lang="en-US" sz="2400" dirty="0" smtClean="0">
+                  <a:latin typeface="Palatino Linotype" panose="02040502050505030304" pitchFamily="18" charset="0"/>
+                </a:rPr>
                 <a:t>+ </a:t>
               </a:r>
               <a:r>
@@ -7866,6 +7914,7 @@
                   <a:solidFill>
                     <a:srgbClr val="0070C0"/>
                   </a:solidFill>
+                  <a:latin typeface="Palatino Linotype" panose="02040502050505030304" pitchFamily="18" charset="0"/>
                 </a:rPr>
                 <a:t>τ</a:t>
               </a:r>
@@ -7874,6 +7923,7 @@
                   <a:solidFill>
                     <a:srgbClr val="0070C0"/>
                   </a:solidFill>
+                  <a:latin typeface="Palatino Linotype" panose="02040502050505030304" pitchFamily="18" charset="0"/>
                 </a:rPr>
                 <a:t>cov</a:t>
               </a:r>
@@ -7882,6 +7932,7 @@
                   <a:solidFill>
                     <a:srgbClr val="0070C0"/>
                   </a:solidFill>
+                  <a:latin typeface="Palatino Linotype" panose="02040502050505030304" pitchFamily="18" charset="0"/>
                 </a:rPr>
                 <a:t>ε</a:t>
               </a:r>
@@ -7890,6 +7941,7 @@
                   <a:solidFill>
                     <a:srgbClr val="0070C0"/>
                   </a:solidFill>
+                  <a:latin typeface="Palatino Linotype" panose="02040502050505030304" pitchFamily="18" charset="0"/>
                 </a:rPr>
                 <a:t>1</a:t>
               </a:r>
@@ -7898,6 +7950,7 @@
                   <a:solidFill>
                     <a:srgbClr val="0070C0"/>
                   </a:solidFill>
+                  <a:latin typeface="Palatino Linotype" panose="02040502050505030304" pitchFamily="18" charset="0"/>
                 </a:rPr>
                 <a:t>T</a:t>
               </a:r>
@@ -7906,6 +7959,7 @@
                   <a:solidFill>
                     <a:srgbClr val="0070C0"/>
                   </a:solidFill>
+                  <a:latin typeface="Palatino Linotype" panose="02040502050505030304" pitchFamily="18" charset="0"/>
                 </a:rPr>
                 <a:t>1</a:t>
               </a:r>
@@ -7913,6 +7967,7 @@
                 <a:solidFill>
                   <a:srgbClr val="0070C0"/>
                 </a:solidFill>
+                <a:latin typeface="Palatino Linotype" panose="02040502050505030304" pitchFamily="18" charset="0"/>
               </a:endParaRPr>
             </a:p>
           </p:txBody>
@@ -8040,6 +8095,116 @@
               <a:solidFill>
                 <a:schemeClr val="tx1"/>
               </a:solidFill>
+            </a:ln>
+          </p:spPr>
+          <p:style>
+            <a:lnRef idx="1">
+              <a:schemeClr val="accent1"/>
+            </a:lnRef>
+            <a:fillRef idx="0">
+              <a:schemeClr val="accent1"/>
+            </a:fillRef>
+            <a:effectRef idx="0">
+              <a:schemeClr val="accent1"/>
+            </a:effectRef>
+            <a:fontRef idx="minor">
+              <a:schemeClr val="tx1"/>
+            </a:fontRef>
+          </p:style>
+        </p:cxnSp>
+        <p:sp>
+          <p:nvSpPr>
+            <p:cNvPr id="3" name="TextBox 2"/>
+            <p:cNvSpPr txBox="1"/>
+            <p:nvPr/>
+          </p:nvSpPr>
+          <p:spPr>
+            <a:xfrm>
+              <a:off x="839781" y="2345608"/>
+              <a:ext cx="2132112" cy="369332"/>
+            </a:xfrm>
+            <a:prstGeom prst="rect">
+              <a:avLst/>
+            </a:prstGeom>
+            <a:noFill/>
+          </p:spPr>
+          <p:txBody>
+            <a:bodyPr wrap="square" rtlCol="0">
+              <a:spAutoFit/>
+            </a:bodyPr>
+            <a:lstStyle/>
+            <a:p>
+              <a:r>
+                <a:rPr lang="en-US" dirty="0" smtClean="0">
+                  <a:latin typeface="Palatino Linotype" panose="02040502050505030304" pitchFamily="18" charset="0"/>
+                </a:rPr>
+                <a:t>Imaging System</a:t>
+              </a:r>
+              <a:endParaRPr lang="en-US" dirty="0">
+                <a:latin typeface="Palatino Linotype" panose="02040502050505030304" pitchFamily="18" charset="0"/>
+              </a:endParaRPr>
+            </a:p>
+          </p:txBody>
+        </p:sp>
+        <p:cxnSp>
+          <p:nvCxnSpPr>
+            <p:cNvPr id="38" name="Straight Arrow Connector 37"/>
+            <p:cNvCxnSpPr/>
+            <p:nvPr/>
+          </p:nvCxnSpPr>
+          <p:spPr>
+            <a:xfrm>
+              <a:off x="7651832" y="1865376"/>
+              <a:ext cx="0" cy="512064"/>
+            </a:xfrm>
+            <a:prstGeom prst="straightConnector1">
+              <a:avLst/>
+            </a:prstGeom>
+            <a:ln w="25400">
+              <a:solidFill>
+                <a:schemeClr val="tx1"/>
+              </a:solidFill>
+              <a:round/>
+              <a:headEnd type="none" w="med" len="med"/>
+              <a:tailEnd type="none" w="med" len="med"/>
+            </a:ln>
+          </p:spPr>
+          <p:style>
+            <a:lnRef idx="1">
+              <a:schemeClr val="accent1"/>
+            </a:lnRef>
+            <a:fillRef idx="0">
+              <a:schemeClr val="accent1"/>
+            </a:fillRef>
+            <a:effectRef idx="0">
+              <a:schemeClr val="accent1"/>
+            </a:effectRef>
+            <a:fontRef idx="minor">
+              <a:schemeClr val="tx1"/>
+            </a:fontRef>
+          </p:style>
+        </p:cxnSp>
+        <p:cxnSp>
+          <p:nvCxnSpPr>
+            <p:cNvPr id="47" name="Straight Arrow Connector 46"/>
+            <p:cNvCxnSpPr/>
+            <p:nvPr/>
+          </p:nvCxnSpPr>
+          <p:spPr>
+            <a:xfrm>
+              <a:off x="7651832" y="3248902"/>
+              <a:ext cx="0" cy="512064"/>
+            </a:xfrm>
+            <a:prstGeom prst="straightConnector1">
+              <a:avLst/>
+            </a:prstGeom>
+            <a:ln w="25400">
+              <a:solidFill>
+                <a:srgbClr val="FF0000"/>
+              </a:solidFill>
+              <a:round/>
+              <a:headEnd type="none" w="med" len="med"/>
+              <a:tailEnd type="none" w="med" len="med"/>
             </a:ln>
           </p:spPr>
           <p:style>

</xml_diff>

<commit_message>
Add focal plane cross-section to ch 5
</commit_message>
<xml_diff>
--- a/support/thesis-drawings.pptx
+++ b/support/thesis-drawings.pptx
@@ -5,12 +5,13 @@
     <p:sldMasterId id="2147483648" r:id="rId1"/>
   </p:sldMasterIdLst>
   <p:notesMasterIdLst>
-    <p:notesMasterId r:id="rId5"/>
+    <p:notesMasterId r:id="rId6"/>
   </p:notesMasterIdLst>
   <p:sldIdLst>
     <p:sldId id="258" r:id="rId2"/>
     <p:sldId id="257" r:id="rId3"/>
     <p:sldId id="259" r:id="rId4"/>
+    <p:sldId id="260" r:id="rId5"/>
   </p:sldIdLst>
   <p:sldSz cx="9144000" cy="6858000" type="screen4x3"/>
   <p:notesSz cx="6858000" cy="9144000"/>
@@ -194,7 +195,7 @@
           <a:p>
             <a:fld id="{FE111C9F-A33E-4952-BC38-37E17DCB4FBF}" type="datetimeFigureOut">
               <a:rPr lang="en-US" smtClean="0"/>
-              <a:t>3/14/2014</a:t>
+              <a:t>3/24/2014</a:t>
             </a:fld>
             <a:endParaRPr lang="en-US"/>
           </a:p>
@@ -984,7 +985,7 @@
           <a:p>
             <a:fld id="{A6C27610-B903-4030-BF6B-58161B6517DA}" type="datetimeFigureOut">
               <a:rPr lang="en-US" smtClean="0"/>
-              <a:t>3/14/2014</a:t>
+              <a:t>3/24/2014</a:t>
             </a:fld>
             <a:endParaRPr lang="en-US"/>
           </a:p>
@@ -1154,7 +1155,7 @@
           <a:p>
             <a:fld id="{A6C27610-B903-4030-BF6B-58161B6517DA}" type="datetimeFigureOut">
               <a:rPr lang="en-US" smtClean="0"/>
-              <a:t>3/14/2014</a:t>
+              <a:t>3/24/2014</a:t>
             </a:fld>
             <a:endParaRPr lang="en-US"/>
           </a:p>
@@ -1334,7 +1335,7 @@
           <a:p>
             <a:fld id="{A6C27610-B903-4030-BF6B-58161B6517DA}" type="datetimeFigureOut">
               <a:rPr lang="en-US" smtClean="0"/>
-              <a:t>3/14/2014</a:t>
+              <a:t>3/24/2014</a:t>
             </a:fld>
             <a:endParaRPr lang="en-US"/>
           </a:p>
@@ -1504,7 +1505,7 @@
           <a:p>
             <a:fld id="{A6C27610-B903-4030-BF6B-58161B6517DA}" type="datetimeFigureOut">
               <a:rPr lang="en-US" smtClean="0"/>
-              <a:t>3/14/2014</a:t>
+              <a:t>3/24/2014</a:t>
             </a:fld>
             <a:endParaRPr lang="en-US"/>
           </a:p>
@@ -1750,7 +1751,7 @@
           <a:p>
             <a:fld id="{A6C27610-B903-4030-BF6B-58161B6517DA}" type="datetimeFigureOut">
               <a:rPr lang="en-US" smtClean="0"/>
-              <a:t>3/14/2014</a:t>
+              <a:t>3/24/2014</a:t>
             </a:fld>
             <a:endParaRPr lang="en-US"/>
           </a:p>
@@ -2038,7 +2039,7 @@
           <a:p>
             <a:fld id="{A6C27610-B903-4030-BF6B-58161B6517DA}" type="datetimeFigureOut">
               <a:rPr lang="en-US" smtClean="0"/>
-              <a:t>3/14/2014</a:t>
+              <a:t>3/24/2014</a:t>
             </a:fld>
             <a:endParaRPr lang="en-US"/>
           </a:p>
@@ -2460,7 +2461,7 @@
           <a:p>
             <a:fld id="{A6C27610-B903-4030-BF6B-58161B6517DA}" type="datetimeFigureOut">
               <a:rPr lang="en-US" smtClean="0"/>
-              <a:t>3/14/2014</a:t>
+              <a:t>3/24/2014</a:t>
             </a:fld>
             <a:endParaRPr lang="en-US"/>
           </a:p>
@@ -2578,7 +2579,7 @@
           <a:p>
             <a:fld id="{A6C27610-B903-4030-BF6B-58161B6517DA}" type="datetimeFigureOut">
               <a:rPr lang="en-US" smtClean="0"/>
-              <a:t>3/14/2014</a:t>
+              <a:t>3/24/2014</a:t>
             </a:fld>
             <a:endParaRPr lang="en-US"/>
           </a:p>
@@ -2673,7 +2674,7 @@
           <a:p>
             <a:fld id="{A6C27610-B903-4030-BF6B-58161B6517DA}" type="datetimeFigureOut">
               <a:rPr lang="en-US" smtClean="0"/>
-              <a:t>3/14/2014</a:t>
+              <a:t>3/24/2014</a:t>
             </a:fld>
             <a:endParaRPr lang="en-US"/>
           </a:p>
@@ -2950,7 +2951,7 @@
           <a:p>
             <a:fld id="{A6C27610-B903-4030-BF6B-58161B6517DA}" type="datetimeFigureOut">
               <a:rPr lang="en-US" smtClean="0"/>
-              <a:t>3/14/2014</a:t>
+              <a:t>3/24/2014</a:t>
             </a:fld>
             <a:endParaRPr lang="en-US"/>
           </a:p>
@@ -3203,7 +3204,7 @@
           <a:p>
             <a:fld id="{A6C27610-B903-4030-BF6B-58161B6517DA}" type="datetimeFigureOut">
               <a:rPr lang="en-US" smtClean="0"/>
-              <a:t>3/14/2014</a:t>
+              <a:t>3/24/2014</a:t>
             </a:fld>
             <a:endParaRPr lang="en-US"/>
           </a:p>
@@ -3416,7 +3417,7 @@
           <a:p>
             <a:fld id="{A6C27610-B903-4030-BF6B-58161B6517DA}" type="datetimeFigureOut">
               <a:rPr lang="en-US" smtClean="0"/>
-              <a:t>3/14/2014</a:t>
+              <a:t>3/24/2014</a:t>
             </a:fld>
             <a:endParaRPr lang="en-US"/>
           </a:p>
@@ -8227,6 +8228,612 @@
     <p:extLst>
       <p:ext uri="{BB962C8B-B14F-4D97-AF65-F5344CB8AC3E}">
         <p14:creationId xmlns:p14="http://schemas.microsoft.com/office/powerpoint/2010/main" val="2579324206"/>
+      </p:ext>
+    </p:extLst>
+  </p:cSld>
+  <p:clrMapOvr>
+    <a:masterClrMapping/>
+  </p:clrMapOvr>
+</p:sld>
+</file>
+
+<file path=ppt/slides/slide4.xml><?xml version="1.0" encoding="utf-8"?>
+<p:sld xmlns:a="http://schemas.openxmlformats.org/drawingml/2006/main" xmlns:r="http://schemas.openxmlformats.org/officeDocument/2006/relationships" xmlns:p="http://schemas.openxmlformats.org/presentationml/2006/main">
+  <p:cSld>
+    <p:spTree>
+      <p:nvGrpSpPr>
+        <p:cNvPr id="1" name=""/>
+        <p:cNvGrpSpPr/>
+        <p:nvPr/>
+      </p:nvGrpSpPr>
+      <p:grpSpPr>
+        <a:xfrm>
+          <a:off x="0" y="0"/>
+          <a:ext cx="0" cy="0"/>
+          <a:chOff x="0" y="0"/>
+          <a:chExt cx="0" cy="0"/>
+        </a:xfrm>
+      </p:grpSpPr>
+      <p:grpSp>
+        <p:nvGrpSpPr>
+          <p:cNvPr id="15" name="Group 14"/>
+          <p:cNvGrpSpPr/>
+          <p:nvPr/>
+        </p:nvGrpSpPr>
+        <p:grpSpPr>
+          <a:xfrm>
+            <a:off x="0" y="796864"/>
+            <a:ext cx="9413227" cy="5635053"/>
+            <a:chOff x="0" y="796864"/>
+            <a:chExt cx="9413227" cy="5635053"/>
+          </a:xfrm>
+        </p:grpSpPr>
+        <p:pic>
+          <p:nvPicPr>
+            <p:cNvPr id="2" name="Picture 1"/>
+            <p:cNvPicPr>
+              <a:picLocks noChangeAspect="1"/>
+            </p:cNvPicPr>
+            <p:nvPr/>
+          </p:nvPicPr>
+          <p:blipFill>
+            <a:blip r:embed="rId2">
+              <a:extLst>
+                <a:ext uri="{28A0092B-C50C-407E-A947-70E740481C1C}">
+                  <a14:useLocalDpi xmlns:a14="http://schemas.microsoft.com/office/drawing/2010/main" val="0"/>
+                </a:ext>
+              </a:extLst>
+            </a:blip>
+            <a:stretch>
+              <a:fillRect/>
+            </a:stretch>
+          </p:blipFill>
+          <p:spPr>
+            <a:xfrm>
+              <a:off x="0" y="1584798"/>
+              <a:ext cx="9144000" cy="3688404"/>
+            </a:xfrm>
+            <a:prstGeom prst="rect">
+              <a:avLst/>
+            </a:prstGeom>
+          </p:spPr>
+        </p:pic>
+        <p:sp>
+          <p:nvSpPr>
+            <p:cNvPr id="3" name="TextBox 42"/>
+            <p:cNvSpPr txBox="1">
+              <a:spLocks noChangeArrowheads="1"/>
+            </p:cNvSpPr>
+            <p:nvPr/>
+          </p:nvSpPr>
+          <p:spPr bwMode="auto">
+            <a:xfrm>
+              <a:off x="277365" y="796864"/>
+              <a:ext cx="2359948" cy="461665"/>
+            </a:xfrm>
+            <a:prstGeom prst="rect">
+              <a:avLst/>
+            </a:prstGeom>
+            <a:noFill/>
+            <a:ln w="9525">
+              <a:noFill/>
+              <a:miter lim="800000"/>
+              <a:headEnd/>
+              <a:tailEnd/>
+            </a:ln>
+          </p:spPr>
+          <p:txBody>
+            <a:bodyPr wrap="square">
+              <a:spAutoFit/>
+            </a:bodyPr>
+            <a:lstStyle/>
+            <a:p>
+              <a:r>
+                <a:rPr lang="en-US" sz="2400" b="0" dirty="0" err="1" smtClean="0">
+                  <a:solidFill>
+                    <a:srgbClr val="000000"/>
+                  </a:solidFill>
+                  <a:latin typeface="Palatino Linotype" panose="02040502050505030304" pitchFamily="18" charset="0"/>
+                </a:rPr>
+                <a:t>Feedhorn</a:t>
+              </a:r>
+              <a:r>
+                <a:rPr lang="en-US" sz="2400" b="0" dirty="0" smtClean="0">
+                  <a:solidFill>
+                    <a:srgbClr val="000000"/>
+                  </a:solidFill>
+                  <a:latin typeface="Palatino Linotype" panose="02040502050505030304" pitchFamily="18" charset="0"/>
+                </a:rPr>
+                <a:t> Array</a:t>
+              </a:r>
+              <a:endParaRPr lang="en-US" sz="2400" b="0" dirty="0">
+                <a:solidFill>
+                  <a:srgbClr val="000000"/>
+                </a:solidFill>
+                <a:latin typeface="Palatino Linotype" panose="02040502050505030304" pitchFamily="18" charset="0"/>
+              </a:endParaRPr>
+            </a:p>
+          </p:txBody>
+        </p:sp>
+        <p:sp>
+          <p:nvSpPr>
+            <p:cNvPr id="4" name="Line 20"/>
+            <p:cNvSpPr>
+              <a:spLocks noChangeShapeType="1"/>
+            </p:cNvSpPr>
+            <p:nvPr/>
+          </p:nvSpPr>
+          <p:spPr bwMode="auto">
+            <a:xfrm flipH="1">
+              <a:off x="854716" y="1249961"/>
+              <a:ext cx="0" cy="422787"/>
+            </a:xfrm>
+            <a:prstGeom prst="line">
+              <a:avLst/>
+            </a:prstGeom>
+            <a:noFill/>
+            <a:ln w="28575">
+              <a:solidFill>
+                <a:srgbClr val="000000"/>
+              </a:solidFill>
+              <a:round/>
+              <a:headEnd/>
+              <a:tailEnd type="stealth" w="lg" len="lg"/>
+            </a:ln>
+          </p:spPr>
+          <p:txBody>
+            <a:bodyPr wrap="square">
+              <a:spAutoFit/>
+            </a:bodyPr>
+            <a:lstStyle/>
+            <a:p>
+              <a:endParaRPr lang="en-US"/>
+            </a:p>
+          </p:txBody>
+        </p:sp>
+        <p:sp>
+          <p:nvSpPr>
+            <p:cNvPr id="5" name="TextBox 42"/>
+            <p:cNvSpPr txBox="1">
+              <a:spLocks noChangeArrowheads="1"/>
+            </p:cNvSpPr>
+            <p:nvPr/>
+          </p:nvSpPr>
+          <p:spPr bwMode="auto">
+            <a:xfrm>
+              <a:off x="6537327" y="5628156"/>
+              <a:ext cx="2777495" cy="461665"/>
+            </a:xfrm>
+            <a:prstGeom prst="rect">
+              <a:avLst/>
+            </a:prstGeom>
+            <a:noFill/>
+            <a:ln w="9525">
+              <a:noFill/>
+              <a:miter lim="800000"/>
+              <a:headEnd/>
+              <a:tailEnd/>
+            </a:ln>
+          </p:spPr>
+          <p:txBody>
+            <a:bodyPr wrap="square">
+              <a:spAutoFit/>
+            </a:bodyPr>
+            <a:lstStyle/>
+            <a:p>
+              <a:r>
+                <a:rPr lang="en-US" sz="2400" b="0" dirty="0" smtClean="0">
+                  <a:solidFill>
+                    <a:srgbClr val="000000"/>
+                  </a:solidFill>
+                  <a:latin typeface="Palatino Linotype" panose="02040502050505030304" pitchFamily="18" charset="0"/>
+                </a:rPr>
+                <a:t>Focal Plane Platter</a:t>
+              </a:r>
+              <a:endParaRPr lang="en-US" sz="2400" b="0" dirty="0">
+                <a:solidFill>
+                  <a:srgbClr val="000000"/>
+                </a:solidFill>
+                <a:latin typeface="Palatino Linotype" panose="02040502050505030304" pitchFamily="18" charset="0"/>
+              </a:endParaRPr>
+            </a:p>
+          </p:txBody>
+        </p:sp>
+        <p:sp>
+          <p:nvSpPr>
+            <p:cNvPr id="6" name="Line 20"/>
+            <p:cNvSpPr>
+              <a:spLocks noChangeShapeType="1"/>
+            </p:cNvSpPr>
+            <p:nvPr/>
+          </p:nvSpPr>
+          <p:spPr bwMode="auto">
+            <a:xfrm flipH="1" flipV="1">
+              <a:off x="7660369" y="5165790"/>
+              <a:ext cx="78658" cy="517998"/>
+            </a:xfrm>
+            <a:prstGeom prst="line">
+              <a:avLst/>
+            </a:prstGeom>
+            <a:noFill/>
+            <a:ln w="28575">
+              <a:solidFill>
+                <a:srgbClr val="000000"/>
+              </a:solidFill>
+              <a:round/>
+              <a:headEnd/>
+              <a:tailEnd type="stealth" w="lg" len="lg"/>
+            </a:ln>
+          </p:spPr>
+          <p:txBody>
+            <a:bodyPr wrap="square">
+              <a:spAutoFit/>
+            </a:bodyPr>
+            <a:lstStyle/>
+            <a:p>
+              <a:endParaRPr lang="en-US"/>
+            </a:p>
+          </p:txBody>
+        </p:sp>
+        <p:sp>
+          <p:nvSpPr>
+            <p:cNvPr id="7" name="TextBox 42"/>
+            <p:cNvSpPr txBox="1">
+              <a:spLocks noChangeArrowheads="1"/>
+            </p:cNvSpPr>
+            <p:nvPr/>
+          </p:nvSpPr>
+          <p:spPr bwMode="auto">
+            <a:xfrm>
+              <a:off x="255639" y="5508587"/>
+              <a:ext cx="2330245" cy="461665"/>
+            </a:xfrm>
+            <a:prstGeom prst="rect">
+              <a:avLst/>
+            </a:prstGeom>
+            <a:noFill/>
+            <a:ln w="9525">
+              <a:noFill/>
+              <a:miter lim="800000"/>
+              <a:headEnd/>
+              <a:tailEnd/>
+            </a:ln>
+          </p:spPr>
+          <p:txBody>
+            <a:bodyPr wrap="square">
+              <a:spAutoFit/>
+            </a:bodyPr>
+            <a:lstStyle/>
+            <a:p>
+              <a:r>
+                <a:rPr lang="en-US" sz="2400" b="0" dirty="0" smtClean="0">
+                  <a:solidFill>
+                    <a:srgbClr val="000000"/>
+                  </a:solidFill>
+                  <a:latin typeface="Palatino Linotype" panose="02040502050505030304" pitchFamily="18" charset="0"/>
+                </a:rPr>
+                <a:t>Alignment Pin</a:t>
+              </a:r>
+              <a:endParaRPr lang="en-US" sz="2400" b="0" dirty="0">
+                <a:solidFill>
+                  <a:srgbClr val="000000"/>
+                </a:solidFill>
+                <a:latin typeface="Palatino Linotype" panose="02040502050505030304" pitchFamily="18" charset="0"/>
+              </a:endParaRPr>
+            </a:p>
+          </p:txBody>
+        </p:sp>
+        <p:sp>
+          <p:nvSpPr>
+            <p:cNvPr id="8" name="Line 20"/>
+            <p:cNvSpPr>
+              <a:spLocks noChangeShapeType="1"/>
+            </p:cNvSpPr>
+            <p:nvPr/>
+          </p:nvSpPr>
+          <p:spPr bwMode="auto">
+            <a:xfrm flipH="1" flipV="1">
+              <a:off x="1258529" y="4827639"/>
+              <a:ext cx="198810" cy="736580"/>
+            </a:xfrm>
+            <a:prstGeom prst="line">
+              <a:avLst/>
+            </a:prstGeom>
+            <a:noFill/>
+            <a:ln w="28575">
+              <a:solidFill>
+                <a:srgbClr val="000000"/>
+              </a:solidFill>
+              <a:round/>
+              <a:headEnd/>
+              <a:tailEnd type="stealth" w="lg" len="lg"/>
+            </a:ln>
+          </p:spPr>
+          <p:txBody>
+            <a:bodyPr wrap="square">
+              <a:spAutoFit/>
+            </a:bodyPr>
+            <a:lstStyle/>
+            <a:p>
+              <a:endParaRPr lang="en-US"/>
+            </a:p>
+          </p:txBody>
+        </p:sp>
+        <p:sp>
+          <p:nvSpPr>
+            <p:cNvPr id="9" name="TextBox 42"/>
+            <p:cNvSpPr txBox="1">
+              <a:spLocks noChangeArrowheads="1"/>
+            </p:cNvSpPr>
+            <p:nvPr/>
+          </p:nvSpPr>
+          <p:spPr bwMode="auto">
+            <a:xfrm>
+              <a:off x="1357934" y="5970252"/>
+              <a:ext cx="2330245" cy="461665"/>
+            </a:xfrm>
+            <a:prstGeom prst="rect">
+              <a:avLst/>
+            </a:prstGeom>
+            <a:noFill/>
+            <a:ln w="9525">
+              <a:noFill/>
+              <a:miter lim="800000"/>
+              <a:headEnd/>
+              <a:tailEnd/>
+            </a:ln>
+          </p:spPr>
+          <p:txBody>
+            <a:bodyPr wrap="square">
+              <a:spAutoFit/>
+            </a:bodyPr>
+            <a:lstStyle/>
+            <a:p>
+              <a:r>
+                <a:rPr lang="en-US" sz="2400" b="0" dirty="0" smtClean="0">
+                  <a:solidFill>
+                    <a:srgbClr val="000000"/>
+                  </a:solidFill>
+                  <a:latin typeface="Palatino Linotype" panose="02040502050505030304" pitchFamily="18" charset="0"/>
+                </a:rPr>
+                <a:t>Invar Plate</a:t>
+              </a:r>
+              <a:endParaRPr lang="en-US" sz="2400" b="0" dirty="0">
+                <a:solidFill>
+                  <a:srgbClr val="000000"/>
+                </a:solidFill>
+                <a:latin typeface="Palatino Linotype" panose="02040502050505030304" pitchFamily="18" charset="0"/>
+              </a:endParaRPr>
+            </a:p>
+          </p:txBody>
+        </p:sp>
+        <p:sp>
+          <p:nvSpPr>
+            <p:cNvPr id="10" name="Line 20"/>
+            <p:cNvSpPr>
+              <a:spLocks noChangeShapeType="1"/>
+            </p:cNvSpPr>
+            <p:nvPr/>
+          </p:nvSpPr>
+          <p:spPr bwMode="auto">
+            <a:xfrm flipV="1">
+              <a:off x="2523056" y="4049485"/>
+              <a:ext cx="62828" cy="1920766"/>
+            </a:xfrm>
+            <a:prstGeom prst="line">
+              <a:avLst/>
+            </a:prstGeom>
+            <a:noFill/>
+            <a:ln w="28575">
+              <a:solidFill>
+                <a:srgbClr val="000000"/>
+              </a:solidFill>
+              <a:round/>
+              <a:headEnd/>
+              <a:tailEnd type="stealth" w="lg" len="lg"/>
+            </a:ln>
+          </p:spPr>
+          <p:txBody>
+            <a:bodyPr wrap="square">
+              <a:spAutoFit/>
+            </a:bodyPr>
+            <a:lstStyle/>
+            <a:p>
+              <a:endParaRPr lang="en-US"/>
+            </a:p>
+          </p:txBody>
+        </p:sp>
+        <p:sp>
+          <p:nvSpPr>
+            <p:cNvPr id="11" name="TextBox 42"/>
+            <p:cNvSpPr txBox="1">
+              <a:spLocks noChangeArrowheads="1"/>
+            </p:cNvSpPr>
+            <p:nvPr/>
+          </p:nvSpPr>
+          <p:spPr bwMode="auto">
+            <a:xfrm>
+              <a:off x="3479811" y="5452955"/>
+              <a:ext cx="2780312" cy="830997"/>
+            </a:xfrm>
+            <a:prstGeom prst="rect">
+              <a:avLst/>
+            </a:prstGeom>
+            <a:noFill/>
+            <a:ln w="9525">
+              <a:noFill/>
+              <a:miter lim="800000"/>
+              <a:headEnd/>
+              <a:tailEnd/>
+            </a:ln>
+          </p:spPr>
+          <p:txBody>
+            <a:bodyPr wrap="square">
+              <a:spAutoFit/>
+            </a:bodyPr>
+            <a:lstStyle/>
+            <a:p>
+              <a:r>
+                <a:rPr lang="en-US" sz="2400" b="0" dirty="0" smtClean="0">
+                  <a:solidFill>
+                    <a:srgbClr val="000000"/>
+                  </a:solidFill>
+                  <a:latin typeface="Palatino Linotype" panose="02040502050505030304" pitchFamily="18" charset="0"/>
+                </a:rPr>
+                <a:t>Detector and </a:t>
+              </a:r>
+              <a:r>
+                <a:rPr lang="en-US" sz="2400" b="0" dirty="0" err="1" smtClean="0">
+                  <a:solidFill>
+                    <a:srgbClr val="000000"/>
+                  </a:solidFill>
+                  <a:latin typeface="Palatino Linotype" panose="02040502050505030304" pitchFamily="18" charset="0"/>
+                </a:rPr>
+                <a:t>Backshort</a:t>
+              </a:r>
+              <a:r>
+                <a:rPr lang="en-US" sz="2400" b="0" dirty="0" smtClean="0">
+                  <a:solidFill>
+                    <a:srgbClr val="000000"/>
+                  </a:solidFill>
+                  <a:latin typeface="Palatino Linotype" panose="02040502050505030304" pitchFamily="18" charset="0"/>
+                </a:rPr>
+                <a:t> Wafers</a:t>
+              </a:r>
+              <a:endParaRPr lang="en-US" sz="2400" b="0" dirty="0">
+                <a:solidFill>
+                  <a:srgbClr val="000000"/>
+                </a:solidFill>
+                <a:latin typeface="Palatino Linotype" panose="02040502050505030304" pitchFamily="18" charset="0"/>
+              </a:endParaRPr>
+            </a:p>
+          </p:txBody>
+        </p:sp>
+        <p:sp>
+          <p:nvSpPr>
+            <p:cNvPr id="12" name="Line 20"/>
+            <p:cNvSpPr>
+              <a:spLocks noChangeShapeType="1"/>
+            </p:cNvSpPr>
+            <p:nvPr/>
+          </p:nvSpPr>
+          <p:spPr bwMode="auto">
+            <a:xfrm flipV="1">
+              <a:off x="4644933" y="3778180"/>
+              <a:ext cx="225034" cy="1674774"/>
+            </a:xfrm>
+            <a:prstGeom prst="line">
+              <a:avLst/>
+            </a:prstGeom>
+            <a:noFill/>
+            <a:ln w="28575">
+              <a:solidFill>
+                <a:srgbClr val="000000"/>
+              </a:solidFill>
+              <a:round/>
+              <a:headEnd/>
+              <a:tailEnd type="stealth" w="lg" len="lg"/>
+            </a:ln>
+          </p:spPr>
+          <p:txBody>
+            <a:bodyPr wrap="square">
+              <a:spAutoFit/>
+            </a:bodyPr>
+            <a:lstStyle/>
+            <a:p>
+              <a:endParaRPr lang="en-US"/>
+            </a:p>
+          </p:txBody>
+        </p:sp>
+        <p:sp>
+          <p:nvSpPr>
+            <p:cNvPr id="13" name="TextBox 42"/>
+            <p:cNvSpPr txBox="1">
+              <a:spLocks noChangeArrowheads="1"/>
+            </p:cNvSpPr>
+            <p:nvPr/>
+          </p:nvSpPr>
+          <p:spPr bwMode="auto">
+            <a:xfrm>
+              <a:off x="7053279" y="914711"/>
+              <a:ext cx="2359948" cy="461665"/>
+            </a:xfrm>
+            <a:prstGeom prst="rect">
+              <a:avLst/>
+            </a:prstGeom>
+            <a:noFill/>
+            <a:ln w="9525">
+              <a:noFill/>
+              <a:miter lim="800000"/>
+              <a:headEnd/>
+              <a:tailEnd/>
+            </a:ln>
+          </p:spPr>
+          <p:txBody>
+            <a:bodyPr wrap="square">
+              <a:spAutoFit/>
+            </a:bodyPr>
+            <a:lstStyle/>
+            <a:p>
+              <a:r>
+                <a:rPr lang="en-US" sz="2400" b="0" dirty="0" smtClean="0">
+                  <a:solidFill>
+                    <a:srgbClr val="000000"/>
+                  </a:solidFill>
+                  <a:latin typeface="Palatino Linotype" panose="02040502050505030304" pitchFamily="18" charset="0"/>
+                </a:rPr>
+                <a:t>Circuit Board</a:t>
+              </a:r>
+              <a:endParaRPr lang="en-US" sz="2400" b="0" dirty="0">
+                <a:solidFill>
+                  <a:srgbClr val="000000"/>
+                </a:solidFill>
+                <a:latin typeface="Palatino Linotype" panose="02040502050505030304" pitchFamily="18" charset="0"/>
+              </a:endParaRPr>
+            </a:p>
+          </p:txBody>
+        </p:sp>
+        <p:sp>
+          <p:nvSpPr>
+            <p:cNvPr id="14" name="Line 20"/>
+            <p:cNvSpPr>
+              <a:spLocks noChangeShapeType="1"/>
+            </p:cNvSpPr>
+            <p:nvPr/>
+          </p:nvSpPr>
+          <p:spPr bwMode="auto">
+            <a:xfrm>
+              <a:off x="8692269" y="1291763"/>
+              <a:ext cx="79942" cy="2606997"/>
+            </a:xfrm>
+            <a:prstGeom prst="line">
+              <a:avLst/>
+            </a:prstGeom>
+            <a:noFill/>
+            <a:ln w="28575">
+              <a:solidFill>
+                <a:srgbClr val="000000"/>
+              </a:solidFill>
+              <a:round/>
+              <a:headEnd/>
+              <a:tailEnd type="stealth" w="lg" len="lg"/>
+            </a:ln>
+          </p:spPr>
+          <p:txBody>
+            <a:bodyPr wrap="square">
+              <a:spAutoFit/>
+            </a:bodyPr>
+            <a:lstStyle/>
+            <a:p>
+              <a:endParaRPr lang="en-US"/>
+            </a:p>
+          </p:txBody>
+        </p:sp>
+      </p:grpSp>
+    </p:spTree>
+    <p:extLst>
+      <p:ext uri="{BB962C8B-B14F-4D97-AF65-F5344CB8AC3E}">
+        <p14:creationId xmlns:p14="http://schemas.microsoft.com/office/powerpoint/2010/main" val="2791091879"/>
       </p:ext>
     </p:extLst>
   </p:cSld>

</xml_diff>

<commit_message>
Overview schematic of focal plane
</commit_message>
<xml_diff>
--- a/support/thesis-drawings.pptx
+++ b/support/thesis-drawings.pptx
@@ -5,13 +5,14 @@
     <p:sldMasterId id="2147483648" r:id="rId1"/>
   </p:sldMasterIdLst>
   <p:notesMasterIdLst>
-    <p:notesMasterId r:id="rId6"/>
+    <p:notesMasterId r:id="rId7"/>
   </p:notesMasterIdLst>
   <p:sldIdLst>
     <p:sldId id="258" r:id="rId2"/>
     <p:sldId id="257" r:id="rId3"/>
     <p:sldId id="259" r:id="rId4"/>
     <p:sldId id="260" r:id="rId5"/>
+    <p:sldId id="261" r:id="rId6"/>
   </p:sldIdLst>
   <p:sldSz cx="9144000" cy="6858000" type="screen4x3"/>
   <p:notesSz cx="6858000" cy="9144000"/>
@@ -8256,16 +8257,16 @@
       </p:grpSpPr>
       <p:grpSp>
         <p:nvGrpSpPr>
-          <p:cNvPr id="15" name="Group 14"/>
+          <p:cNvPr id="18" name="Group 17"/>
           <p:cNvGrpSpPr/>
           <p:nvPr/>
         </p:nvGrpSpPr>
         <p:grpSpPr>
           <a:xfrm>
-            <a:off x="0" y="796864"/>
-            <a:ext cx="9413227" cy="5635053"/>
-            <a:chOff x="0" y="796864"/>
-            <a:chExt cx="9413227" cy="5635053"/>
+            <a:off x="0" y="905016"/>
+            <a:ext cx="9314822" cy="5414904"/>
+            <a:chOff x="0" y="905016"/>
+            <a:chExt cx="9314822" cy="5414904"/>
           </a:xfrm>
         </p:grpSpPr>
         <p:pic>
@@ -8308,8 +8309,8 @@
           </p:nvSpPr>
           <p:spPr bwMode="auto">
             <a:xfrm>
-              <a:off x="277365" y="796864"/>
-              <a:ext cx="2359948" cy="461665"/>
+              <a:off x="277365" y="905016"/>
+              <a:ext cx="2359948" cy="369332"/>
             </a:xfrm>
             <a:prstGeom prst="rect">
               <a:avLst/>
@@ -8329,7 +8330,7 @@
             <a:lstStyle/>
             <a:p>
               <a:r>
-                <a:rPr lang="en-US" sz="2400" b="0" dirty="0" err="1" smtClean="0">
+                <a:rPr lang="en-US" b="0" dirty="0" err="1" smtClean="0">
                   <a:solidFill>
                     <a:srgbClr val="000000"/>
                   </a:solidFill>
@@ -8338,7 +8339,7 @@
                 <a:t>Feedhorn</a:t>
               </a:r>
               <a:r>
-                <a:rPr lang="en-US" sz="2400" b="0" dirty="0" smtClean="0">
+                <a:rPr lang="en-US" b="0" dirty="0" smtClean="0">
                   <a:solidFill>
                     <a:srgbClr val="000000"/>
                   </a:solidFill>
@@ -8346,7 +8347,7 @@
                 </a:rPr>
                 <a:t> Array</a:t>
               </a:r>
-              <a:endParaRPr lang="en-US" sz="2400" b="0" dirty="0">
+              <a:endParaRPr lang="en-US" b="0" dirty="0">
                 <a:solidFill>
                   <a:srgbClr val="000000"/>
                 </a:solidFill>
@@ -8402,7 +8403,7 @@
           <p:spPr bwMode="auto">
             <a:xfrm>
               <a:off x="6537327" y="5628156"/>
-              <a:ext cx="2777495" cy="461665"/>
+              <a:ext cx="2777495" cy="369332"/>
             </a:xfrm>
             <a:prstGeom prst="rect">
               <a:avLst/>
@@ -8422,7 +8423,7 @@
             <a:lstStyle/>
             <a:p>
               <a:r>
-                <a:rPr lang="en-US" sz="2400" b="0" dirty="0" smtClean="0">
+                <a:rPr lang="en-US" b="0" dirty="0" smtClean="0">
                   <a:solidFill>
                     <a:srgbClr val="000000"/>
                   </a:solidFill>
@@ -8430,7 +8431,7 @@
                 </a:rPr>
                 <a:t>Focal Plane Platter</a:t>
               </a:r>
-              <a:endParaRPr lang="en-US" sz="2400" b="0" dirty="0">
+              <a:endParaRPr lang="en-US" b="0" dirty="0">
                 <a:solidFill>
                   <a:srgbClr val="000000"/>
                 </a:solidFill>
@@ -8486,7 +8487,7 @@
           <p:spPr bwMode="auto">
             <a:xfrm>
               <a:off x="255639" y="5508587"/>
-              <a:ext cx="2330245" cy="461665"/>
+              <a:ext cx="2330245" cy="369332"/>
             </a:xfrm>
             <a:prstGeom prst="rect">
               <a:avLst/>
@@ -8506,7 +8507,7 @@
             <a:lstStyle/>
             <a:p>
               <a:r>
-                <a:rPr lang="en-US" sz="2400" b="0" dirty="0" smtClean="0">
+                <a:rPr lang="en-US" b="0" dirty="0" smtClean="0">
                   <a:solidFill>
                     <a:srgbClr val="000000"/>
                   </a:solidFill>
@@ -8514,7 +8515,7 @@
                 </a:rPr>
                 <a:t>Alignment Pin</a:t>
               </a:r>
-              <a:endParaRPr lang="en-US" sz="2400" b="0" dirty="0">
+              <a:endParaRPr lang="en-US" b="0" dirty="0">
                 <a:solidFill>
                   <a:srgbClr val="000000"/>
                 </a:solidFill>
@@ -8569,8 +8570,8 @@
           </p:nvSpPr>
           <p:spPr bwMode="auto">
             <a:xfrm>
-              <a:off x="1357934" y="5970252"/>
-              <a:ext cx="2330245" cy="461665"/>
+              <a:off x="1770878" y="5950588"/>
+              <a:ext cx="1486607" cy="369332"/>
             </a:xfrm>
             <a:prstGeom prst="rect">
               <a:avLst/>
@@ -8590,7 +8591,7 @@
             <a:lstStyle/>
             <a:p>
               <a:r>
-                <a:rPr lang="en-US" sz="2400" b="0" dirty="0" smtClean="0">
+                <a:rPr lang="en-US" b="0" dirty="0" smtClean="0">
                   <a:solidFill>
                     <a:srgbClr val="000000"/>
                   </a:solidFill>
@@ -8598,7 +8599,7 @@
                 </a:rPr>
                 <a:t>Invar Plate</a:t>
               </a:r>
-              <a:endParaRPr lang="en-US" sz="2400" b="0" dirty="0">
+              <a:endParaRPr lang="en-US" b="0" dirty="0">
                 <a:solidFill>
                   <a:srgbClr val="000000"/>
                 </a:solidFill>
@@ -8653,8 +8654,8 @@
           </p:nvSpPr>
           <p:spPr bwMode="auto">
             <a:xfrm>
-              <a:off x="3479811" y="5452955"/>
-              <a:ext cx="2780312" cy="830997"/>
+              <a:off x="3430651" y="5423459"/>
+              <a:ext cx="2780312" cy="646331"/>
             </a:xfrm>
             <a:prstGeom prst="rect">
               <a:avLst/>
@@ -8674,7 +8675,7 @@
             <a:lstStyle/>
             <a:p>
               <a:r>
-                <a:rPr lang="en-US" sz="2400" b="0" dirty="0" smtClean="0">
+                <a:rPr lang="en-US" b="0" dirty="0" smtClean="0">
                   <a:solidFill>
                     <a:srgbClr val="000000"/>
                   </a:solidFill>
@@ -8683,7 +8684,7 @@
                 <a:t>Detector and </a:t>
               </a:r>
               <a:r>
-                <a:rPr lang="en-US" sz="2400" b="0" dirty="0" err="1" smtClean="0">
+                <a:rPr lang="en-US" b="0" dirty="0" err="1" smtClean="0">
                   <a:solidFill>
                     <a:srgbClr val="000000"/>
                   </a:solidFill>
@@ -8692,7 +8693,7 @@
                 <a:t>Backshort</a:t>
               </a:r>
               <a:r>
-                <a:rPr lang="en-US" sz="2400" b="0" dirty="0" smtClean="0">
+                <a:rPr lang="en-US" b="0" dirty="0" smtClean="0">
                   <a:solidFill>
                     <a:srgbClr val="000000"/>
                   </a:solidFill>
@@ -8700,7 +8701,7 @@
                 </a:rPr>
                 <a:t> Wafers</a:t>
               </a:r>
-              <a:endParaRPr lang="en-US" sz="2400" b="0" dirty="0">
+              <a:endParaRPr lang="en-US" b="0" dirty="0">
                 <a:solidFill>
                   <a:srgbClr val="000000"/>
                 </a:solidFill>
@@ -8755,8 +8756,8 @@
           </p:nvSpPr>
           <p:spPr bwMode="auto">
             <a:xfrm>
-              <a:off x="7053279" y="914711"/>
-              <a:ext cx="2359948" cy="461665"/>
+              <a:off x="7289247" y="954039"/>
+              <a:ext cx="1718932" cy="369332"/>
             </a:xfrm>
             <a:prstGeom prst="rect">
               <a:avLst/>
@@ -8776,7 +8777,7 @@
             <a:lstStyle/>
             <a:p>
               <a:r>
-                <a:rPr lang="en-US" sz="2400" b="0" dirty="0" smtClean="0">
+                <a:rPr lang="en-US" b="0" dirty="0" smtClean="0">
                   <a:solidFill>
                     <a:srgbClr val="000000"/>
                   </a:solidFill>
@@ -8784,7 +8785,7 @@
                 </a:rPr>
                 <a:t>Circuit Board</a:t>
               </a:r>
-              <a:endParaRPr lang="en-US" sz="2400" b="0" dirty="0">
+              <a:endParaRPr lang="en-US" b="0" dirty="0">
                 <a:solidFill>
                   <a:srgbClr val="000000"/>
                 </a:solidFill>
@@ -8829,11 +8830,709 @@
             </a:p>
           </p:txBody>
         </p:sp>
+        <p:sp>
+          <p:nvSpPr>
+            <p:cNvPr id="16" name="Line 20"/>
+            <p:cNvSpPr>
+              <a:spLocks noChangeShapeType="1"/>
+            </p:cNvSpPr>
+            <p:nvPr/>
+          </p:nvSpPr>
+          <p:spPr bwMode="auto">
+            <a:xfrm>
+              <a:off x="2952693" y="1584798"/>
+              <a:ext cx="3730752" cy="0"/>
+            </a:xfrm>
+            <a:prstGeom prst="line">
+              <a:avLst/>
+            </a:prstGeom>
+            <a:noFill/>
+            <a:ln w="28575">
+              <a:solidFill>
+                <a:srgbClr val="000000"/>
+              </a:solidFill>
+              <a:round/>
+              <a:headEnd type="stealth" w="lg" len="lg"/>
+              <a:tailEnd type="stealth" w="lg" len="lg"/>
+            </a:ln>
+          </p:spPr>
+          <p:txBody>
+            <a:bodyPr wrap="square">
+              <a:spAutoFit/>
+            </a:bodyPr>
+            <a:lstStyle/>
+            <a:p>
+              <a:endParaRPr lang="en-US"/>
+            </a:p>
+          </p:txBody>
+        </p:sp>
+        <p:sp>
+          <p:nvSpPr>
+            <p:cNvPr id="17" name="TextBox 42"/>
+            <p:cNvSpPr txBox="1">
+              <a:spLocks noChangeArrowheads="1"/>
+            </p:cNvSpPr>
+            <p:nvPr/>
+          </p:nvSpPr>
+          <p:spPr bwMode="auto">
+            <a:xfrm>
+              <a:off x="4074766" y="1217361"/>
+              <a:ext cx="1486607" cy="369332"/>
+            </a:xfrm>
+            <a:prstGeom prst="rect">
+              <a:avLst/>
+            </a:prstGeom>
+            <a:noFill/>
+            <a:ln w="9525">
+              <a:noFill/>
+              <a:miter lim="800000"/>
+              <a:headEnd/>
+              <a:tailEnd/>
+            </a:ln>
+          </p:spPr>
+          <p:txBody>
+            <a:bodyPr wrap="square">
+              <a:spAutoFit/>
+            </a:bodyPr>
+            <a:lstStyle/>
+            <a:p>
+              <a:pPr algn="ctr"/>
+              <a:r>
+                <a:rPr lang="en-US" b="0" dirty="0" smtClean="0">
+                  <a:solidFill>
+                    <a:srgbClr val="000000"/>
+                  </a:solidFill>
+                  <a:latin typeface="Palatino Linotype" panose="02040502050505030304" pitchFamily="18" charset="0"/>
+                </a:rPr>
+                <a:t>1 in</a:t>
+              </a:r>
+              <a:endParaRPr lang="en-US" b="0" dirty="0">
+                <a:solidFill>
+                  <a:srgbClr val="000000"/>
+                </a:solidFill>
+                <a:latin typeface="Palatino Linotype" panose="02040502050505030304" pitchFamily="18" charset="0"/>
+              </a:endParaRPr>
+            </a:p>
+          </p:txBody>
+        </p:sp>
       </p:grpSp>
     </p:spTree>
     <p:extLst>
       <p:ext uri="{BB962C8B-B14F-4D97-AF65-F5344CB8AC3E}">
         <p14:creationId xmlns:p14="http://schemas.microsoft.com/office/powerpoint/2010/main" val="2791091879"/>
+      </p:ext>
+    </p:extLst>
+  </p:cSld>
+  <p:clrMapOvr>
+    <a:masterClrMapping/>
+  </p:clrMapOvr>
+</p:sld>
+</file>
+
+<file path=ppt/slides/slide5.xml><?xml version="1.0" encoding="utf-8"?>
+<p:sld xmlns:a="http://schemas.openxmlformats.org/drawingml/2006/main" xmlns:r="http://schemas.openxmlformats.org/officeDocument/2006/relationships" xmlns:p="http://schemas.openxmlformats.org/presentationml/2006/main">
+  <p:cSld>
+    <p:spTree>
+      <p:nvGrpSpPr>
+        <p:cNvPr id="1" name=""/>
+        <p:cNvGrpSpPr/>
+        <p:nvPr/>
+      </p:nvGrpSpPr>
+      <p:grpSpPr>
+        <a:xfrm>
+          <a:off x="0" y="0"/>
+          <a:ext cx="0" cy="0"/>
+          <a:chOff x="0" y="0"/>
+          <a:chExt cx="0" cy="0"/>
+        </a:xfrm>
+      </p:grpSpPr>
+      <p:grpSp>
+        <p:nvGrpSpPr>
+          <p:cNvPr id="18" name="Group 17"/>
+          <p:cNvGrpSpPr/>
+          <p:nvPr/>
+        </p:nvGrpSpPr>
+        <p:grpSpPr>
+          <a:xfrm>
+            <a:off x="34436" y="-12430"/>
+            <a:ext cx="9237380" cy="6791761"/>
+            <a:chOff x="34436" y="-12430"/>
+            <a:chExt cx="9237380" cy="6791761"/>
+          </a:xfrm>
+        </p:grpSpPr>
+        <p:pic>
+          <p:nvPicPr>
+            <p:cNvPr id="2" name="Picture 1"/>
+            <p:cNvPicPr>
+              <a:picLocks noChangeAspect="1"/>
+            </p:cNvPicPr>
+            <p:nvPr/>
+          </p:nvPicPr>
+          <p:blipFill>
+            <a:blip r:embed="rId2">
+              <a:extLst>
+                <a:ext uri="{28A0092B-C50C-407E-A947-70E740481C1C}">
+                  <a14:useLocalDpi xmlns:a14="http://schemas.microsoft.com/office/drawing/2010/main" val="0"/>
+                </a:ext>
+              </a:extLst>
+            </a:blip>
+            <a:stretch>
+              <a:fillRect/>
+            </a:stretch>
+          </p:blipFill>
+          <p:spPr>
+            <a:xfrm>
+              <a:off x="1510686" y="835731"/>
+              <a:ext cx="5702050" cy="5943600"/>
+            </a:xfrm>
+            <a:prstGeom prst="rect">
+              <a:avLst/>
+            </a:prstGeom>
+          </p:spPr>
+        </p:pic>
+        <p:sp>
+          <p:nvSpPr>
+            <p:cNvPr id="3" name="TextBox 42"/>
+            <p:cNvSpPr txBox="1">
+              <a:spLocks noChangeArrowheads="1"/>
+            </p:cNvSpPr>
+            <p:nvPr/>
+          </p:nvSpPr>
+          <p:spPr bwMode="auto">
+            <a:xfrm>
+              <a:off x="34436" y="2784233"/>
+              <a:ext cx="1838632" cy="646331"/>
+            </a:xfrm>
+            <a:prstGeom prst="rect">
+              <a:avLst/>
+            </a:prstGeom>
+            <a:noFill/>
+            <a:ln w="9525">
+              <a:noFill/>
+              <a:miter lim="800000"/>
+              <a:headEnd/>
+              <a:tailEnd/>
+            </a:ln>
+          </p:spPr>
+          <p:txBody>
+            <a:bodyPr wrap="square">
+              <a:spAutoFit/>
+            </a:bodyPr>
+            <a:lstStyle/>
+            <a:p>
+              <a:r>
+                <a:rPr lang="en-US" dirty="0" smtClean="0">
+                  <a:solidFill>
+                    <a:srgbClr val="000000"/>
+                  </a:solidFill>
+                  <a:latin typeface="Palatino Linotype" panose="02040502050505030304" pitchFamily="18" charset="0"/>
+                </a:rPr>
+                <a:t>Spider mount points</a:t>
+              </a:r>
+              <a:endParaRPr lang="en-US" b="0" dirty="0">
+                <a:solidFill>
+                  <a:srgbClr val="000000"/>
+                </a:solidFill>
+                <a:latin typeface="Palatino Linotype" panose="02040502050505030304" pitchFamily="18" charset="0"/>
+              </a:endParaRPr>
+            </a:p>
+          </p:txBody>
+        </p:sp>
+        <p:sp>
+          <p:nvSpPr>
+            <p:cNvPr id="4" name="Line 20"/>
+            <p:cNvSpPr>
+              <a:spLocks noChangeShapeType="1"/>
+            </p:cNvSpPr>
+            <p:nvPr/>
+          </p:nvSpPr>
+          <p:spPr bwMode="auto">
+            <a:xfrm flipV="1">
+              <a:off x="884924" y="1494493"/>
+              <a:ext cx="845574" cy="1289740"/>
+            </a:xfrm>
+            <a:prstGeom prst="line">
+              <a:avLst/>
+            </a:prstGeom>
+            <a:noFill/>
+            <a:ln w="28575">
+              <a:solidFill>
+                <a:srgbClr val="000000"/>
+              </a:solidFill>
+              <a:round/>
+              <a:headEnd/>
+              <a:tailEnd type="stealth" w="lg" len="lg"/>
+            </a:ln>
+          </p:spPr>
+          <p:txBody>
+            <a:bodyPr wrap="square">
+              <a:spAutoFit/>
+            </a:bodyPr>
+            <a:lstStyle/>
+            <a:p>
+              <a:endParaRPr lang="en-US"/>
+            </a:p>
+          </p:txBody>
+        </p:sp>
+        <p:sp>
+          <p:nvSpPr>
+            <p:cNvPr id="5" name="Line 20"/>
+            <p:cNvSpPr>
+              <a:spLocks noChangeShapeType="1"/>
+            </p:cNvSpPr>
+            <p:nvPr/>
+          </p:nvSpPr>
+          <p:spPr bwMode="auto">
+            <a:xfrm>
+              <a:off x="737440" y="3430563"/>
+              <a:ext cx="993058" cy="2970225"/>
+            </a:xfrm>
+            <a:prstGeom prst="line">
+              <a:avLst/>
+            </a:prstGeom>
+            <a:noFill/>
+            <a:ln w="28575">
+              <a:solidFill>
+                <a:srgbClr val="000000"/>
+              </a:solidFill>
+              <a:round/>
+              <a:headEnd/>
+              <a:tailEnd type="stealth" w="lg" len="lg"/>
+            </a:ln>
+          </p:spPr>
+          <p:txBody>
+            <a:bodyPr wrap="square">
+              <a:spAutoFit/>
+            </a:bodyPr>
+            <a:lstStyle/>
+            <a:p>
+              <a:endParaRPr lang="en-US"/>
+            </a:p>
+          </p:txBody>
+        </p:sp>
+        <p:sp>
+          <p:nvSpPr>
+            <p:cNvPr id="6" name="TextBox 42"/>
+            <p:cNvSpPr txBox="1">
+              <a:spLocks noChangeArrowheads="1"/>
+            </p:cNvSpPr>
+            <p:nvPr/>
+          </p:nvSpPr>
+          <p:spPr bwMode="auto">
+            <a:xfrm>
+              <a:off x="3220084" y="-12430"/>
+              <a:ext cx="2492475" cy="646331"/>
+            </a:xfrm>
+            <a:prstGeom prst="rect">
+              <a:avLst/>
+            </a:prstGeom>
+            <a:noFill/>
+            <a:ln w="9525">
+              <a:noFill/>
+              <a:miter lim="800000"/>
+              <a:headEnd/>
+              <a:tailEnd/>
+            </a:ln>
+          </p:spPr>
+          <p:txBody>
+            <a:bodyPr wrap="square">
+              <a:spAutoFit/>
+            </a:bodyPr>
+            <a:lstStyle/>
+            <a:p>
+              <a:r>
+                <a:rPr lang="en-US" dirty="0" smtClean="0">
+                  <a:solidFill>
+                    <a:srgbClr val="000000"/>
+                  </a:solidFill>
+                  <a:latin typeface="Palatino Linotype" panose="02040502050505030304" pitchFamily="18" charset="0"/>
+                </a:rPr>
+                <a:t>Mount points for link to 1 K cold plate</a:t>
+              </a:r>
+              <a:endParaRPr lang="en-US" b="0" dirty="0">
+                <a:solidFill>
+                  <a:srgbClr val="000000"/>
+                </a:solidFill>
+                <a:latin typeface="Palatino Linotype" panose="02040502050505030304" pitchFamily="18" charset="0"/>
+              </a:endParaRPr>
+            </a:p>
+          </p:txBody>
+        </p:sp>
+        <p:sp>
+          <p:nvSpPr>
+            <p:cNvPr id="7" name="Line 20"/>
+            <p:cNvSpPr>
+              <a:spLocks noChangeShapeType="1"/>
+            </p:cNvSpPr>
+            <p:nvPr/>
+          </p:nvSpPr>
+          <p:spPr bwMode="auto">
+            <a:xfrm>
+              <a:off x="4527778" y="653566"/>
+              <a:ext cx="516191" cy="182165"/>
+            </a:xfrm>
+            <a:prstGeom prst="line">
+              <a:avLst/>
+            </a:prstGeom>
+            <a:noFill/>
+            <a:ln w="28575">
+              <a:solidFill>
+                <a:srgbClr val="000000"/>
+              </a:solidFill>
+              <a:round/>
+              <a:headEnd/>
+              <a:tailEnd type="stealth" w="lg" len="lg"/>
+            </a:ln>
+          </p:spPr>
+          <p:txBody>
+            <a:bodyPr wrap="square">
+              <a:spAutoFit/>
+            </a:bodyPr>
+            <a:lstStyle/>
+            <a:p>
+              <a:endParaRPr lang="en-US"/>
+            </a:p>
+          </p:txBody>
+        </p:sp>
+        <p:sp>
+          <p:nvSpPr>
+            <p:cNvPr id="8" name="Line 20"/>
+            <p:cNvSpPr>
+              <a:spLocks noChangeShapeType="1"/>
+            </p:cNvSpPr>
+            <p:nvPr/>
+          </p:nvSpPr>
+          <p:spPr bwMode="auto">
+            <a:xfrm flipH="1">
+              <a:off x="3618291" y="653566"/>
+              <a:ext cx="609601" cy="182165"/>
+            </a:xfrm>
+            <a:prstGeom prst="line">
+              <a:avLst/>
+            </a:prstGeom>
+            <a:noFill/>
+            <a:ln w="28575">
+              <a:solidFill>
+                <a:srgbClr val="000000"/>
+              </a:solidFill>
+              <a:round/>
+              <a:headEnd/>
+              <a:tailEnd type="stealth" w="lg" len="lg"/>
+            </a:ln>
+          </p:spPr>
+          <p:txBody>
+            <a:bodyPr wrap="square">
+              <a:spAutoFit/>
+            </a:bodyPr>
+            <a:lstStyle/>
+            <a:p>
+              <a:endParaRPr lang="en-US"/>
+            </a:p>
+          </p:txBody>
+        </p:sp>
+        <p:sp>
+          <p:nvSpPr>
+            <p:cNvPr id="9" name="TextBox 42"/>
+            <p:cNvSpPr txBox="1">
+              <a:spLocks noChangeArrowheads="1"/>
+            </p:cNvSpPr>
+            <p:nvPr/>
+          </p:nvSpPr>
+          <p:spPr bwMode="auto">
+            <a:xfrm>
+              <a:off x="1814057" y="1788313"/>
+              <a:ext cx="2030375" cy="369332"/>
+            </a:xfrm>
+            <a:prstGeom prst="rect">
+              <a:avLst/>
+            </a:prstGeom>
+            <a:noFill/>
+            <a:ln w="9525">
+              <a:noFill/>
+              <a:miter lim="800000"/>
+              <a:headEnd/>
+              <a:tailEnd/>
+            </a:ln>
+          </p:spPr>
+          <p:txBody>
+            <a:bodyPr wrap="square">
+              <a:spAutoFit/>
+            </a:bodyPr>
+            <a:lstStyle/>
+            <a:p>
+              <a:r>
+                <a:rPr lang="en-US" dirty="0" err="1" smtClean="0">
+                  <a:solidFill>
+                    <a:srgbClr val="000000"/>
+                  </a:solidFill>
+                  <a:latin typeface="Palatino Linotype" panose="02040502050505030304" pitchFamily="18" charset="0"/>
+                </a:rPr>
+                <a:t>Feedhorn</a:t>
+              </a:r>
+              <a:r>
+                <a:rPr lang="en-US" dirty="0" smtClean="0">
+                  <a:solidFill>
+                    <a:srgbClr val="000000"/>
+                  </a:solidFill>
+                  <a:latin typeface="Palatino Linotype" panose="02040502050505030304" pitchFamily="18" charset="0"/>
+                </a:rPr>
+                <a:t> array</a:t>
+              </a:r>
+              <a:endParaRPr lang="en-US" b="0" dirty="0">
+                <a:solidFill>
+                  <a:srgbClr val="000000"/>
+                </a:solidFill>
+                <a:latin typeface="Palatino Linotype" panose="02040502050505030304" pitchFamily="18" charset="0"/>
+              </a:endParaRPr>
+            </a:p>
+          </p:txBody>
+        </p:sp>
+        <p:sp>
+          <p:nvSpPr>
+            <p:cNvPr id="10" name="Line 20"/>
+            <p:cNvSpPr>
+              <a:spLocks noChangeShapeType="1"/>
+            </p:cNvSpPr>
+            <p:nvPr/>
+          </p:nvSpPr>
+          <p:spPr bwMode="auto">
+            <a:xfrm>
+              <a:off x="2664561" y="2157645"/>
+              <a:ext cx="953730" cy="949753"/>
+            </a:xfrm>
+            <a:prstGeom prst="line">
+              <a:avLst/>
+            </a:prstGeom>
+            <a:noFill/>
+            <a:ln w="28575">
+              <a:solidFill>
+                <a:srgbClr val="000000"/>
+              </a:solidFill>
+              <a:round/>
+              <a:headEnd/>
+              <a:tailEnd type="stealth" w="lg" len="lg"/>
+            </a:ln>
+          </p:spPr>
+          <p:txBody>
+            <a:bodyPr wrap="square">
+              <a:spAutoFit/>
+            </a:bodyPr>
+            <a:lstStyle/>
+            <a:p>
+              <a:endParaRPr lang="en-US"/>
+            </a:p>
+          </p:txBody>
+        </p:sp>
+        <p:sp>
+          <p:nvSpPr>
+            <p:cNvPr id="11" name="TextBox 42"/>
+            <p:cNvSpPr txBox="1">
+              <a:spLocks noChangeArrowheads="1"/>
+            </p:cNvSpPr>
+            <p:nvPr/>
+          </p:nvSpPr>
+          <p:spPr bwMode="auto">
+            <a:xfrm>
+              <a:off x="7241441" y="1812285"/>
+              <a:ext cx="2030375" cy="923330"/>
+            </a:xfrm>
+            <a:prstGeom prst="rect">
+              <a:avLst/>
+            </a:prstGeom>
+            <a:noFill/>
+            <a:ln w="9525">
+              <a:noFill/>
+              <a:miter lim="800000"/>
+              <a:headEnd/>
+              <a:tailEnd/>
+            </a:ln>
+          </p:spPr>
+          <p:txBody>
+            <a:bodyPr wrap="square">
+              <a:spAutoFit/>
+            </a:bodyPr>
+            <a:lstStyle/>
+            <a:p>
+              <a:r>
+                <a:rPr lang="en-US" dirty="0" smtClean="0">
+                  <a:solidFill>
+                    <a:srgbClr val="000000"/>
+                  </a:solidFill>
+                  <a:latin typeface="Palatino Linotype" panose="02040502050505030304" pitchFamily="18" charset="0"/>
+                </a:rPr>
+                <a:t>Wiring chip with multiplexing and interface chips</a:t>
+              </a:r>
+              <a:endParaRPr lang="en-US" b="0" dirty="0">
+                <a:solidFill>
+                  <a:srgbClr val="000000"/>
+                </a:solidFill>
+                <a:latin typeface="Palatino Linotype" panose="02040502050505030304" pitchFamily="18" charset="0"/>
+              </a:endParaRPr>
+            </a:p>
+          </p:txBody>
+        </p:sp>
+        <p:sp>
+          <p:nvSpPr>
+            <p:cNvPr id="12" name="Line 20"/>
+            <p:cNvSpPr>
+              <a:spLocks noChangeShapeType="1"/>
+            </p:cNvSpPr>
+            <p:nvPr/>
+          </p:nvSpPr>
+          <p:spPr bwMode="auto">
+            <a:xfrm flipH="1">
+              <a:off x="5348748" y="2273950"/>
+              <a:ext cx="1892692" cy="262773"/>
+            </a:xfrm>
+            <a:prstGeom prst="line">
+              <a:avLst/>
+            </a:prstGeom>
+            <a:noFill/>
+            <a:ln w="28575">
+              <a:solidFill>
+                <a:schemeClr val="tx1"/>
+              </a:solidFill>
+              <a:round/>
+              <a:headEnd/>
+              <a:tailEnd type="stealth" w="lg" len="lg"/>
+            </a:ln>
+          </p:spPr>
+          <p:txBody>
+            <a:bodyPr wrap="square">
+              <a:spAutoFit/>
+            </a:bodyPr>
+            <a:lstStyle/>
+            <a:p>
+              <a:endParaRPr lang="en-US"/>
+            </a:p>
+          </p:txBody>
+        </p:sp>
+        <p:sp>
+          <p:nvSpPr>
+            <p:cNvPr id="13" name="Line 20"/>
+            <p:cNvSpPr>
+              <a:spLocks noChangeShapeType="1"/>
+            </p:cNvSpPr>
+            <p:nvPr/>
+          </p:nvSpPr>
+          <p:spPr bwMode="auto">
+            <a:xfrm flipH="1">
+              <a:off x="5909186" y="2405336"/>
+              <a:ext cx="1332253" cy="702062"/>
+            </a:xfrm>
+            <a:prstGeom prst="line">
+              <a:avLst/>
+            </a:prstGeom>
+            <a:noFill/>
+            <a:ln w="28575">
+              <a:solidFill>
+                <a:schemeClr val="tx1"/>
+              </a:solidFill>
+              <a:round/>
+              <a:headEnd/>
+              <a:tailEnd type="stealth" w="lg" len="lg"/>
+            </a:ln>
+          </p:spPr>
+          <p:txBody>
+            <a:bodyPr wrap="square">
+              <a:spAutoFit/>
+            </a:bodyPr>
+            <a:lstStyle/>
+            <a:p>
+              <a:endParaRPr lang="en-US"/>
+            </a:p>
+          </p:txBody>
+        </p:sp>
+        <p:sp>
+          <p:nvSpPr>
+            <p:cNvPr id="15" name="Line 20"/>
+            <p:cNvSpPr>
+              <a:spLocks noChangeShapeType="1"/>
+            </p:cNvSpPr>
+            <p:nvPr/>
+          </p:nvSpPr>
+          <p:spPr bwMode="auto">
+            <a:xfrm flipH="1" flipV="1">
+              <a:off x="3174974" y="5383141"/>
+              <a:ext cx="2340864" cy="0"/>
+            </a:xfrm>
+            <a:prstGeom prst="line">
+              <a:avLst/>
+            </a:prstGeom>
+            <a:noFill/>
+            <a:ln w="28575">
+              <a:solidFill>
+                <a:srgbClr val="000000"/>
+              </a:solidFill>
+              <a:round/>
+              <a:headEnd type="stealth" w="med" len="med"/>
+              <a:tailEnd type="stealth" w="med" len="med"/>
+            </a:ln>
+          </p:spPr>
+          <p:txBody>
+            <a:bodyPr wrap="square">
+              <a:spAutoFit/>
+            </a:bodyPr>
+            <a:lstStyle/>
+            <a:p>
+              <a:endParaRPr lang="en-US"/>
+            </a:p>
+          </p:txBody>
+        </p:sp>
+        <p:sp>
+          <p:nvSpPr>
+            <p:cNvPr id="17" name="TextBox 42"/>
+            <p:cNvSpPr txBox="1">
+              <a:spLocks noChangeArrowheads="1"/>
+            </p:cNvSpPr>
+            <p:nvPr/>
+          </p:nvSpPr>
+          <p:spPr bwMode="auto">
+            <a:xfrm>
+              <a:off x="3330219" y="5391842"/>
+              <a:ext cx="2030375" cy="369332"/>
+            </a:xfrm>
+            <a:prstGeom prst="rect">
+              <a:avLst/>
+            </a:prstGeom>
+            <a:noFill/>
+            <a:ln w="9525">
+              <a:noFill/>
+              <a:miter lim="800000"/>
+              <a:headEnd/>
+              <a:tailEnd/>
+            </a:ln>
+          </p:spPr>
+          <p:txBody>
+            <a:bodyPr wrap="square">
+              <a:spAutoFit/>
+            </a:bodyPr>
+            <a:lstStyle/>
+            <a:p>
+              <a:pPr algn="ctr"/>
+              <a:r>
+                <a:rPr lang="en-US" b="0" dirty="0" smtClean="0">
+                  <a:solidFill>
+                    <a:srgbClr val="000000"/>
+                  </a:solidFill>
+                  <a:latin typeface="Palatino Linotype" panose="02040502050505030304" pitchFamily="18" charset="0"/>
+                </a:rPr>
+                <a:t>4 in</a:t>
+              </a:r>
+              <a:endParaRPr lang="en-US" b="0" dirty="0">
+                <a:solidFill>
+                  <a:srgbClr val="000000"/>
+                </a:solidFill>
+                <a:latin typeface="Palatino Linotype" panose="02040502050505030304" pitchFamily="18" charset="0"/>
+              </a:endParaRPr>
+            </a:p>
+          </p:txBody>
+        </p:sp>
+      </p:grpSp>
+    </p:spTree>
+    <p:extLst>
+      <p:ext uri="{BB962C8B-B14F-4D97-AF65-F5344CB8AC3E}">
+        <p14:creationId xmlns:p14="http://schemas.microsoft.com/office/powerpoint/2010/main" val="527449069"/>
       </p:ext>
     </p:extLst>
   </p:cSld>

</xml_diff>

<commit_message>
Small change to temp contrast drawing
</commit_message>
<xml_diff>
--- a/support/thesis-drawings.pptx
+++ b/support/thesis-drawings.pptx
@@ -196,7 +196,7 @@
           <a:p>
             <a:fld id="{FE111C9F-A33E-4952-BC38-37E17DCB4FBF}" type="datetimeFigureOut">
               <a:rPr lang="en-US" smtClean="0"/>
-              <a:t>3/24/2014</a:t>
+              <a:t>3/26/2014</a:t>
             </a:fld>
             <a:endParaRPr lang="en-US"/>
           </a:p>
@@ -986,7 +986,7 @@
           <a:p>
             <a:fld id="{A6C27610-B903-4030-BF6B-58161B6517DA}" type="datetimeFigureOut">
               <a:rPr lang="en-US" smtClean="0"/>
-              <a:t>3/24/2014</a:t>
+              <a:t>3/26/2014</a:t>
             </a:fld>
             <a:endParaRPr lang="en-US"/>
           </a:p>
@@ -1156,7 +1156,7 @@
           <a:p>
             <a:fld id="{A6C27610-B903-4030-BF6B-58161B6517DA}" type="datetimeFigureOut">
               <a:rPr lang="en-US" smtClean="0"/>
-              <a:t>3/24/2014</a:t>
+              <a:t>3/26/2014</a:t>
             </a:fld>
             <a:endParaRPr lang="en-US"/>
           </a:p>
@@ -1336,7 +1336,7 @@
           <a:p>
             <a:fld id="{A6C27610-B903-4030-BF6B-58161B6517DA}" type="datetimeFigureOut">
               <a:rPr lang="en-US" smtClean="0"/>
-              <a:t>3/24/2014</a:t>
+              <a:t>3/26/2014</a:t>
             </a:fld>
             <a:endParaRPr lang="en-US"/>
           </a:p>
@@ -1506,7 +1506,7 @@
           <a:p>
             <a:fld id="{A6C27610-B903-4030-BF6B-58161B6517DA}" type="datetimeFigureOut">
               <a:rPr lang="en-US" smtClean="0"/>
-              <a:t>3/24/2014</a:t>
+              <a:t>3/26/2014</a:t>
             </a:fld>
             <a:endParaRPr lang="en-US"/>
           </a:p>
@@ -1752,7 +1752,7 @@
           <a:p>
             <a:fld id="{A6C27610-B903-4030-BF6B-58161B6517DA}" type="datetimeFigureOut">
               <a:rPr lang="en-US" smtClean="0"/>
-              <a:t>3/24/2014</a:t>
+              <a:t>3/26/2014</a:t>
             </a:fld>
             <a:endParaRPr lang="en-US"/>
           </a:p>
@@ -2040,7 +2040,7 @@
           <a:p>
             <a:fld id="{A6C27610-B903-4030-BF6B-58161B6517DA}" type="datetimeFigureOut">
               <a:rPr lang="en-US" smtClean="0"/>
-              <a:t>3/24/2014</a:t>
+              <a:t>3/26/2014</a:t>
             </a:fld>
             <a:endParaRPr lang="en-US"/>
           </a:p>
@@ -2462,7 +2462,7 @@
           <a:p>
             <a:fld id="{A6C27610-B903-4030-BF6B-58161B6517DA}" type="datetimeFigureOut">
               <a:rPr lang="en-US" smtClean="0"/>
-              <a:t>3/24/2014</a:t>
+              <a:t>3/26/2014</a:t>
             </a:fld>
             <a:endParaRPr lang="en-US"/>
           </a:p>
@@ -2580,7 +2580,7 @@
           <a:p>
             <a:fld id="{A6C27610-B903-4030-BF6B-58161B6517DA}" type="datetimeFigureOut">
               <a:rPr lang="en-US" smtClean="0"/>
-              <a:t>3/24/2014</a:t>
+              <a:t>3/26/2014</a:t>
             </a:fld>
             <a:endParaRPr lang="en-US"/>
           </a:p>
@@ -2675,7 +2675,7 @@
           <a:p>
             <a:fld id="{A6C27610-B903-4030-BF6B-58161B6517DA}" type="datetimeFigureOut">
               <a:rPr lang="en-US" smtClean="0"/>
-              <a:t>3/24/2014</a:t>
+              <a:t>3/26/2014</a:t>
             </a:fld>
             <a:endParaRPr lang="en-US"/>
           </a:p>
@@ -2952,7 +2952,7 @@
           <a:p>
             <a:fld id="{A6C27610-B903-4030-BF6B-58161B6517DA}" type="datetimeFigureOut">
               <a:rPr lang="en-US" smtClean="0"/>
-              <a:t>3/24/2014</a:t>
+              <a:t>3/26/2014</a:t>
             </a:fld>
             <a:endParaRPr lang="en-US"/>
           </a:p>
@@ -3205,7 +3205,7 @@
           <a:p>
             <a:fld id="{A6C27610-B903-4030-BF6B-58161B6517DA}" type="datetimeFigureOut">
               <a:rPr lang="en-US" smtClean="0"/>
-              <a:t>3/24/2014</a:t>
+              <a:t>3/26/2014</a:t>
             </a:fld>
             <a:endParaRPr lang="en-US"/>
           </a:p>
@@ -3418,7 +3418,7 @@
           <a:p>
             <a:fld id="{A6C27610-B903-4030-BF6B-58161B6517DA}" type="datetimeFigureOut">
               <a:rPr lang="en-US" smtClean="0"/>
-              <a:t>3/24/2014</a:t>
+              <a:t>3/26/2014</a:t>
             </a:fld>
             <a:endParaRPr lang="en-US"/>
           </a:p>
@@ -6364,7 +6364,7 @@
       </p:grpSpPr>
       <p:grpSp>
         <p:nvGrpSpPr>
-          <p:cNvPr id="35" name="Group 34"/>
+          <p:cNvPr id="8" name="Group 7"/>
           <p:cNvGrpSpPr/>
           <p:nvPr/>
         </p:nvGrpSpPr>
@@ -6828,9 +6828,9 @@
             <p:nvPr/>
           </p:nvCxnSpPr>
           <p:spPr>
-            <a:xfrm>
-              <a:off x="5751315" y="3251616"/>
-              <a:ext cx="1900517" cy="40"/>
+            <a:xfrm flipV="1">
+              <a:off x="5800475" y="3248902"/>
+              <a:ext cx="1848305" cy="2714"/>
             </a:xfrm>
             <a:prstGeom prst="straightConnector1">
               <a:avLst/>
@@ -6951,7 +6951,7 @@
           </p:nvCxnSpPr>
           <p:spPr>
             <a:xfrm flipH="1">
-              <a:off x="4189278" y="3251616"/>
+              <a:off x="4159782" y="3251616"/>
               <a:ext cx="1431235" cy="0"/>
             </a:xfrm>
             <a:prstGeom prst="straightConnector1">
@@ -6987,7 +6987,7 @@
           </p:nvSpPr>
           <p:spPr>
             <a:xfrm>
-              <a:off x="4288536" y="2887781"/>
+              <a:off x="4445848" y="2887781"/>
               <a:ext cx="1245534" cy="369332"/>
             </a:xfrm>
             <a:prstGeom prst="rect">
@@ -7229,7 +7229,7 @@
           </p:nvSpPr>
           <p:spPr>
             <a:xfrm>
-              <a:off x="3523069" y="3391986"/>
+              <a:off x="3513237" y="3391986"/>
               <a:ext cx="2319528" cy="369332"/>
             </a:xfrm>
             <a:prstGeom prst="rect">

</xml_diff>